<commit_message>
Update sequence diagrams for UG
Update sequence diagrams with higher resolution png.
</commit_message>
<xml_diff>
--- a/docs/diagrams/ListShipSequenceDiagram.pptx
+++ b/docs/diagrams/ListShipSequenceDiagram.pptx
@@ -130,8 +130,7 @@
 <file path=ppt/revisionInfo.xml><?xml version="1.0" encoding="utf-8"?>
 <p1510:revInfo xmlns:a="http://schemas.openxmlformats.org/drawingml/2006/main" xmlns:r="http://schemas.openxmlformats.org/officeDocument/2006/relationships" xmlns:p1510="http://schemas.microsoft.com/office/powerpoint/2015/10/main">
   <p1510:revLst>
-    <p1510:client id="{25B0B48C-3155-344C-9C5D-EB0F11A61745}" v="33" dt="2019-03-29T12:17:56.612"/>
-    <p1510:client id="{59F06697-3FB1-384D-805F-F66146893A2A}" v="150" dt="2019-03-29T14:39:25.347"/>
+    <p1510:client id="{59F06697-3FB1-384D-805F-F66146893A2A}" v="154" dt="2019-03-31T08:19:59.038"/>
   </p1510:revLst>
 </p1510:revInfo>
 </file>
@@ -703,44 +702,6 @@
             <ac:cxnSpMk id="250" creationId="{4905E054-6CE5-4BC2-AEFD-9C5C8BAA5AFA}"/>
           </ac:cxnSpMkLst>
         </pc:cxnChg>
-      </pc:sldChg>
-      <pc:sldChg chg="addSp delSp add del">
-        <pc:chgData name="Ian Wu Ling En" userId="28715549-2f5c-46f8-b7f8-f39c35f3312d" providerId="ADAL" clId="{25B0B48C-3155-344C-9C5D-EB0F11A61745}" dt="2019-03-29T11:37:26.011" v="240"/>
-        <pc:sldMkLst>
-          <pc:docMk/>
-          <pc:sldMk cId="2636235022" sldId="268"/>
-        </pc:sldMkLst>
-        <pc:spChg chg="add del">
-          <ac:chgData name="Ian Wu Ling En" userId="28715549-2f5c-46f8-b7f8-f39c35f3312d" providerId="ADAL" clId="{25B0B48C-3155-344C-9C5D-EB0F11A61745}" dt="2019-03-29T11:37:24.730" v="239"/>
-          <ac:spMkLst>
-            <pc:docMk/>
-            <pc:sldMk cId="2636235022" sldId="268"/>
-            <ac:spMk id="2" creationId="{129F05A2-FECA-A04A-875C-C7C58D8FAC8A}"/>
-          </ac:spMkLst>
-        </pc:spChg>
-      </pc:sldChg>
-      <pc:sldChg chg="addSp modSp add del">
-        <pc:chgData name="Ian Wu Ling En" userId="28715549-2f5c-46f8-b7f8-f39c35f3312d" providerId="ADAL" clId="{25B0B48C-3155-344C-9C5D-EB0F11A61745}" dt="2019-03-29T12:18:10.395" v="566" actId="2696"/>
-        <pc:sldMkLst>
-          <pc:docMk/>
-          <pc:sldMk cId="2769017902" sldId="268"/>
-        </pc:sldMkLst>
-        <pc:spChg chg="add mod">
-          <ac:chgData name="Ian Wu Ling En" userId="28715549-2f5c-46f8-b7f8-f39c35f3312d" providerId="ADAL" clId="{25B0B48C-3155-344C-9C5D-EB0F11A61745}" dt="2019-03-29T12:17:56.612" v="564"/>
-          <ac:spMkLst>
-            <pc:docMk/>
-            <pc:sldMk cId="2769017902" sldId="268"/>
-            <ac:spMk id="2" creationId="{EB11991A-9D9B-4D44-B55A-8F2986A2818F}"/>
-          </ac:spMkLst>
-        </pc:spChg>
-        <pc:spChg chg="add mod">
-          <ac:chgData name="Ian Wu Ling En" userId="28715549-2f5c-46f8-b7f8-f39c35f3312d" providerId="ADAL" clId="{25B0B48C-3155-344C-9C5D-EB0F11A61745}" dt="2019-03-29T12:17:56.612" v="564"/>
-          <ac:spMkLst>
-            <pc:docMk/>
-            <pc:sldMk cId="2769017902" sldId="268"/>
-            <ac:spMk id="3" creationId="{D4FA32F3-EE6C-9C40-A48A-ED8BB4BDE1FD}"/>
-          </ac:spMkLst>
-        </pc:spChg>
       </pc:sldChg>
       <pc:sldMasterChg chg="modSp modSldLayout">
         <pc:chgData name="Ian Wu Ling En" userId="28715549-2f5c-46f8-b7f8-f39c35f3312d" providerId="ADAL" clId="{25B0B48C-3155-344C-9C5D-EB0F11A61745}" dt="2019-03-29T12:17:56.612" v="564"/>
@@ -1012,12 +973,12 @@
   <pc:docChgLst>
     <pc:chgData name="Ian Wu Ling En" userId="28715549-2f5c-46f8-b7f8-f39c35f3312d" providerId="ADAL" clId="{59F06697-3FB1-384D-805F-F66146893A2A}"/>
     <pc:docChg chg="undo redo custSel addSld modSld modMainMaster">
-      <pc:chgData name="Ian Wu Ling En" userId="28715549-2f5c-46f8-b7f8-f39c35f3312d" providerId="ADAL" clId="{59F06697-3FB1-384D-805F-F66146893A2A}" dt="2019-03-29T14:39:28.843" v="1095" actId="1076"/>
+      <pc:chgData name="Ian Wu Ling En" userId="28715549-2f5c-46f8-b7f8-f39c35f3312d" providerId="ADAL" clId="{59F06697-3FB1-384D-805F-F66146893A2A}" dt="2019-03-31T08:20:25.121" v="1142" actId="14100"/>
       <pc:docMkLst>
         <pc:docMk/>
       </pc:docMkLst>
       <pc:sldChg chg="addSp delSp modSp">
-        <pc:chgData name="Ian Wu Ling En" userId="28715549-2f5c-46f8-b7f8-f39c35f3312d" providerId="ADAL" clId="{59F06697-3FB1-384D-805F-F66146893A2A}" dt="2019-03-29T14:39:28.843" v="1095" actId="1076"/>
+        <pc:chgData name="Ian Wu Ling En" userId="28715549-2f5c-46f8-b7f8-f39c35f3312d" providerId="ADAL" clId="{59F06697-3FB1-384D-805F-F66146893A2A}" dt="2019-03-31T08:20:25.121" v="1142" actId="14100"/>
         <pc:sldMkLst>
           <pc:docMk/>
           <pc:sldMk cId="3945898909" sldId="267"/>
@@ -1030,6 +991,14 @@
             <ac:spMk id="2" creationId="{00000000-0000-0000-0000-000000000000}"/>
           </ac:spMkLst>
         </pc:spChg>
+        <pc:spChg chg="add del">
+          <ac:chgData name="Ian Wu Ling En" userId="28715549-2f5c-46f8-b7f8-f39c35f3312d" providerId="ADAL" clId="{59F06697-3FB1-384D-805F-F66146893A2A}" dt="2019-03-31T08:19:01.962" v="1103"/>
+          <ac:spMkLst>
+            <pc:docMk/>
+            <pc:sldMk cId="3945898909" sldId="267"/>
+            <ac:spMk id="3" creationId="{03D8A59F-0FFD-8343-B6BC-F3021B67E172}"/>
+          </ac:spMkLst>
+        </pc:spChg>
         <pc:spChg chg="mod">
           <ac:chgData name="Ian Wu Ling En" userId="28715549-2f5c-46f8-b7f8-f39c35f3312d" providerId="ADAL" clId="{59F06697-3FB1-384D-805F-F66146893A2A}" dt="2019-03-29T14:39:06.906" v="1090" actId="164"/>
           <ac:spMkLst>
@@ -1374,8 +1343,8 @@
             <ac:spMk id="144" creationId="{5208FEAE-C1CD-4546-85EE-E7053BF6D791}"/>
           </ac:spMkLst>
         </pc:spChg>
-        <pc:spChg chg="add mod">
-          <ac:chgData name="Ian Wu Ling En" userId="28715549-2f5c-46f8-b7f8-f39c35f3312d" providerId="ADAL" clId="{59F06697-3FB1-384D-805F-F66146893A2A}" dt="2019-03-29T14:39:06.906" v="1090" actId="164"/>
+        <pc:spChg chg="add del mod">
+          <ac:chgData name="Ian Wu Ling En" userId="28715549-2f5c-46f8-b7f8-f39c35f3312d" providerId="ADAL" clId="{59F06697-3FB1-384D-805F-F66146893A2A}" dt="2019-03-31T08:16:00.644" v="1101" actId="478"/>
           <ac:spMkLst>
             <pc:docMk/>
             <pc:sldMk cId="3945898909" sldId="267"/>
@@ -1510,6 +1479,22 @@
             <ac:spMk id="187" creationId="{09B0E711-DA47-4651-8AB4-F1BD8D990B22}"/>
           </ac:spMkLst>
         </pc:spChg>
+        <pc:spChg chg="add mod">
+          <ac:chgData name="Ian Wu Ling En" userId="28715549-2f5c-46f8-b7f8-f39c35f3312d" providerId="ADAL" clId="{59F06697-3FB1-384D-805F-F66146893A2A}" dt="2019-03-31T08:19:11.259" v="1108" actId="1037"/>
+          <ac:spMkLst>
+            <pc:docMk/>
+            <pc:sldMk cId="3945898909" sldId="267"/>
+            <ac:spMk id="187" creationId="{629D7545-3EEA-DB4B-84CD-E3D50FD9C7E3}"/>
+          </ac:spMkLst>
+        </pc:spChg>
+        <pc:spChg chg="add mod">
+          <ac:chgData name="Ian Wu Ling En" userId="28715549-2f5c-46f8-b7f8-f39c35f3312d" providerId="ADAL" clId="{59F06697-3FB1-384D-805F-F66146893A2A}" dt="2019-03-31T08:20:13.513" v="1141" actId="20577"/>
+          <ac:spMkLst>
+            <pc:docMk/>
+            <pc:sldMk cId="3945898909" sldId="267"/>
+            <ac:spMk id="189" creationId="{37A487E0-4E87-7549-AFC6-602C29EAAC97}"/>
+          </ac:spMkLst>
+        </pc:spChg>
         <pc:spChg chg="add del mod">
           <ac:chgData name="Ian Wu Ling En" userId="28715549-2f5c-46f8-b7f8-f39c35f3312d" providerId="ADAL" clId="{59F06697-3FB1-384D-805F-F66146893A2A}" dt="2019-03-29T13:15:31.489" v="720" actId="478"/>
           <ac:spMkLst>
@@ -1807,7 +1792,7 @@
           </ac:spMkLst>
         </pc:spChg>
         <pc:spChg chg="add mod">
-          <ac:chgData name="Ian Wu Ling En" userId="28715549-2f5c-46f8-b7f8-f39c35f3312d" providerId="ADAL" clId="{59F06697-3FB1-384D-805F-F66146893A2A}" dt="2019-03-29T14:39:25.346" v="1094"/>
+          <ac:chgData name="Ian Wu Ling En" userId="28715549-2f5c-46f8-b7f8-f39c35f3312d" providerId="ADAL" clId="{59F06697-3FB1-384D-805F-F66146893A2A}" dt="2019-03-31T08:20:09.693" v="1138" actId="20577"/>
           <ac:spMkLst>
             <pc:docMk/>
             <pc:sldMk cId="3945898909" sldId="267"/>
@@ -1855,7 +1840,7 @@
           </ac:spMkLst>
         </pc:spChg>
         <pc:spChg chg="add mod">
-          <ac:chgData name="Ian Wu Ling En" userId="28715549-2f5c-46f8-b7f8-f39c35f3312d" providerId="ADAL" clId="{59F06697-3FB1-384D-805F-F66146893A2A}" dt="2019-03-29T14:39:25.346" v="1094"/>
+          <ac:chgData name="Ian Wu Ling En" userId="28715549-2f5c-46f8-b7f8-f39c35f3312d" providerId="ADAL" clId="{59F06697-3FB1-384D-805F-F66146893A2A}" dt="2019-03-31T08:19:32.587" v="1134" actId="20577"/>
           <ac:spMkLst>
             <pc:docMk/>
             <pc:sldMk cId="3945898909" sldId="267"/>
@@ -2087,7 +2072,7 @@
           </ac:cxnSpMkLst>
         </pc:cxnChg>
         <pc:cxnChg chg="mod">
-          <ac:chgData name="Ian Wu Ling En" userId="28715549-2f5c-46f8-b7f8-f39c35f3312d" providerId="ADAL" clId="{59F06697-3FB1-384D-805F-F66146893A2A}" dt="2019-03-29T14:39:06.906" v="1090" actId="164"/>
+          <ac:chgData name="Ian Wu Ling En" userId="28715549-2f5c-46f8-b7f8-f39c35f3312d" providerId="ADAL" clId="{59F06697-3FB1-384D-805F-F66146893A2A}" dt="2019-03-31T08:20:25.121" v="1142" actId="14100"/>
           <ac:cxnSpMkLst>
             <pc:docMk/>
             <pc:sldMk cId="3945898909" sldId="267"/>
@@ -2342,8 +2327,8 @@
             <ac:cxnSpMk id="137" creationId="{1FEA5A0A-F9B0-A740-8E69-ED8A7089BDBE}"/>
           </ac:cxnSpMkLst>
         </pc:cxnChg>
-        <pc:cxnChg chg="add mod">
-          <ac:chgData name="Ian Wu Ling En" userId="28715549-2f5c-46f8-b7f8-f39c35f3312d" providerId="ADAL" clId="{59F06697-3FB1-384D-805F-F66146893A2A}" dt="2019-03-29T14:39:06.906" v="1090" actId="164"/>
+        <pc:cxnChg chg="add del mod">
+          <ac:chgData name="Ian Wu Ling En" userId="28715549-2f5c-46f8-b7f8-f39c35f3312d" providerId="ADAL" clId="{59F06697-3FB1-384D-805F-F66146893A2A}" dt="2019-03-31T08:15:57.618" v="1100" actId="478"/>
           <ac:cxnSpMkLst>
             <pc:docMk/>
             <pc:sldMk cId="3945898909" sldId="267"/>
@@ -2486,12 +2471,28 @@
             <ac:cxnSpMk id="184" creationId="{8C544438-5479-504F-BCAB-7CED8A4715D2}"/>
           </ac:cxnSpMkLst>
         </pc:cxnChg>
+        <pc:cxnChg chg="add mod">
+          <ac:chgData name="Ian Wu Ling En" userId="28715549-2f5c-46f8-b7f8-f39c35f3312d" providerId="ADAL" clId="{59F06697-3FB1-384D-805F-F66146893A2A}" dt="2019-03-31T08:19:18.498" v="1115" actId="1038"/>
+          <ac:cxnSpMkLst>
+            <pc:docMk/>
+            <pc:sldMk cId="3945898909" sldId="267"/>
+            <ac:cxnSpMk id="186" creationId="{DB391C00-B69F-594C-8AB2-EAA5291A56CC}"/>
+          </ac:cxnSpMkLst>
+        </pc:cxnChg>
         <pc:cxnChg chg="del mod">
           <ac:chgData name="Ian Wu Ling En" userId="28715549-2f5c-46f8-b7f8-f39c35f3312d" providerId="ADAL" clId="{59F06697-3FB1-384D-805F-F66146893A2A}" dt="2019-03-29T12:57:48.610" v="552" actId="478"/>
           <ac:cxnSpMkLst>
             <pc:docMk/>
             <pc:sldMk cId="3945898909" sldId="267"/>
             <ac:cxnSpMk id="188" creationId="{44EF094F-1339-4CA4-88DB-FE36777A1A62}"/>
+          </ac:cxnSpMkLst>
+        </pc:cxnChg>
+        <pc:cxnChg chg="add mod">
+          <ac:chgData name="Ian Wu Ling En" userId="28715549-2f5c-46f8-b7f8-f39c35f3312d" providerId="ADAL" clId="{59F06697-3FB1-384D-805F-F66146893A2A}" dt="2019-03-31T08:20:02.320" v="1136" actId="1076"/>
+          <ac:cxnSpMkLst>
+            <pc:docMk/>
+            <pc:sldMk cId="3945898909" sldId="267"/>
+            <ac:cxnSpMk id="188" creationId="{5233C6AE-FC03-3F45-894D-DD1223B2390F}"/>
           </ac:cxnSpMkLst>
         </pc:cxnChg>
         <pc:cxnChg chg="add del mod">
@@ -3214,7 +3215,7 @@
           <a:p>
             <a:fld id="{F5CC4B3F-88C1-4FFA-B1B6-F41C21DC6924}" type="datetimeFigureOut">
               <a:rPr lang="en-US" smtClean="0"/>
-              <a:t>3/29/19</a:t>
+              <a:t>3/31/19</a:t>
             </a:fld>
             <a:endParaRPr lang="en-US" dirty="0"/>
           </a:p>
@@ -3660,7 +3661,7 @@
           <a:p>
             <a:fld id="{78C97017-6FC3-485B-9764-EAC9E56C1D49}" type="datetimeFigureOut">
               <a:rPr lang="en-US" smtClean="0"/>
-              <a:t>3/29/19</a:t>
+              <a:t>3/31/19</a:t>
             </a:fld>
             <a:endParaRPr lang="en-US" dirty="0"/>
           </a:p>
@@ -3828,7 +3829,7 @@
           <a:p>
             <a:fld id="{78C97017-6FC3-485B-9764-EAC9E56C1D49}" type="datetimeFigureOut">
               <a:rPr lang="en-US" smtClean="0"/>
-              <a:t>3/29/19</a:t>
+              <a:t>3/31/19</a:t>
             </a:fld>
             <a:endParaRPr lang="en-US" dirty="0"/>
           </a:p>
@@ -4006,7 +4007,7 @@
           <a:p>
             <a:fld id="{78C97017-6FC3-485B-9764-EAC9E56C1D49}" type="datetimeFigureOut">
               <a:rPr lang="en-US" smtClean="0"/>
-              <a:t>3/29/19</a:t>
+              <a:t>3/31/19</a:t>
             </a:fld>
             <a:endParaRPr lang="en-US" dirty="0"/>
           </a:p>
@@ -4174,7 +4175,7 @@
           <a:p>
             <a:fld id="{78C97017-6FC3-485B-9764-EAC9E56C1D49}" type="datetimeFigureOut">
               <a:rPr lang="en-US" smtClean="0"/>
-              <a:t>3/29/19</a:t>
+              <a:t>3/31/19</a:t>
             </a:fld>
             <a:endParaRPr lang="en-US" dirty="0"/>
           </a:p>
@@ -4419,7 +4420,7 @@
           <a:p>
             <a:fld id="{78C97017-6FC3-485B-9764-EAC9E56C1D49}" type="datetimeFigureOut">
               <a:rPr lang="en-US" smtClean="0"/>
-              <a:t>3/29/19</a:t>
+              <a:t>3/31/19</a:t>
             </a:fld>
             <a:endParaRPr lang="en-US" dirty="0"/>
           </a:p>
@@ -4704,7 +4705,7 @@
           <a:p>
             <a:fld id="{78C97017-6FC3-485B-9764-EAC9E56C1D49}" type="datetimeFigureOut">
               <a:rPr lang="en-US" smtClean="0"/>
-              <a:t>3/29/19</a:t>
+              <a:t>3/31/19</a:t>
             </a:fld>
             <a:endParaRPr lang="en-US" dirty="0"/>
           </a:p>
@@ -5123,7 +5124,7 @@
           <a:p>
             <a:fld id="{78C97017-6FC3-485B-9764-EAC9E56C1D49}" type="datetimeFigureOut">
               <a:rPr lang="en-US" smtClean="0"/>
-              <a:t>3/29/19</a:t>
+              <a:t>3/31/19</a:t>
             </a:fld>
             <a:endParaRPr lang="en-US" dirty="0"/>
           </a:p>
@@ -5240,7 +5241,7 @@
           <a:p>
             <a:fld id="{78C97017-6FC3-485B-9764-EAC9E56C1D49}" type="datetimeFigureOut">
               <a:rPr lang="en-US" smtClean="0"/>
-              <a:t>3/29/19</a:t>
+              <a:t>3/31/19</a:t>
             </a:fld>
             <a:endParaRPr lang="en-US" dirty="0"/>
           </a:p>
@@ -5335,7 +5336,7 @@
           <a:p>
             <a:fld id="{78C97017-6FC3-485B-9764-EAC9E56C1D49}" type="datetimeFigureOut">
               <a:rPr lang="en-US" smtClean="0"/>
-              <a:t>3/29/19</a:t>
+              <a:t>3/31/19</a:t>
             </a:fld>
             <a:endParaRPr lang="en-US" dirty="0"/>
           </a:p>
@@ -5610,7 +5611,7 @@
           <a:p>
             <a:fld id="{78C97017-6FC3-485B-9764-EAC9E56C1D49}" type="datetimeFigureOut">
               <a:rPr lang="en-US" smtClean="0"/>
-              <a:t>3/29/19</a:t>
+              <a:t>3/31/19</a:t>
             </a:fld>
             <a:endParaRPr lang="en-US" dirty="0"/>
           </a:p>
@@ -5862,7 +5863,7 @@
           <a:p>
             <a:fld id="{78C97017-6FC3-485B-9764-EAC9E56C1D49}" type="datetimeFigureOut">
               <a:rPr lang="en-US" smtClean="0"/>
-              <a:t>3/29/19</a:t>
+              <a:t>3/31/19</a:t>
             </a:fld>
             <a:endParaRPr lang="en-US" dirty="0"/>
           </a:p>
@@ -6073,7 +6074,7 @@
           <a:p>
             <a:fld id="{78C97017-6FC3-485B-9764-EAC9E56C1D49}" type="datetimeFigureOut">
               <a:rPr lang="en-US" smtClean="0"/>
-              <a:t>3/29/19</a:t>
+              <a:t>3/31/19</a:t>
             </a:fld>
             <a:endParaRPr lang="en-US" dirty="0"/>
           </a:p>
@@ -8088,8 +8089,8 @@
           </p:nvCxnSpPr>
           <p:spPr>
             <a:xfrm flipH="1">
-              <a:off x="10983650" y="3288424"/>
-              <a:ext cx="1" cy="9167048"/>
+              <a:off x="10983651" y="3288424"/>
+              <a:ext cx="1" cy="15078576"/>
             </a:xfrm>
             <a:prstGeom prst="line">
               <a:avLst/>
@@ -10622,106 +10623,6 @@
         </p:cxnSp>
         <p:sp>
           <p:nvSpPr>
-            <p:cNvPr id="145" name="Rectangle 144">
-              <a:extLst>
-                <a:ext uri="{FF2B5EF4-FFF2-40B4-BE49-F238E27FC236}">
-                  <a16:creationId xmlns:a16="http://schemas.microsoft.com/office/drawing/2014/main" id="{FFF28C2E-F485-ED48-A54C-9B7DD4C4532B}"/>
-                </a:ext>
-              </a:extLst>
-            </p:cNvPr>
-            <p:cNvSpPr/>
-            <p:nvPr/>
-          </p:nvSpPr>
-          <p:spPr>
-            <a:xfrm>
-              <a:off x="11151423" y="4142680"/>
-              <a:ext cx="129933" cy="233713"/>
-            </a:xfrm>
-            <a:prstGeom prst="rect">
-              <a:avLst/>
-            </a:prstGeom>
-            <a:solidFill>
-              <a:srgbClr val="7030A0"/>
-            </a:solidFill>
-            <a:ln>
-              <a:solidFill>
-                <a:srgbClr val="7030A0"/>
-              </a:solidFill>
-            </a:ln>
-            <a:effectLst/>
-          </p:spPr>
-          <p:style>
-            <a:lnRef idx="1">
-              <a:schemeClr val="accent3"/>
-            </a:lnRef>
-            <a:fillRef idx="2">
-              <a:schemeClr val="accent3"/>
-            </a:fillRef>
-            <a:effectRef idx="1">
-              <a:schemeClr val="accent3"/>
-            </a:effectRef>
-            <a:fontRef idx="minor">
-              <a:schemeClr val="dk1"/>
-            </a:fontRef>
-          </p:style>
-          <p:txBody>
-            <a:bodyPr rtlCol="0" anchor="ctr"/>
-            <a:lstStyle/>
-            <a:p>
-              <a:pPr algn="ctr"/>
-              <a:endParaRPr lang="en-SG" sz="1400"/>
-            </a:p>
-          </p:txBody>
-        </p:sp>
-        <p:cxnSp>
-          <p:nvCxnSpPr>
-            <p:cNvPr id="146" name="Curved Connector 12">
-              <a:extLst>
-                <a:ext uri="{FF2B5EF4-FFF2-40B4-BE49-F238E27FC236}">
-                  <a16:creationId xmlns:a16="http://schemas.microsoft.com/office/drawing/2014/main" id="{2CCBE384-E26B-E648-9ECD-BA2B5A96FE25}"/>
-                </a:ext>
-              </a:extLst>
-            </p:cNvPr>
-            <p:cNvCxnSpPr>
-              <a:cxnSpLocks/>
-            </p:cNvCxnSpPr>
-            <p:nvPr/>
-          </p:nvCxnSpPr>
-          <p:spPr>
-            <a:xfrm flipH="1">
-              <a:off x="11202018" y="4373214"/>
-              <a:ext cx="72953" cy="132809"/>
-            </a:xfrm>
-            <a:prstGeom prst="curvedConnector3">
-              <a:avLst>
-                <a:gd name="adj1" fmla="val -313352"/>
-              </a:avLst>
-            </a:prstGeom>
-            <a:ln>
-              <a:solidFill>
-                <a:srgbClr val="7030A0"/>
-              </a:solidFill>
-              <a:prstDash val="sysDash"/>
-              <a:tailEnd type="triangle"/>
-            </a:ln>
-          </p:spPr>
-          <p:style>
-            <a:lnRef idx="1">
-              <a:schemeClr val="accent1"/>
-            </a:lnRef>
-            <a:fillRef idx="0">
-              <a:schemeClr val="accent1"/>
-            </a:fillRef>
-            <a:effectRef idx="0">
-              <a:schemeClr val="accent1"/>
-            </a:effectRef>
-            <a:fontRef idx="minor">
-              <a:schemeClr val="tx1"/>
-            </a:fontRef>
-          </p:style>
-        </p:cxnSp>
-        <p:sp>
-          <p:nvSpPr>
             <p:cNvPr id="151" name="Rectangle 150">
               <a:extLst>
                 <a:ext uri="{FF2B5EF4-FFF2-40B4-BE49-F238E27FC236}">
@@ -14400,7 +14301,7 @@
             <a:p>
               <a:r>
                 <a:rPr lang="en-US" dirty="0"/>
-                <a:t>parse(“list n/d*)</a:t>
+                <a:t>parse(“list t/t)</a:t>
               </a:r>
             </a:p>
           </p:txBody>
@@ -15013,12 +14914,180 @@
                     <a:srgbClr val="0070C0"/>
                   </a:solidFill>
                 </a:rPr>
-                <a:t>execute(“list”)</a:t>
+                <a:t>execute(“list n/d* t/y”)</a:t>
               </a:r>
             </a:p>
           </p:txBody>
         </p:sp>
       </p:grpSp>
+      <p:cxnSp>
+        <p:nvCxnSpPr>
+          <p:cNvPr id="186" name="Straight Arrow Connector 185">
+            <a:extLst>
+              <a:ext uri="{FF2B5EF4-FFF2-40B4-BE49-F238E27FC236}">
+                <a16:creationId xmlns:a16="http://schemas.microsoft.com/office/drawing/2014/main" id="{DB391C00-B69F-594C-8AB2-EAA5291A56CC}"/>
+              </a:ext>
+            </a:extLst>
+          </p:cNvPr>
+          <p:cNvCxnSpPr>
+            <a:cxnSpLocks/>
+          </p:cNvCxnSpPr>
+          <p:nvPr/>
+        </p:nvCxnSpPr>
+        <p:spPr>
+          <a:xfrm>
+            <a:off x="216618" y="11333162"/>
+            <a:ext cx="2106688" cy="0"/>
+          </a:xfrm>
+          <a:prstGeom prst="straightConnector1">
+            <a:avLst/>
+          </a:prstGeom>
+          <a:ln w="19050">
+            <a:solidFill>
+              <a:srgbClr val="00B050"/>
+            </a:solidFill>
+            <a:tailEnd type="arrow"/>
+          </a:ln>
+        </p:spPr>
+        <p:style>
+          <a:lnRef idx="1">
+            <a:schemeClr val="accent1"/>
+          </a:lnRef>
+          <a:fillRef idx="0">
+            <a:schemeClr val="accent1"/>
+          </a:fillRef>
+          <a:effectRef idx="0">
+            <a:schemeClr val="accent1"/>
+          </a:effectRef>
+          <a:fontRef idx="minor">
+            <a:schemeClr val="tx1"/>
+          </a:fontRef>
+        </p:style>
+      </p:cxnSp>
+      <p:sp>
+        <p:nvSpPr>
+          <p:cNvPr id="187" name="TextBox 186">
+            <a:extLst>
+              <a:ext uri="{FF2B5EF4-FFF2-40B4-BE49-F238E27FC236}">
+                <a16:creationId xmlns:a16="http://schemas.microsoft.com/office/drawing/2014/main" id="{629D7545-3EEA-DB4B-84CD-E3D50FD9C7E3}"/>
+              </a:ext>
+            </a:extLst>
+          </p:cNvPr>
+          <p:cNvSpPr txBox="1"/>
+          <p:nvPr/>
+        </p:nvSpPr>
+        <p:spPr>
+          <a:xfrm>
+            <a:off x="284339" y="11046556"/>
+            <a:ext cx="2024970" cy="215444"/>
+          </a:xfrm>
+          <a:prstGeom prst="rect">
+            <a:avLst/>
+          </a:prstGeom>
+          <a:noFill/>
+        </p:spPr>
+        <p:txBody>
+          <a:bodyPr wrap="square" lIns="0" tIns="0" rIns="0" bIns="0" rtlCol="0">
+            <a:spAutoFit/>
+          </a:bodyPr>
+          <a:lstStyle/>
+          <a:p>
+            <a:pPr algn="r"/>
+            <a:r>
+              <a:rPr lang="en-US" sz="1400" dirty="0">
+                <a:solidFill>
+                  <a:srgbClr val="0070C0"/>
+                </a:solidFill>
+              </a:rPr>
+              <a:t>execute(“list n/d”)</a:t>
+            </a:r>
+          </a:p>
+        </p:txBody>
+      </p:sp>
+      <p:cxnSp>
+        <p:nvCxnSpPr>
+          <p:cNvPr id="188" name="Straight Arrow Connector 187">
+            <a:extLst>
+              <a:ext uri="{FF2B5EF4-FFF2-40B4-BE49-F238E27FC236}">
+                <a16:creationId xmlns:a16="http://schemas.microsoft.com/office/drawing/2014/main" id="{5233C6AE-FC03-3F45-894D-DD1223B2390F}"/>
+              </a:ext>
+            </a:extLst>
+          </p:cNvPr>
+          <p:cNvCxnSpPr>
+            <a:cxnSpLocks/>
+          </p:cNvCxnSpPr>
+          <p:nvPr/>
+        </p:nvCxnSpPr>
+        <p:spPr>
+          <a:xfrm>
+            <a:off x="251356" y="15886968"/>
+            <a:ext cx="2106688" cy="0"/>
+          </a:xfrm>
+          <a:prstGeom prst="straightConnector1">
+            <a:avLst/>
+          </a:prstGeom>
+          <a:ln w="19050">
+            <a:solidFill>
+              <a:srgbClr val="00B050"/>
+            </a:solidFill>
+            <a:tailEnd type="arrow"/>
+          </a:ln>
+        </p:spPr>
+        <p:style>
+          <a:lnRef idx="1">
+            <a:schemeClr val="accent1"/>
+          </a:lnRef>
+          <a:fillRef idx="0">
+            <a:schemeClr val="accent1"/>
+          </a:fillRef>
+          <a:effectRef idx="0">
+            <a:schemeClr val="accent1"/>
+          </a:effectRef>
+          <a:fontRef idx="minor">
+            <a:schemeClr val="tx1"/>
+          </a:fontRef>
+        </p:style>
+      </p:cxnSp>
+      <p:sp>
+        <p:nvSpPr>
+          <p:cNvPr id="189" name="TextBox 188">
+            <a:extLst>
+              <a:ext uri="{FF2B5EF4-FFF2-40B4-BE49-F238E27FC236}">
+                <a16:creationId xmlns:a16="http://schemas.microsoft.com/office/drawing/2014/main" id="{37A487E0-4E87-7549-AFC6-602C29EAAC97}"/>
+              </a:ext>
+            </a:extLst>
+          </p:cNvPr>
+          <p:cNvSpPr txBox="1"/>
+          <p:nvPr/>
+        </p:nvSpPr>
+        <p:spPr>
+          <a:xfrm>
+            <a:off x="319077" y="15600362"/>
+            <a:ext cx="2024970" cy="215444"/>
+          </a:xfrm>
+          <a:prstGeom prst="rect">
+            <a:avLst/>
+          </a:prstGeom>
+          <a:noFill/>
+        </p:spPr>
+        <p:txBody>
+          <a:bodyPr wrap="square" lIns="0" tIns="0" rIns="0" bIns="0" rtlCol="0">
+            <a:spAutoFit/>
+          </a:bodyPr>
+          <a:lstStyle/>
+          <a:p>
+            <a:pPr algn="r"/>
+            <a:r>
+              <a:rPr lang="en-US" sz="1400" dirty="0">
+                <a:solidFill>
+                  <a:srgbClr val="0070C0"/>
+                </a:solidFill>
+              </a:rPr>
+              <a:t>execute(“list t/t”)</a:t>
+            </a:r>
+          </a:p>
+        </p:txBody>
+      </p:sp>
     </p:spTree>
     <p:extLst>
       <p:ext uri="{BB962C8B-B14F-4D97-AF65-F5344CB8AC3E}">

</xml_diff>

<commit_message>
Update sequence diagram for ListShip
</commit_message>
<xml_diff>
--- a/docs/diagrams/ListShipSequenceDiagram.pptx
+++ b/docs/diagrams/ListShipSequenceDiagram.pptx
@@ -973,12 +973,12 @@
   <pc:docChgLst>
     <pc:chgData name="Ian Wu Ling En" userId="28715549-2f5c-46f8-b7f8-f39c35f3312d" providerId="ADAL" clId="{C6CF5E52-9A05-8D47-88FC-68030C41F07F}"/>
     <pc:docChg chg="undo custSel modSld">
-      <pc:chgData name="Ian Wu Ling En" userId="28715549-2f5c-46f8-b7f8-f39c35f3312d" providerId="ADAL" clId="{C6CF5E52-9A05-8D47-88FC-68030C41F07F}" dt="2019-04-05T01:21:34.362" v="208" actId="207"/>
+      <pc:chgData name="Ian Wu Ling En" userId="28715549-2f5c-46f8-b7f8-f39c35f3312d" providerId="ADAL" clId="{C6CF5E52-9A05-8D47-88FC-68030C41F07F}" dt="2019-04-05T01:44:26.594" v="224" actId="14100"/>
       <pc:docMkLst>
         <pc:docMk/>
       </pc:docMkLst>
       <pc:sldChg chg="addSp delSp modSp">
-        <pc:chgData name="Ian Wu Ling En" userId="28715549-2f5c-46f8-b7f8-f39c35f3312d" providerId="ADAL" clId="{C6CF5E52-9A05-8D47-88FC-68030C41F07F}" dt="2019-04-05T01:21:34.362" v="208" actId="207"/>
+        <pc:chgData name="Ian Wu Ling En" userId="28715549-2f5c-46f8-b7f8-f39c35f3312d" providerId="ADAL" clId="{C6CF5E52-9A05-8D47-88FC-68030C41F07F}" dt="2019-04-05T01:44:26.594" v="224" actId="14100"/>
         <pc:sldMkLst>
           <pc:docMk/>
           <pc:sldMk cId="3945898909" sldId="267"/>
@@ -1328,7 +1328,7 @@
           </ac:spMkLst>
         </pc:spChg>
         <pc:spChg chg="mod topLvl">
-          <ac:chgData name="Ian Wu Ling En" userId="28715549-2f5c-46f8-b7f8-f39c35f3312d" providerId="ADAL" clId="{C6CF5E52-9A05-8D47-88FC-68030C41F07F}" dt="2019-04-05T01:08:19.617" v="0" actId="165"/>
+          <ac:chgData name="Ian Wu Ling En" userId="28715549-2f5c-46f8-b7f8-f39c35f3312d" providerId="ADAL" clId="{C6CF5E52-9A05-8D47-88FC-68030C41F07F}" dt="2019-04-05T01:43:40.538" v="215" actId="14100"/>
           <ac:spMkLst>
             <pc:docMk/>
             <pc:sldMk cId="3945898909" sldId="267"/>
@@ -1336,7 +1336,7 @@
           </ac:spMkLst>
         </pc:spChg>
         <pc:spChg chg="mod topLvl">
-          <ac:chgData name="Ian Wu Ling En" userId="28715549-2f5c-46f8-b7f8-f39c35f3312d" providerId="ADAL" clId="{C6CF5E52-9A05-8D47-88FC-68030C41F07F}" dt="2019-04-05T01:16:34.961" v="124" actId="14100"/>
+          <ac:chgData name="Ian Wu Ling En" userId="28715549-2f5c-46f8-b7f8-f39c35f3312d" providerId="ADAL" clId="{C6CF5E52-9A05-8D47-88FC-68030C41F07F}" dt="2019-04-05T01:43:27.763" v="211" actId="14100"/>
           <ac:spMkLst>
             <pc:docMk/>
             <pc:sldMk cId="3945898909" sldId="267"/>
@@ -1344,7 +1344,7 @@
           </ac:spMkLst>
         </pc:spChg>
         <pc:spChg chg="mod topLvl">
-          <ac:chgData name="Ian Wu Ling En" userId="28715549-2f5c-46f8-b7f8-f39c35f3312d" providerId="ADAL" clId="{C6CF5E52-9A05-8D47-88FC-68030C41F07F}" dt="2019-04-05T01:08:19.617" v="0" actId="165"/>
+          <ac:chgData name="Ian Wu Ling En" userId="28715549-2f5c-46f8-b7f8-f39c35f3312d" providerId="ADAL" clId="{C6CF5E52-9A05-8D47-88FC-68030C41F07F}" dt="2019-04-05T01:44:26.594" v="224" actId="14100"/>
           <ac:spMkLst>
             <pc:docMk/>
             <pc:sldMk cId="3945898909" sldId="267"/>
@@ -2040,7 +2040,7 @@
           </ac:cxnSpMkLst>
         </pc:cxnChg>
         <pc:cxnChg chg="mod">
-          <ac:chgData name="Ian Wu Ling En" userId="28715549-2f5c-46f8-b7f8-f39c35f3312d" providerId="ADAL" clId="{C6CF5E52-9A05-8D47-88FC-68030C41F07F}" dt="2019-04-05T01:21:07.616" v="198" actId="1076"/>
+          <ac:chgData name="Ian Wu Ling En" userId="28715549-2f5c-46f8-b7f8-f39c35f3312d" providerId="ADAL" clId="{C6CF5E52-9A05-8D47-88FC-68030C41F07F}" dt="2019-04-05T01:44:11.249" v="223" actId="14100"/>
           <ac:cxnSpMkLst>
             <pc:docMk/>
             <pc:sldMk cId="3945898909" sldId="267"/>
@@ -2048,7 +2048,7 @@
           </ac:cxnSpMkLst>
         </pc:cxnChg>
         <pc:cxnChg chg="mod topLvl">
-          <ac:chgData name="Ian Wu Ling En" userId="28715549-2f5c-46f8-b7f8-f39c35f3312d" providerId="ADAL" clId="{C6CF5E52-9A05-8D47-88FC-68030C41F07F}" dt="2019-04-05T01:09:57.548" v="46" actId="14100"/>
+          <ac:chgData name="Ian Wu Ling En" userId="28715549-2f5c-46f8-b7f8-f39c35f3312d" providerId="ADAL" clId="{C6CF5E52-9A05-8D47-88FC-68030C41F07F}" dt="2019-04-05T01:43:45.442" v="217" actId="14100"/>
           <ac:cxnSpMkLst>
             <pc:docMk/>
             <pc:sldMk cId="3945898909" sldId="267"/>
@@ -2128,7 +2128,7 @@
           </ac:cxnSpMkLst>
         </pc:cxnChg>
         <pc:cxnChg chg="mod topLvl">
-          <ac:chgData name="Ian Wu Ling En" userId="28715549-2f5c-46f8-b7f8-f39c35f3312d" providerId="ADAL" clId="{C6CF5E52-9A05-8D47-88FC-68030C41F07F}" dt="2019-04-05T01:08:19.617" v="0" actId="165"/>
+          <ac:chgData name="Ian Wu Ling En" userId="28715549-2f5c-46f8-b7f8-f39c35f3312d" providerId="ADAL" clId="{C6CF5E52-9A05-8D47-88FC-68030C41F07F}" dt="2019-04-05T01:43:33.032" v="214" actId="14100"/>
           <ac:cxnSpMkLst>
             <pc:docMk/>
             <pc:sldMk cId="3945898909" sldId="267"/>
@@ -2336,7 +2336,7 @@
           </ac:cxnSpMkLst>
         </pc:cxnChg>
         <pc:cxnChg chg="mod topLvl">
-          <ac:chgData name="Ian Wu Ling En" userId="28715549-2f5c-46f8-b7f8-f39c35f3312d" providerId="ADAL" clId="{C6CF5E52-9A05-8D47-88FC-68030C41F07F}" dt="2019-04-05T01:11:53.833" v="73" actId="14100"/>
+          <ac:chgData name="Ian Wu Ling En" userId="28715549-2f5c-46f8-b7f8-f39c35f3312d" providerId="ADAL" clId="{C6CF5E52-9A05-8D47-88FC-68030C41F07F}" dt="2019-04-05T01:43:59.111" v="220" actId="14100"/>
           <ac:cxnSpMkLst>
             <pc:docMk/>
             <pc:sldMk cId="3945898909" sldId="267"/>
@@ -13901,8 +13901,8 @@
         </p:nvSpPr>
         <p:spPr>
           <a:xfrm>
-            <a:off x="2330603" y="6555713"/>
-            <a:ext cx="175125" cy="3935947"/>
+            <a:off x="2330603" y="6731640"/>
+            <a:ext cx="175125" cy="3760020"/>
           </a:xfrm>
           <a:prstGeom prst="rect">
             <a:avLst/>
@@ -13954,8 +13954,8 @@
         </p:nvSpPr>
         <p:spPr>
           <a:xfrm>
-            <a:off x="2330535" y="10706672"/>
-            <a:ext cx="188616" cy="3765704"/>
+            <a:off x="2330534" y="11026599"/>
+            <a:ext cx="190127" cy="3445775"/>
           </a:xfrm>
           <a:prstGeom prst="rect">
             <a:avLst/>
@@ -14007,8 +14007,8 @@
         </p:nvSpPr>
         <p:spPr>
           <a:xfrm>
-            <a:off x="2330535" y="15064565"/>
-            <a:ext cx="171280" cy="4164645"/>
+            <a:off x="2330534" y="15487362"/>
+            <a:ext cx="172557" cy="3462978"/>
           </a:xfrm>
           <a:prstGeom prst="rect">
             <a:avLst/>
@@ -14113,8 +14113,8 @@
         </p:nvCxnSpPr>
         <p:spPr>
           <a:xfrm>
-            <a:off x="2532186" y="11071315"/>
-            <a:ext cx="2505435" cy="1"/>
+            <a:off x="2475582" y="11071316"/>
+            <a:ext cx="2562039" cy="0"/>
           </a:xfrm>
           <a:prstGeom prst="straightConnector1">
             <a:avLst/>
@@ -16048,9 +16048,9 @@
           <p:nvPr/>
         </p:nvCxnSpPr>
         <p:spPr>
-          <a:xfrm>
-            <a:off x="998291" y="6743891"/>
-            <a:ext cx="1367143" cy="0"/>
+          <a:xfrm flipV="1">
+            <a:off x="998291" y="6732434"/>
+            <a:ext cx="1327877" cy="11458"/>
           </a:xfrm>
           <a:prstGeom prst="straightConnector1">
             <a:avLst/>
@@ -16218,7 +16218,7 @@
         <p:spPr>
           <a:xfrm>
             <a:off x="1180306" y="15487361"/>
-            <a:ext cx="1177738" cy="0"/>
+            <a:ext cx="1145862" cy="0"/>
           </a:xfrm>
           <a:prstGeom prst="straightConnector1">
             <a:avLst/>

</xml_diff>

<commit_message>
Update ListShipCommand sequence diagram
</commit_message>
<xml_diff>
--- a/docs/diagrams/ListShipSequenceDiagram.pptx
+++ b/docs/diagrams/ListShipSequenceDiagram.pptx
@@ -5254,7 +5254,7 @@
           <a:p>
             <a:fld id="{F5CC4B3F-88C1-4FFA-B1B6-F41C21DC6924}" type="datetimeFigureOut">
               <a:rPr lang="en-US" smtClean="0"/>
-              <a:t>4/13/19</a:t>
+              <a:t>4/14/19</a:t>
             </a:fld>
             <a:endParaRPr lang="en-US" dirty="0"/>
           </a:p>
@@ -5700,7 +5700,7 @@
           <a:p>
             <a:fld id="{78C97017-6FC3-485B-9764-EAC9E56C1D49}" type="datetimeFigureOut">
               <a:rPr lang="en-US" smtClean="0"/>
-              <a:t>4/13/19</a:t>
+              <a:t>4/14/19</a:t>
             </a:fld>
             <a:endParaRPr lang="en-US" dirty="0"/>
           </a:p>
@@ -5868,7 +5868,7 @@
           <a:p>
             <a:fld id="{78C97017-6FC3-485B-9764-EAC9E56C1D49}" type="datetimeFigureOut">
               <a:rPr lang="en-US" smtClean="0"/>
-              <a:t>4/13/19</a:t>
+              <a:t>4/14/19</a:t>
             </a:fld>
             <a:endParaRPr lang="en-US" dirty="0"/>
           </a:p>
@@ -6046,7 +6046,7 @@
           <a:p>
             <a:fld id="{78C97017-6FC3-485B-9764-EAC9E56C1D49}" type="datetimeFigureOut">
               <a:rPr lang="en-US" smtClean="0"/>
-              <a:t>4/13/19</a:t>
+              <a:t>4/14/19</a:t>
             </a:fld>
             <a:endParaRPr lang="en-US" dirty="0"/>
           </a:p>
@@ -6214,7 +6214,7 @@
           <a:p>
             <a:fld id="{78C97017-6FC3-485B-9764-EAC9E56C1D49}" type="datetimeFigureOut">
               <a:rPr lang="en-US" smtClean="0"/>
-              <a:t>4/13/19</a:t>
+              <a:t>4/14/19</a:t>
             </a:fld>
             <a:endParaRPr lang="en-US" dirty="0"/>
           </a:p>
@@ -6459,7 +6459,7 @@
           <a:p>
             <a:fld id="{78C97017-6FC3-485B-9764-EAC9E56C1D49}" type="datetimeFigureOut">
               <a:rPr lang="en-US" smtClean="0"/>
-              <a:t>4/13/19</a:t>
+              <a:t>4/14/19</a:t>
             </a:fld>
             <a:endParaRPr lang="en-US" dirty="0"/>
           </a:p>
@@ -6744,7 +6744,7 @@
           <a:p>
             <a:fld id="{78C97017-6FC3-485B-9764-EAC9E56C1D49}" type="datetimeFigureOut">
               <a:rPr lang="en-US" smtClean="0"/>
-              <a:t>4/13/19</a:t>
+              <a:t>4/14/19</a:t>
             </a:fld>
             <a:endParaRPr lang="en-US" dirty="0"/>
           </a:p>
@@ -7163,7 +7163,7 @@
           <a:p>
             <a:fld id="{78C97017-6FC3-485B-9764-EAC9E56C1D49}" type="datetimeFigureOut">
               <a:rPr lang="en-US" smtClean="0"/>
-              <a:t>4/13/19</a:t>
+              <a:t>4/14/19</a:t>
             </a:fld>
             <a:endParaRPr lang="en-US" dirty="0"/>
           </a:p>
@@ -7280,7 +7280,7 @@
           <a:p>
             <a:fld id="{78C97017-6FC3-485B-9764-EAC9E56C1D49}" type="datetimeFigureOut">
               <a:rPr lang="en-US" smtClean="0"/>
-              <a:t>4/13/19</a:t>
+              <a:t>4/14/19</a:t>
             </a:fld>
             <a:endParaRPr lang="en-US" dirty="0"/>
           </a:p>
@@ -7375,7 +7375,7 @@
           <a:p>
             <a:fld id="{78C97017-6FC3-485B-9764-EAC9E56C1D49}" type="datetimeFigureOut">
               <a:rPr lang="en-US" smtClean="0"/>
-              <a:t>4/13/19</a:t>
+              <a:t>4/14/19</a:t>
             </a:fld>
             <a:endParaRPr lang="en-US" dirty="0"/>
           </a:p>
@@ -7650,7 +7650,7 @@
           <a:p>
             <a:fld id="{78C97017-6FC3-485B-9764-EAC9E56C1D49}" type="datetimeFigureOut">
               <a:rPr lang="en-US" smtClean="0"/>
-              <a:t>4/13/19</a:t>
+              <a:t>4/14/19</a:t>
             </a:fld>
             <a:endParaRPr lang="en-US" dirty="0"/>
           </a:p>
@@ -7902,7 +7902,7 @@
           <a:p>
             <a:fld id="{78C97017-6FC3-485B-9764-EAC9E56C1D49}" type="datetimeFigureOut">
               <a:rPr lang="en-US" smtClean="0"/>
-              <a:t>4/13/19</a:t>
+              <a:t>4/14/19</a:t>
             </a:fld>
             <a:endParaRPr lang="en-US" dirty="0"/>
           </a:p>
@@ -8113,7 +8113,7 @@
           <a:p>
             <a:fld id="{78C97017-6FC3-485B-9764-EAC9E56C1D49}" type="datetimeFigureOut">
               <a:rPr lang="en-US" smtClean="0"/>
-              <a:t>4/13/19</a:t>
+              <a:t>4/14/19</a:t>
             </a:fld>
             <a:endParaRPr lang="en-US" dirty="0"/>
           </a:p>
@@ -8490,10 +8490,10 @@
       </p:grpSpPr>
       <p:sp>
         <p:nvSpPr>
-          <p:cNvPr id="310" name="Rectangle 65">
+          <p:cNvPr id="311" name="Rectangle 65">
             <a:extLst>
               <a:ext uri="{FF2B5EF4-FFF2-40B4-BE49-F238E27FC236}">
-                <a16:creationId xmlns:a16="http://schemas.microsoft.com/office/drawing/2014/main" id="{5E58210E-EA0D-6547-A80D-206818825003}"/>
+                <a16:creationId xmlns:a16="http://schemas.microsoft.com/office/drawing/2014/main" id="{F7150F8E-BFAC-5A45-90A9-8FD08ACD1385}"/>
               </a:ext>
             </a:extLst>
           </p:cNvPr>
@@ -8502,12 +8502,12 @@
         </p:nvSpPr>
         <p:spPr>
           <a:xfrm>
-            <a:off x="10925392" y="486137"/>
-            <a:ext cx="3323214" cy="11880226"/>
+            <a:off x="10789920" y="486137"/>
+            <a:ext cx="3458686" cy="11755393"/>
           </a:xfrm>
           <a:prstGeom prst="roundRect">
             <a:avLst>
-              <a:gd name="adj" fmla="val 3484"/>
+              <a:gd name="adj" fmla="val 9102"/>
             </a:avLst>
           </a:prstGeom>
           <a:solidFill>
@@ -8557,10 +8557,10 @@
       </p:sp>
       <p:sp>
         <p:nvSpPr>
-          <p:cNvPr id="311" name="Rectangle 65">
+          <p:cNvPr id="314" name="Rectangle 65">
             <a:extLst>
               <a:ext uri="{FF2B5EF4-FFF2-40B4-BE49-F238E27FC236}">
-                <a16:creationId xmlns:a16="http://schemas.microsoft.com/office/drawing/2014/main" id="{89F84CF0-49BD-F940-BD32-439635E20645}"/>
+                <a16:creationId xmlns:a16="http://schemas.microsoft.com/office/drawing/2014/main" id="{226AFE18-4160-D64A-BEB9-603A6F5DBD4C}"/>
               </a:ext>
             </a:extLst>
           </p:cNvPr>
@@ -8570,7 +8570,7 @@
         <p:spPr>
           <a:xfrm>
             <a:off x="151606" y="465600"/>
-            <a:ext cx="10566880" cy="11952542"/>
+            <a:ext cx="10566880" cy="11803950"/>
           </a:xfrm>
           <a:prstGeom prst="roundRect">
             <a:avLst>
@@ -8624,6 +8624,46 @@
       </p:sp>
       <p:cxnSp>
         <p:nvCxnSpPr>
+          <p:cNvPr id="37" name="Straight Arrow Connector 36"/>
+          <p:cNvCxnSpPr>
+            <a:cxnSpLocks/>
+          </p:cNvCxnSpPr>
+          <p:nvPr/>
+        </p:nvCxnSpPr>
+        <p:spPr>
+          <a:xfrm>
+            <a:off x="998295" y="3624845"/>
+            <a:ext cx="1421055" cy="0"/>
+          </a:xfrm>
+          <a:prstGeom prst="straightConnector1">
+            <a:avLst/>
+          </a:prstGeom>
+          <a:ln w="19050">
+            <a:solidFill>
+              <a:schemeClr val="accent1"/>
+            </a:solidFill>
+            <a:prstDash val="sysDash"/>
+            <a:headEnd type="arrow" w="med" len="med"/>
+            <a:tailEnd type="none" w="med" len="med"/>
+          </a:ln>
+        </p:spPr>
+        <p:style>
+          <a:lnRef idx="1">
+            <a:schemeClr val="accent1"/>
+          </a:lnRef>
+          <a:fillRef idx="0">
+            <a:schemeClr val="accent1"/>
+          </a:fillRef>
+          <a:effectRef idx="0">
+            <a:schemeClr val="accent1"/>
+          </a:effectRef>
+          <a:fontRef idx="minor">
+            <a:schemeClr val="tx1"/>
+          </a:fontRef>
+        </p:style>
+      </p:cxnSp>
+      <p:cxnSp>
+        <p:nvCxnSpPr>
           <p:cNvPr id="203" name="Straight Arrow Connector 202">
             <a:extLst>
               <a:ext uri="{FF2B5EF4-FFF2-40B4-BE49-F238E27FC236}">
@@ -8638,7 +8678,7 @@
         </p:nvCxnSpPr>
         <p:spPr>
           <a:xfrm>
-            <a:off x="8898506" y="3258553"/>
+            <a:off x="8898506" y="3002075"/>
             <a:ext cx="2873914" cy="0"/>
           </a:xfrm>
           <a:prstGeom prst="straightConnector1">
@@ -8682,8 +8722,8 @@
         </p:nvSpPr>
         <p:spPr>
           <a:xfrm>
-            <a:off x="310589" y="9656133"/>
-            <a:ext cx="13379472" cy="2354915"/>
+            <a:off x="305946" y="9499600"/>
+            <a:ext cx="13384115" cy="2511448"/>
           </a:xfrm>
           <a:prstGeom prst="roundRect">
             <a:avLst>
@@ -8746,8 +8786,8 @@
         </p:nvSpPr>
         <p:spPr>
           <a:xfrm>
-            <a:off x="310430" y="7281986"/>
-            <a:ext cx="13379630" cy="2374669"/>
+            <a:off x="304800" y="6671656"/>
+            <a:ext cx="13385260" cy="2829135"/>
           </a:xfrm>
           <a:prstGeom prst="roundRect">
             <a:avLst>
@@ -8796,154 +8836,6 @@
           </a:p>
         </p:txBody>
       </p:sp>
-      <p:grpSp>
-        <p:nvGrpSpPr>
-          <p:cNvPr id="261" name="Group 260">
-            <a:extLst>
-              <a:ext uri="{FF2B5EF4-FFF2-40B4-BE49-F238E27FC236}">
-                <a16:creationId xmlns:a16="http://schemas.microsoft.com/office/drawing/2014/main" id="{4E540001-09D7-D44C-8AD7-086DA0DB42CF}"/>
-              </a:ext>
-            </a:extLst>
-          </p:cNvPr>
-          <p:cNvGrpSpPr/>
-          <p:nvPr/>
-        </p:nvGrpSpPr>
-        <p:grpSpPr>
-          <a:xfrm>
-            <a:off x="313627" y="7272358"/>
-            <a:ext cx="697824" cy="436426"/>
-            <a:chOff x="345357" y="4383603"/>
-            <a:chExt cx="628547" cy="393099"/>
-          </a:xfrm>
-        </p:grpSpPr>
-        <p:cxnSp>
-          <p:nvCxnSpPr>
-            <p:cNvPr id="262" name="Straight Connector 261">
-              <a:extLst>
-                <a:ext uri="{FF2B5EF4-FFF2-40B4-BE49-F238E27FC236}">
-                  <a16:creationId xmlns:a16="http://schemas.microsoft.com/office/drawing/2014/main" id="{FE9CF7FB-DDC0-2F43-A761-DAA2226178B6}"/>
-                </a:ext>
-              </a:extLst>
-            </p:cNvPr>
-            <p:cNvCxnSpPr/>
-            <p:nvPr/>
-          </p:nvCxnSpPr>
-          <p:spPr>
-            <a:xfrm>
-              <a:off x="345357" y="4776702"/>
-              <a:ext cx="548405" cy="0"/>
-            </a:xfrm>
-            <a:prstGeom prst="line">
-              <a:avLst/>
-            </a:prstGeom>
-            <a:ln>
-              <a:solidFill>
-                <a:schemeClr val="tx1"/>
-              </a:solidFill>
-            </a:ln>
-          </p:spPr>
-          <p:style>
-            <a:lnRef idx="1">
-              <a:schemeClr val="accent1"/>
-            </a:lnRef>
-            <a:fillRef idx="0">
-              <a:schemeClr val="accent1"/>
-            </a:fillRef>
-            <a:effectRef idx="0">
-              <a:schemeClr val="accent1"/>
-            </a:effectRef>
-            <a:fontRef idx="minor">
-              <a:schemeClr val="tx1"/>
-            </a:fontRef>
-          </p:style>
-        </p:cxnSp>
-        <p:cxnSp>
-          <p:nvCxnSpPr>
-            <p:cNvPr id="263" name="Straight Connector 262">
-              <a:extLst>
-                <a:ext uri="{FF2B5EF4-FFF2-40B4-BE49-F238E27FC236}">
-                  <a16:creationId xmlns:a16="http://schemas.microsoft.com/office/drawing/2014/main" id="{344A2925-A1AC-EA4F-8694-9C70EA80313B}"/>
-                </a:ext>
-              </a:extLst>
-            </p:cNvPr>
-            <p:cNvCxnSpPr>
-              <a:cxnSpLocks/>
-            </p:cNvCxnSpPr>
-            <p:nvPr/>
-          </p:nvCxnSpPr>
-          <p:spPr>
-            <a:xfrm flipV="1">
-              <a:off x="893762" y="4670553"/>
-              <a:ext cx="80142" cy="106149"/>
-            </a:xfrm>
-            <a:prstGeom prst="line">
-              <a:avLst/>
-            </a:prstGeom>
-            <a:ln>
-              <a:solidFill>
-                <a:schemeClr val="tx1"/>
-              </a:solidFill>
-            </a:ln>
-          </p:spPr>
-          <p:style>
-            <a:lnRef idx="1">
-              <a:schemeClr val="accent1"/>
-            </a:lnRef>
-            <a:fillRef idx="0">
-              <a:schemeClr val="accent1"/>
-            </a:fillRef>
-            <a:effectRef idx="0">
-              <a:schemeClr val="accent1"/>
-            </a:effectRef>
-            <a:fontRef idx="minor">
-              <a:schemeClr val="tx1"/>
-            </a:fontRef>
-          </p:style>
-        </p:cxnSp>
-        <p:cxnSp>
-          <p:nvCxnSpPr>
-            <p:cNvPr id="264" name="Straight Connector 263">
-              <a:extLst>
-                <a:ext uri="{FF2B5EF4-FFF2-40B4-BE49-F238E27FC236}">
-                  <a16:creationId xmlns:a16="http://schemas.microsoft.com/office/drawing/2014/main" id="{2CFC48A6-29E4-0147-A293-39025BF73716}"/>
-                </a:ext>
-              </a:extLst>
-            </p:cNvPr>
-            <p:cNvCxnSpPr>
-              <a:cxnSpLocks/>
-            </p:cNvCxnSpPr>
-            <p:nvPr/>
-          </p:nvCxnSpPr>
-          <p:spPr>
-            <a:xfrm flipV="1">
-              <a:off x="969962" y="4383603"/>
-              <a:ext cx="0" cy="286950"/>
-            </a:xfrm>
-            <a:prstGeom prst="line">
-              <a:avLst/>
-            </a:prstGeom>
-            <a:ln>
-              <a:solidFill>
-                <a:schemeClr val="tx1"/>
-              </a:solidFill>
-            </a:ln>
-          </p:spPr>
-          <p:style>
-            <a:lnRef idx="1">
-              <a:schemeClr val="accent1"/>
-            </a:lnRef>
-            <a:fillRef idx="0">
-              <a:schemeClr val="accent1"/>
-            </a:fillRef>
-            <a:effectRef idx="0">
-              <a:schemeClr val="accent1"/>
-            </a:effectRef>
-            <a:fontRef idx="minor">
-              <a:schemeClr val="tx1"/>
-            </a:fontRef>
-          </p:style>
-        </p:cxnSp>
-      </p:grpSp>
       <p:sp>
         <p:nvSpPr>
           <p:cNvPr id="257" name="Rectangle 65">
@@ -8958,8 +8850,8 @@
         </p:nvSpPr>
         <p:spPr>
           <a:xfrm>
-            <a:off x="313530" y="4256174"/>
-            <a:ext cx="13376530" cy="3025412"/>
+            <a:off x="303650" y="3962401"/>
+            <a:ext cx="13386410" cy="2708564"/>
           </a:xfrm>
           <a:prstGeom prst="roundRect">
             <a:avLst>
@@ -9022,7 +8914,7 @@
         </p:nvSpPr>
         <p:spPr>
           <a:xfrm>
-            <a:off x="371143" y="8416864"/>
+            <a:off x="371143" y="8261000"/>
             <a:ext cx="2371754" cy="369332"/>
           </a:xfrm>
           <a:prstGeom prst="rect">
@@ -9065,7 +8957,7 @@
             <a:pPr algn="l"/>
             <a:r>
               <a:rPr lang="en-US" sz="1200" dirty="0" err="1"/>
-              <a:t>optionalName.isPresent</a:t>
+              <a:t>optionalNameSet.isPresent</a:t>
             </a:r>
             <a:r>
               <a:rPr lang="en-US" sz="1200" dirty="0"/>
@@ -9074,154 +8966,6 @@
           </a:p>
         </p:txBody>
       </p:sp>
-      <p:grpSp>
-        <p:nvGrpSpPr>
-          <p:cNvPr id="104" name="Group 103">
-            <a:extLst>
-              <a:ext uri="{FF2B5EF4-FFF2-40B4-BE49-F238E27FC236}">
-                <a16:creationId xmlns:a16="http://schemas.microsoft.com/office/drawing/2014/main" id="{B8741296-5E09-854D-AF33-F1D0D2DEAC24}"/>
-              </a:ext>
-            </a:extLst>
-          </p:cNvPr>
-          <p:cNvGrpSpPr/>
-          <p:nvPr/>
-        </p:nvGrpSpPr>
-        <p:grpSpPr>
-          <a:xfrm>
-            <a:off x="325569" y="4253911"/>
-            <a:ext cx="697824" cy="436426"/>
-            <a:chOff x="345357" y="4383603"/>
-            <a:chExt cx="628547" cy="393099"/>
-          </a:xfrm>
-        </p:grpSpPr>
-        <p:cxnSp>
-          <p:nvCxnSpPr>
-            <p:cNvPr id="105" name="Straight Connector 104">
-              <a:extLst>
-                <a:ext uri="{FF2B5EF4-FFF2-40B4-BE49-F238E27FC236}">
-                  <a16:creationId xmlns:a16="http://schemas.microsoft.com/office/drawing/2014/main" id="{6C5F1E75-3006-6E47-84E4-E47E01FA8B21}"/>
-                </a:ext>
-              </a:extLst>
-            </p:cNvPr>
-            <p:cNvCxnSpPr/>
-            <p:nvPr/>
-          </p:nvCxnSpPr>
-          <p:spPr>
-            <a:xfrm>
-              <a:off x="345357" y="4776702"/>
-              <a:ext cx="548405" cy="0"/>
-            </a:xfrm>
-            <a:prstGeom prst="line">
-              <a:avLst/>
-            </a:prstGeom>
-            <a:ln>
-              <a:solidFill>
-                <a:schemeClr val="tx1"/>
-              </a:solidFill>
-            </a:ln>
-          </p:spPr>
-          <p:style>
-            <a:lnRef idx="1">
-              <a:schemeClr val="accent1"/>
-            </a:lnRef>
-            <a:fillRef idx="0">
-              <a:schemeClr val="accent1"/>
-            </a:fillRef>
-            <a:effectRef idx="0">
-              <a:schemeClr val="accent1"/>
-            </a:effectRef>
-            <a:fontRef idx="minor">
-              <a:schemeClr val="tx1"/>
-            </a:fontRef>
-          </p:style>
-        </p:cxnSp>
-        <p:cxnSp>
-          <p:nvCxnSpPr>
-            <p:cNvPr id="106" name="Straight Connector 105">
-              <a:extLst>
-                <a:ext uri="{FF2B5EF4-FFF2-40B4-BE49-F238E27FC236}">
-                  <a16:creationId xmlns:a16="http://schemas.microsoft.com/office/drawing/2014/main" id="{C1EB50F0-812B-2E49-AC35-8F4EE1D29A4E}"/>
-                </a:ext>
-              </a:extLst>
-            </p:cNvPr>
-            <p:cNvCxnSpPr>
-              <a:cxnSpLocks/>
-            </p:cNvCxnSpPr>
-            <p:nvPr/>
-          </p:nvCxnSpPr>
-          <p:spPr>
-            <a:xfrm flipV="1">
-              <a:off x="893762" y="4670553"/>
-              <a:ext cx="80142" cy="106149"/>
-            </a:xfrm>
-            <a:prstGeom prst="line">
-              <a:avLst/>
-            </a:prstGeom>
-            <a:ln>
-              <a:solidFill>
-                <a:schemeClr val="tx1"/>
-              </a:solidFill>
-            </a:ln>
-          </p:spPr>
-          <p:style>
-            <a:lnRef idx="1">
-              <a:schemeClr val="accent1"/>
-            </a:lnRef>
-            <a:fillRef idx="0">
-              <a:schemeClr val="accent1"/>
-            </a:fillRef>
-            <a:effectRef idx="0">
-              <a:schemeClr val="accent1"/>
-            </a:effectRef>
-            <a:fontRef idx="minor">
-              <a:schemeClr val="tx1"/>
-            </a:fontRef>
-          </p:style>
-        </p:cxnSp>
-        <p:cxnSp>
-          <p:nvCxnSpPr>
-            <p:cNvPr id="107" name="Straight Connector 106">
-              <a:extLst>
-                <a:ext uri="{FF2B5EF4-FFF2-40B4-BE49-F238E27FC236}">
-                  <a16:creationId xmlns:a16="http://schemas.microsoft.com/office/drawing/2014/main" id="{B1AEAA17-5F48-6140-AE7B-5B21B1B1210D}"/>
-                </a:ext>
-              </a:extLst>
-            </p:cNvPr>
-            <p:cNvCxnSpPr>
-              <a:cxnSpLocks/>
-            </p:cNvCxnSpPr>
-            <p:nvPr/>
-          </p:nvCxnSpPr>
-          <p:spPr>
-            <a:xfrm flipV="1">
-              <a:off x="969962" y="4383603"/>
-              <a:ext cx="0" cy="286950"/>
-            </a:xfrm>
-            <a:prstGeom prst="line">
-              <a:avLst/>
-            </a:prstGeom>
-            <a:ln>
-              <a:solidFill>
-                <a:schemeClr val="tx1"/>
-              </a:solidFill>
-            </a:ln>
-          </p:spPr>
-          <p:style>
-            <a:lnRef idx="1">
-              <a:schemeClr val="accent1"/>
-            </a:lnRef>
-            <a:fillRef idx="0">
-              <a:schemeClr val="accent1"/>
-            </a:fillRef>
-            <a:effectRef idx="0">
-              <a:schemeClr val="accent1"/>
-            </a:effectRef>
-            <a:fontRef idx="minor">
-              <a:schemeClr val="tx1"/>
-            </a:fontRef>
-          </p:style>
-        </p:cxnSp>
-      </p:grpSp>
       <p:sp>
         <p:nvSpPr>
           <p:cNvPr id="108" name="TextBox 107">
@@ -9236,7 +8980,7 @@
         </p:nvSpPr>
         <p:spPr>
           <a:xfrm>
-            <a:off x="371143" y="5325247"/>
+            <a:off x="371143" y="5055083"/>
             <a:ext cx="2635638" cy="369332"/>
           </a:xfrm>
           <a:prstGeom prst="rect">
@@ -9275,7 +9019,7 @@
             <a:pPr algn="l"/>
             <a:r>
               <a:rPr lang="en-US" sz="1200" dirty="0" err="1"/>
-              <a:t>optionalName.isPresent</a:t>
+              <a:t>optionalNameSet.isPresent</a:t>
             </a:r>
             <a:r>
               <a:rPr lang="en-US" sz="1200" dirty="0"/>
@@ -9299,7 +9043,7 @@
         <p:spPr>
           <a:xfrm>
             <a:off x="304847" y="971169"/>
-            <a:ext cx="13383849" cy="3287185"/>
+            <a:ext cx="13383849" cy="2991231"/>
           </a:xfrm>
           <a:prstGeom prst="roundRect">
             <a:avLst>
@@ -9366,7 +9110,7 @@
         </p:nvCxnSpPr>
         <p:spPr>
           <a:xfrm>
-            <a:off x="8838127" y="2294505"/>
+            <a:off x="8838127" y="2038027"/>
             <a:ext cx="0" cy="1669993"/>
           </a:xfrm>
           <a:prstGeom prst="line">
@@ -9443,7 +9187,7 @@
         <p:spPr>
           <a:xfrm>
             <a:off x="2330537" y="1329501"/>
-            <a:ext cx="185775" cy="2555840"/>
+            <a:ext cx="185775" cy="2299524"/>
           </a:xfrm>
           <a:prstGeom prst="rect">
             <a:avLst/>
@@ -9489,8 +9233,8 @@
         </p:nvSpPr>
         <p:spPr>
           <a:xfrm>
-            <a:off x="3969244" y="560574"/>
-            <a:ext cx="2376693" cy="274320"/>
+            <a:off x="3969244" y="563622"/>
+            <a:ext cx="2376693" cy="234000"/>
           </a:xfrm>
           <a:prstGeom prst="rect">
             <a:avLst/>
@@ -9530,15 +9274,7 @@
                   <a:schemeClr val="bg1"/>
                 </a:solidFill>
               </a:rPr>
-              <a:t>:Address</a:t>
-            </a:r>
-            <a:r>
-              <a:rPr lang="en-US" sz="1600" dirty="0" err="1">
-                <a:solidFill>
-                  <a:schemeClr val="bg1"/>
-                </a:solidFill>
-              </a:rPr>
-              <a:t>BookParser</a:t>
+              <a:t>:BattleshipParser</a:t>
             </a:r>
             <a:endParaRPr lang="en-SG" sz="1600" dirty="0">
               <a:solidFill>
@@ -9596,7 +9332,7 @@
         <p:spPr>
           <a:xfrm>
             <a:off x="5027507" y="1379237"/>
-            <a:ext cx="171427" cy="1087660"/>
+            <a:ext cx="171427" cy="830563"/>
           </a:xfrm>
           <a:prstGeom prst="rect">
             <a:avLst/>
@@ -9645,8 +9381,8 @@
         </p:nvCxnSpPr>
         <p:spPr>
           <a:xfrm>
-            <a:off x="6843799" y="1724005"/>
-            <a:ext cx="0" cy="10163822"/>
+            <a:off x="6843801" y="1597398"/>
+            <a:ext cx="0" cy="10259322"/>
           </a:xfrm>
           <a:prstGeom prst="line">
             <a:avLst/>
@@ -9674,53 +9410,6 @@
           </a:fontRef>
         </p:style>
       </p:cxnSp>
-      <p:sp>
-        <p:nvSpPr>
-          <p:cNvPr id="21" name="Rectangle 20"/>
-          <p:cNvSpPr/>
-          <p:nvPr/>
-        </p:nvSpPr>
-        <p:spPr>
-          <a:xfrm>
-            <a:off x="6759202" y="1724006"/>
-            <a:ext cx="169197" cy="179979"/>
-          </a:xfrm>
-          <a:prstGeom prst="rect">
-            <a:avLst/>
-          </a:prstGeom>
-          <a:solidFill>
-            <a:srgbClr val="0070C0"/>
-          </a:solidFill>
-          <a:ln>
-            <a:solidFill>
-              <a:srgbClr val="0070C0"/>
-            </a:solidFill>
-          </a:ln>
-          <a:effectLst/>
-        </p:spPr>
-        <p:style>
-          <a:lnRef idx="1">
-            <a:schemeClr val="accent3"/>
-          </a:lnRef>
-          <a:fillRef idx="2">
-            <a:schemeClr val="accent3"/>
-          </a:fillRef>
-          <a:effectRef idx="1">
-            <a:schemeClr val="accent3"/>
-          </a:effectRef>
-          <a:fontRef idx="minor">
-            <a:schemeClr val="dk1"/>
-          </a:fontRef>
-        </p:style>
-        <p:txBody>
-          <a:bodyPr rtlCol="0" anchor="ctr"/>
-          <a:lstStyle/>
-          <a:p>
-            <a:pPr algn="ctr"/>
-            <a:endParaRPr lang="en-SG" sz="1400" dirty="0"/>
-          </a:p>
-        </p:txBody>
-      </p:sp>
       <p:cxnSp>
         <p:nvCxnSpPr>
           <p:cNvPr id="23" name="Straight Arrow Connector 22"/>
@@ -9793,44 +9482,6 @@
           </a:p>
         </p:txBody>
       </p:sp>
-      <p:cxnSp>
-        <p:nvCxnSpPr>
-          <p:cNvPr id="28" name="Straight Arrow Connector 27"/>
-          <p:cNvCxnSpPr>
-            <a:cxnSpLocks/>
-          </p:cNvCxnSpPr>
-          <p:nvPr/>
-        </p:nvCxnSpPr>
-        <p:spPr>
-          <a:xfrm>
-            <a:off x="5125020" y="1583926"/>
-            <a:ext cx="833688" cy="1"/>
-          </a:xfrm>
-          <a:prstGeom prst="straightConnector1">
-            <a:avLst/>
-          </a:prstGeom>
-          <a:ln w="19050">
-            <a:solidFill>
-              <a:srgbClr val="0070C0"/>
-            </a:solidFill>
-            <a:tailEnd type="arrow"/>
-          </a:ln>
-        </p:spPr>
-        <p:style>
-          <a:lnRef idx="1">
-            <a:schemeClr val="accent1"/>
-          </a:lnRef>
-          <a:fillRef idx="0">
-            <a:schemeClr val="accent1"/>
-          </a:fillRef>
-          <a:effectRef idx="0">
-            <a:schemeClr val="accent1"/>
-          </a:effectRef>
-          <a:fontRef idx="minor">
-            <a:schemeClr val="tx1"/>
-          </a:fontRef>
-        </p:style>
-      </p:cxnSp>
       <p:sp>
         <p:nvSpPr>
           <p:cNvPr id="29" name="TextBox 28"/>
@@ -9839,7 +9490,7 @@
         </p:nvSpPr>
         <p:spPr>
           <a:xfrm>
-            <a:off x="3762841" y="2469174"/>
+            <a:off x="3762841" y="2212696"/>
             <a:ext cx="950133" cy="169277"/>
           </a:xfrm>
           <a:prstGeom prst="rect">
@@ -9874,46 +9525,6 @@
       </p:sp>
       <p:cxnSp>
         <p:nvCxnSpPr>
-          <p:cNvPr id="34" name="Straight Arrow Connector 33"/>
-          <p:cNvCxnSpPr>
-            <a:cxnSpLocks/>
-          </p:cNvCxnSpPr>
-          <p:nvPr/>
-        </p:nvCxnSpPr>
-        <p:spPr>
-          <a:xfrm>
-            <a:off x="5175326" y="1898091"/>
-            <a:ext cx="1570301" cy="0"/>
-          </a:xfrm>
-          <a:prstGeom prst="straightConnector1">
-            <a:avLst/>
-          </a:prstGeom>
-          <a:ln w="19050">
-            <a:solidFill>
-              <a:srgbClr val="0070C0"/>
-            </a:solidFill>
-            <a:prstDash val="sysDash"/>
-            <a:headEnd type="arrow" w="med" len="med"/>
-            <a:tailEnd type="none" w="med" len="med"/>
-          </a:ln>
-        </p:spPr>
-        <p:style>
-          <a:lnRef idx="1">
-            <a:schemeClr val="accent1"/>
-          </a:lnRef>
-          <a:fillRef idx="0">
-            <a:schemeClr val="accent1"/>
-          </a:fillRef>
-          <a:effectRef idx="0">
-            <a:schemeClr val="accent1"/>
-          </a:effectRef>
-          <a:fontRef idx="minor">
-            <a:schemeClr val="tx1"/>
-          </a:fontRef>
-        </p:style>
-      </p:cxnSp>
-      <p:cxnSp>
-        <p:nvCxnSpPr>
           <p:cNvPr id="35" name="Straight Arrow Connector 34"/>
           <p:cNvCxnSpPr>
             <a:cxnSpLocks/>
@@ -9922,8 +9533,8 @@
         </p:nvCxnSpPr>
         <p:spPr>
           <a:xfrm>
-            <a:off x="2506948" y="2459794"/>
-            <a:ext cx="2520565" cy="0"/>
+            <a:off x="2506948" y="2203316"/>
+            <a:ext cx="2617502" cy="0"/>
           </a:xfrm>
           <a:prstGeom prst="straightConnector1">
             <a:avLst/>
@@ -9931,46 +9542,6 @@
           <a:ln w="19050">
             <a:solidFill>
               <a:srgbClr val="0070C0"/>
-            </a:solidFill>
-            <a:prstDash val="sysDash"/>
-            <a:headEnd type="arrow" w="med" len="med"/>
-            <a:tailEnd type="none" w="med" len="med"/>
-          </a:ln>
-        </p:spPr>
-        <p:style>
-          <a:lnRef idx="1">
-            <a:schemeClr val="accent1"/>
-          </a:lnRef>
-          <a:fillRef idx="0">
-            <a:schemeClr val="accent1"/>
-          </a:fillRef>
-          <a:effectRef idx="0">
-            <a:schemeClr val="accent1"/>
-          </a:effectRef>
-          <a:fontRef idx="minor">
-            <a:schemeClr val="tx1"/>
-          </a:fontRef>
-        </p:style>
-      </p:cxnSp>
-      <p:cxnSp>
-        <p:nvCxnSpPr>
-          <p:cNvPr id="37" name="Straight Arrow Connector 36"/>
-          <p:cNvCxnSpPr>
-            <a:cxnSpLocks/>
-          </p:cNvCxnSpPr>
-          <p:nvPr/>
-        </p:nvCxnSpPr>
-        <p:spPr>
-          <a:xfrm>
-            <a:off x="998295" y="3881323"/>
-            <a:ext cx="1327877" cy="0"/>
-          </a:xfrm>
-          <a:prstGeom prst="straightConnector1">
-            <a:avLst/>
-          </a:prstGeom>
-          <a:ln w="19050">
-            <a:solidFill>
-              <a:schemeClr val="accent1"/>
             </a:solidFill>
             <a:prstDash val="sysDash"/>
             <a:headEnd type="arrow" w="med" len="med"/>
@@ -10045,8 +9616,8 @@
         </p:nvSpPr>
         <p:spPr>
           <a:xfrm>
-            <a:off x="11141800" y="2095925"/>
-            <a:ext cx="1204331" cy="318970"/>
+            <a:off x="11141800" y="1839447"/>
+            <a:ext cx="1204331" cy="237600"/>
           </a:xfrm>
           <a:prstGeom prst="rect">
             <a:avLst/>
@@ -10145,7 +9716,7 @@
         </p:nvCxnSpPr>
         <p:spPr>
           <a:xfrm>
-            <a:off x="8798137" y="2702541"/>
+            <a:off x="8798137" y="2446063"/>
             <a:ext cx="2862354" cy="0"/>
           </a:xfrm>
           <a:prstGeom prst="straightConnector1">
@@ -10173,89 +9744,6 @@
           </a:fontRef>
         </p:style>
       </p:cxnSp>
-      <p:sp>
-        <p:nvSpPr>
-          <p:cNvPr id="19" name="Rectangle 62"/>
-          <p:cNvSpPr/>
-          <p:nvPr/>
-        </p:nvSpPr>
-        <p:spPr>
-          <a:xfrm>
-            <a:off x="5958715" y="1109599"/>
-            <a:ext cx="1787271" cy="642770"/>
-          </a:xfrm>
-          <a:prstGeom prst="rect">
-            <a:avLst/>
-          </a:prstGeom>
-          <a:solidFill>
-            <a:srgbClr val="0070C0"/>
-          </a:solidFill>
-          <a:ln w="19050">
-            <a:solidFill>
-              <a:srgbClr val="0070C0"/>
-            </a:solidFill>
-          </a:ln>
-          <a:effectLst/>
-        </p:spPr>
-        <p:style>
-          <a:lnRef idx="1">
-            <a:schemeClr val="accent2"/>
-          </a:lnRef>
-          <a:fillRef idx="2">
-            <a:schemeClr val="accent2"/>
-          </a:fillRef>
-          <a:effectRef idx="1">
-            <a:schemeClr val="accent2"/>
-          </a:effectRef>
-          <a:fontRef idx="minor">
-            <a:schemeClr val="dk1"/>
-          </a:fontRef>
-        </p:style>
-        <p:txBody>
-          <a:bodyPr rtlCol="0" anchor="ctr"/>
-          <a:lstStyle/>
-          <a:p>
-            <a:pPr algn="ctr"/>
-            <a:r>
-              <a:rPr lang="en-US" sz="1600" dirty="0">
-                <a:solidFill>
-                  <a:schemeClr val="bg1"/>
-                </a:solidFill>
-              </a:rPr>
-              <a:t>:</a:t>
-            </a:r>
-            <a:r>
-              <a:rPr lang="en-US" sz="1600" dirty="0" err="1">
-                <a:solidFill>
-                  <a:schemeClr val="bg1"/>
-                </a:solidFill>
-              </a:rPr>
-              <a:t>ListCommand</a:t>
-            </a:r>
-            <a:endParaRPr lang="en-US" sz="1600" dirty="0">
-              <a:solidFill>
-                <a:schemeClr val="bg1"/>
-              </a:solidFill>
-            </a:endParaRPr>
-          </a:p>
-          <a:p>
-            <a:pPr algn="ctr"/>
-            <a:r>
-              <a:rPr lang="en-US" sz="1600" dirty="0">
-                <a:solidFill>
-                  <a:schemeClr val="bg1"/>
-                </a:solidFill>
-              </a:rPr>
-              <a:t>Parser</a:t>
-            </a:r>
-            <a:endParaRPr lang="en-SG" sz="1600" dirty="0">
-              <a:solidFill>
-                <a:schemeClr val="bg1"/>
-              </a:solidFill>
-            </a:endParaRPr>
-          </a:p>
-        </p:txBody>
-      </p:sp>
       <p:cxnSp>
         <p:nvCxnSpPr>
           <p:cNvPr id="66" name="Straight Arrow Connector 65">
@@ -10272,7 +9760,7 @@
         </p:nvCxnSpPr>
         <p:spPr>
           <a:xfrm>
-            <a:off x="2391334" y="2641787"/>
+            <a:off x="2391334" y="2385309"/>
             <a:ext cx="6361829" cy="0"/>
           </a:xfrm>
           <a:prstGeom prst="straightConnector1">
@@ -10410,7 +9898,7 @@
         </p:nvCxnSpPr>
         <p:spPr>
           <a:xfrm>
-            <a:off x="11816140" y="2707637"/>
+            <a:off x="11816140" y="2451159"/>
             <a:ext cx="80976" cy="122037"/>
           </a:xfrm>
           <a:prstGeom prst="curvedConnector3">
@@ -10456,7 +9944,7 @@
         </p:nvCxnSpPr>
         <p:spPr>
           <a:xfrm flipV="1">
-            <a:off x="5198526" y="2142612"/>
+            <a:off x="5198526" y="1886134"/>
             <a:ext cx="1568952" cy="1"/>
           </a:xfrm>
           <a:prstGeom prst="straightConnector1">
@@ -10498,7 +9986,7 @@
         </p:nvSpPr>
         <p:spPr>
           <a:xfrm>
-            <a:off x="6754596" y="2140025"/>
+            <a:off x="6754596" y="1883547"/>
             <a:ext cx="173800" cy="291254"/>
           </a:xfrm>
           <a:prstGeom prst="rect">
@@ -10551,7 +10039,7 @@
         </p:nvSpPr>
         <p:spPr>
           <a:xfrm>
-            <a:off x="5333936" y="1965402"/>
+            <a:off x="5333936" y="1708924"/>
             <a:ext cx="1277245" cy="169277"/>
           </a:xfrm>
           <a:prstGeom prst="rect">
@@ -10600,7 +10088,7 @@
         </p:nvCxnSpPr>
         <p:spPr>
           <a:xfrm flipV="1">
-            <a:off x="6851446" y="2181845"/>
+            <a:off x="6851446" y="1925367"/>
             <a:ext cx="1080123" cy="1"/>
           </a:xfrm>
           <a:prstGeom prst="straightConnector1">
@@ -10644,7 +10132,7 @@
         </p:nvCxnSpPr>
         <p:spPr>
           <a:xfrm>
-            <a:off x="6903687" y="2383244"/>
+            <a:off x="6903687" y="2126766"/>
             <a:ext cx="1929131" cy="2209"/>
           </a:xfrm>
           <a:prstGeom prst="straightConnector1">
@@ -10690,7 +10178,7 @@
         </p:nvCxnSpPr>
         <p:spPr>
           <a:xfrm>
-            <a:off x="5185398" y="2432907"/>
+            <a:off x="5185398" y="2176429"/>
             <a:ext cx="1552617" cy="0"/>
           </a:xfrm>
           <a:prstGeom prst="straightConnector1">
@@ -10728,7 +10216,7 @@
         </p:nvSpPr>
         <p:spPr>
           <a:xfrm>
-            <a:off x="8750003" y="2640366"/>
+            <a:off x="8750003" y="2383888"/>
             <a:ext cx="168155" cy="1189221"/>
           </a:xfrm>
           <a:prstGeom prst="rect">
@@ -10781,7 +10269,7 @@
         </p:nvSpPr>
         <p:spPr>
           <a:xfrm>
-            <a:off x="8748219" y="2254669"/>
+            <a:off x="8748219" y="1998191"/>
             <a:ext cx="169197" cy="140852"/>
           </a:xfrm>
           <a:prstGeom prst="rect">
@@ -10834,7 +10322,7 @@
         </p:nvSpPr>
         <p:spPr>
           <a:xfrm>
-            <a:off x="7944495" y="2028998"/>
+            <a:off x="7944495" y="1772520"/>
             <a:ext cx="1787271" cy="265507"/>
           </a:xfrm>
           <a:prstGeom prst="rect">
@@ -10907,7 +10395,7 @@
         </p:nvSpPr>
         <p:spPr>
           <a:xfrm>
-            <a:off x="9059936" y="2482247"/>
+            <a:off x="9059936" y="2225769"/>
             <a:ext cx="2385953" cy="169277"/>
           </a:xfrm>
           <a:prstGeom prst="rect">
@@ -10982,7 +10470,7 @@
         </p:nvSpPr>
         <p:spPr>
           <a:xfrm>
-            <a:off x="11761034" y="2823995"/>
+            <a:off x="11761034" y="2567517"/>
             <a:ext cx="144254" cy="259472"/>
           </a:xfrm>
           <a:prstGeom prst="rect">
@@ -11037,7 +10525,7 @@
         </p:nvCxnSpPr>
         <p:spPr>
           <a:xfrm flipH="1">
-            <a:off x="11817206" y="3079941"/>
+            <a:off x="11817206" y="2823463"/>
             <a:ext cx="80994" cy="147447"/>
           </a:xfrm>
           <a:prstGeom prst="curvedConnector3">
@@ -11082,8 +10570,8 @@
         </p:nvSpPr>
         <p:spPr>
           <a:xfrm>
-            <a:off x="11624035" y="5500986"/>
-            <a:ext cx="167393" cy="923033"/>
+            <a:off x="11624035" y="5230823"/>
+            <a:ext cx="167393" cy="558438"/>
           </a:xfrm>
           <a:prstGeom prst="rect">
             <a:avLst/>
@@ -11135,7 +10623,7 @@
         </p:nvGrpSpPr>
         <p:grpSpPr>
           <a:xfrm>
-            <a:off x="8901140" y="3343102"/>
+            <a:off x="8901140" y="3086624"/>
             <a:ext cx="2300263" cy="533635"/>
             <a:chOff x="8901136" y="4535799"/>
             <a:chExt cx="2300263" cy="533635"/>
@@ -11412,7 +10900,7 @@
         </p:nvCxnSpPr>
         <p:spPr>
           <a:xfrm>
-            <a:off x="11790358" y="5500986"/>
+            <a:off x="11790358" y="5230822"/>
             <a:ext cx="80976" cy="122037"/>
           </a:xfrm>
           <a:prstGeom prst="curvedConnector3">
@@ -11456,7 +10944,7 @@
         </p:nvSpPr>
         <p:spPr>
           <a:xfrm>
-            <a:off x="11735252" y="5617346"/>
+            <a:off x="11735252" y="5347182"/>
             <a:ext cx="144254" cy="126617"/>
           </a:xfrm>
           <a:prstGeom prst="rect">
@@ -11515,7 +11003,7 @@
         </p:nvCxnSpPr>
         <p:spPr>
           <a:xfrm flipH="1">
-            <a:off x="11791424" y="5740035"/>
+            <a:off x="11791424" y="5469871"/>
             <a:ext cx="80994" cy="147447"/>
           </a:xfrm>
           <a:prstGeom prst="curvedConnector3">
@@ -11560,7 +11048,7 @@
         </p:nvSpPr>
         <p:spPr>
           <a:xfrm>
-            <a:off x="12182788" y="5345964"/>
+            <a:off x="12182788" y="5075800"/>
             <a:ext cx="1438043" cy="184666"/>
           </a:xfrm>
           <a:prstGeom prst="rect">
@@ -11595,219 +11083,7 @@
                   <a:schemeClr val="accent6"/>
                 </a:solidFill>
               </a:rPr>
-              <a:t>getByName</a:t>
-            </a:r>
-            <a:r>
-              <a:rPr lang="en-US" sz="1200" dirty="0">
-                <a:solidFill>
-                  <a:schemeClr val="accent6"/>
-                </a:solidFill>
-              </a:rPr>
-              <a:t>()</a:t>
-            </a:r>
-          </a:p>
-        </p:txBody>
-      </p:sp>
-      <p:cxnSp>
-        <p:nvCxnSpPr>
-          <p:cNvPr id="109" name="Curved Connector 108">
-            <a:extLst>
-              <a:ext uri="{FF2B5EF4-FFF2-40B4-BE49-F238E27FC236}">
-                <a16:creationId xmlns:a16="http://schemas.microsoft.com/office/drawing/2014/main" id="{FE33CCF6-752E-E24F-897A-37BBED822387}"/>
-              </a:ext>
-            </a:extLst>
-          </p:cNvPr>
-          <p:cNvCxnSpPr>
-            <a:cxnSpLocks/>
-          </p:cNvCxnSpPr>
-          <p:nvPr/>
-        </p:nvCxnSpPr>
-        <p:spPr>
-          <a:xfrm>
-            <a:off x="11792852" y="6065187"/>
-            <a:ext cx="80976" cy="122037"/>
-          </a:xfrm>
-          <a:prstGeom prst="curvedConnector3">
-            <a:avLst>
-              <a:gd name="adj1" fmla="val 395134"/>
-            </a:avLst>
-          </a:prstGeom>
-          <a:ln>
-            <a:solidFill>
-              <a:schemeClr val="accent6"/>
-            </a:solidFill>
-            <a:tailEnd type="triangle"/>
-          </a:ln>
-        </p:spPr>
-        <p:style>
-          <a:lnRef idx="1">
-            <a:schemeClr val="accent1"/>
-          </a:lnRef>
-          <a:fillRef idx="0">
-            <a:schemeClr val="accent1"/>
-          </a:fillRef>
-          <a:effectRef idx="0">
-            <a:schemeClr val="accent1"/>
-          </a:effectRef>
-          <a:fontRef idx="minor">
-            <a:schemeClr val="tx1"/>
-          </a:fontRef>
-        </p:style>
-      </p:cxnSp>
-      <p:sp>
-        <p:nvSpPr>
-          <p:cNvPr id="110" name="Rectangle 109">
-            <a:extLst>
-              <a:ext uri="{FF2B5EF4-FFF2-40B4-BE49-F238E27FC236}">
-                <a16:creationId xmlns:a16="http://schemas.microsoft.com/office/drawing/2014/main" id="{96049167-CB30-1945-91C2-386B5E94897A}"/>
-              </a:ext>
-            </a:extLst>
-          </p:cNvPr>
-          <p:cNvSpPr/>
-          <p:nvPr/>
-        </p:nvSpPr>
-        <p:spPr>
-          <a:xfrm>
-            <a:off x="11742341" y="6181548"/>
-            <a:ext cx="144254" cy="125579"/>
-          </a:xfrm>
-          <a:prstGeom prst="rect">
-            <a:avLst/>
-          </a:prstGeom>
-          <a:solidFill>
-            <a:schemeClr val="accent6"/>
-          </a:solidFill>
-          <a:ln>
-            <a:solidFill>
-              <a:schemeClr val="accent6"/>
-            </a:solidFill>
-          </a:ln>
-          <a:effectLst/>
-        </p:spPr>
-        <p:style>
-          <a:lnRef idx="1">
-            <a:schemeClr val="accent3"/>
-          </a:lnRef>
-          <a:fillRef idx="2">
-            <a:schemeClr val="accent3"/>
-          </a:fillRef>
-          <a:effectRef idx="1">
-            <a:schemeClr val="accent3"/>
-          </a:effectRef>
-          <a:fontRef idx="minor">
-            <a:schemeClr val="dk1"/>
-          </a:fontRef>
-        </p:style>
-        <p:txBody>
-          <a:bodyPr rtlCol="0" anchor="ctr"/>
-          <a:lstStyle/>
-          <a:p>
-            <a:pPr algn="ctr"/>
-            <a:endParaRPr lang="en-SG" sz="1400">
-              <a:solidFill>
-                <a:schemeClr val="accent6"/>
-              </a:solidFill>
-            </a:endParaRPr>
-          </a:p>
-        </p:txBody>
-      </p:sp>
-      <p:cxnSp>
-        <p:nvCxnSpPr>
-          <p:cNvPr id="111" name="Curved Connector 12">
-            <a:extLst>
-              <a:ext uri="{FF2B5EF4-FFF2-40B4-BE49-F238E27FC236}">
-                <a16:creationId xmlns:a16="http://schemas.microsoft.com/office/drawing/2014/main" id="{FC7AC526-E626-2747-B57C-E2F7D80E5F04}"/>
-              </a:ext>
-            </a:extLst>
-          </p:cNvPr>
-          <p:cNvCxnSpPr>
-            <a:cxnSpLocks/>
-          </p:cNvCxnSpPr>
-          <p:nvPr/>
-        </p:nvCxnSpPr>
-        <p:spPr>
-          <a:xfrm flipH="1">
-            <a:off x="11788985" y="6232735"/>
-            <a:ext cx="80994" cy="147447"/>
-          </a:xfrm>
-          <a:prstGeom prst="curvedConnector3">
-            <a:avLst>
-              <a:gd name="adj1" fmla="val -313352"/>
-            </a:avLst>
-          </a:prstGeom>
-          <a:ln>
-            <a:solidFill>
-              <a:schemeClr val="accent6"/>
-            </a:solidFill>
-            <a:prstDash val="sysDash"/>
-            <a:tailEnd type="triangle"/>
-          </a:ln>
-        </p:spPr>
-        <p:style>
-          <a:lnRef idx="1">
-            <a:schemeClr val="accent1"/>
-          </a:lnRef>
-          <a:fillRef idx="0">
-            <a:schemeClr val="accent1"/>
-          </a:fillRef>
-          <a:effectRef idx="0">
-            <a:schemeClr val="accent1"/>
-          </a:effectRef>
-          <a:fontRef idx="minor">
-            <a:schemeClr val="tx1"/>
-          </a:fontRef>
-        </p:style>
-      </p:cxnSp>
-      <p:sp>
-        <p:nvSpPr>
-          <p:cNvPr id="113" name="TextBox 112">
-            <a:extLst>
-              <a:ext uri="{FF2B5EF4-FFF2-40B4-BE49-F238E27FC236}">
-                <a16:creationId xmlns:a16="http://schemas.microsoft.com/office/drawing/2014/main" id="{B6995F6F-6B5C-4743-A3BF-4689584F0299}"/>
-              </a:ext>
-            </a:extLst>
-          </p:cNvPr>
-          <p:cNvSpPr txBox="1"/>
-          <p:nvPr/>
-        </p:nvSpPr>
-        <p:spPr>
-          <a:xfrm>
-            <a:off x="12182788" y="5930090"/>
-            <a:ext cx="1438043" cy="184666"/>
-          </a:xfrm>
-          <a:prstGeom prst="rect">
-            <a:avLst/>
-          </a:prstGeom>
-          <a:noFill/>
-          <a:ln>
-            <a:noFill/>
-          </a:ln>
-        </p:spPr>
-        <p:txBody>
-          <a:bodyPr wrap="square" lIns="0" tIns="0" rIns="0" bIns="0" rtlCol="0">
-            <a:spAutoFit/>
-          </a:bodyPr>
-          <a:lstStyle>
-            <a:defPPr>
-              <a:defRPr lang="en-US"/>
-            </a:defPPr>
-            <a:lvl1pPr algn="r">
-              <a:defRPr sz="1400">
-                <a:solidFill>
-                  <a:srgbClr val="0070C0"/>
-                </a:solidFill>
-              </a:defRPr>
-            </a:lvl1pPr>
-          </a:lstStyle>
-          <a:p>
-            <a:pPr algn="l"/>
-            <a:r>
-              <a:rPr lang="en-US" sz="1200" dirty="0" err="1">
-                <a:solidFill>
-                  <a:schemeClr val="accent6"/>
-                </a:solidFill>
-              </a:rPr>
-              <a:t>getByTags</a:t>
+              <a:t>getDeployedFleet</a:t>
             </a:r>
             <a:r>
               <a:rPr lang="en-US" sz="1200" dirty="0">
@@ -11836,7 +11112,7 @@
         </p:nvCxnSpPr>
         <p:spPr>
           <a:xfrm>
-            <a:off x="8930061" y="6419501"/>
+            <a:off x="8930061" y="5779467"/>
             <a:ext cx="2777671" cy="0"/>
           </a:xfrm>
           <a:prstGeom prst="straightConnector1">
@@ -11882,7 +11158,7 @@
         </p:nvCxnSpPr>
         <p:spPr>
           <a:xfrm>
-            <a:off x="8912642" y="5519039"/>
+            <a:off x="8912642" y="5248875"/>
             <a:ext cx="2725280" cy="0"/>
           </a:xfrm>
           <a:prstGeom prst="straightConnector1">
@@ -11924,7 +11200,7 @@
         </p:nvSpPr>
         <p:spPr>
           <a:xfrm>
-            <a:off x="11648556" y="8240896"/>
+            <a:off x="11648556" y="8085032"/>
             <a:ext cx="172940" cy="521958"/>
           </a:xfrm>
           <a:prstGeom prst="rect">
@@ -11977,7 +11253,7 @@
         </p:nvSpPr>
         <p:spPr>
           <a:xfrm>
-            <a:off x="12182788" y="8093097"/>
+            <a:off x="12182788" y="7937233"/>
             <a:ext cx="1438043" cy="184666"/>
           </a:xfrm>
           <a:prstGeom prst="rect">
@@ -12039,7 +11315,7 @@
         </p:nvSpPr>
         <p:spPr>
           <a:xfrm>
-            <a:off x="11798139" y="8409666"/>
+            <a:off x="11798139" y="8253802"/>
             <a:ext cx="144254" cy="118469"/>
           </a:xfrm>
           <a:prstGeom prst="rect">
@@ -12094,7 +11370,7 @@
         </p:nvCxnSpPr>
         <p:spPr>
           <a:xfrm flipH="1">
-            <a:off x="11819940" y="8525389"/>
+            <a:off x="11819940" y="8369525"/>
             <a:ext cx="80994" cy="147447"/>
           </a:xfrm>
           <a:prstGeom prst="curvedConnector3">
@@ -12141,7 +11417,7 @@
         </p:nvCxnSpPr>
         <p:spPr>
           <a:xfrm>
-            <a:off x="8902704" y="8758232"/>
+            <a:off x="8902704" y="8602368"/>
             <a:ext cx="2888625" cy="0"/>
           </a:xfrm>
           <a:prstGeom prst="straightConnector1">
@@ -12187,7 +11463,7 @@
         </p:nvCxnSpPr>
         <p:spPr>
           <a:xfrm>
-            <a:off x="8864604" y="8278279"/>
+            <a:off x="8864604" y="8122415"/>
             <a:ext cx="2801841" cy="0"/>
           </a:xfrm>
           <a:prstGeom prst="straightConnector1">
@@ -12215,154 +11491,6 @@
           </a:fontRef>
         </p:style>
       </p:cxnSp>
-      <p:grpSp>
-        <p:nvGrpSpPr>
-          <p:cNvPr id="160" name="Group 159">
-            <a:extLst>
-              <a:ext uri="{FF2B5EF4-FFF2-40B4-BE49-F238E27FC236}">
-                <a16:creationId xmlns:a16="http://schemas.microsoft.com/office/drawing/2014/main" id="{F3E1AB10-B658-F048-818E-354DEB69B337}"/>
-              </a:ext>
-            </a:extLst>
-          </p:cNvPr>
-          <p:cNvGrpSpPr/>
-          <p:nvPr/>
-        </p:nvGrpSpPr>
-        <p:grpSpPr>
-          <a:xfrm>
-            <a:off x="308003" y="9643402"/>
-            <a:ext cx="697824" cy="436426"/>
-            <a:chOff x="345357" y="4383603"/>
-            <a:chExt cx="628547" cy="393099"/>
-          </a:xfrm>
-        </p:grpSpPr>
-        <p:cxnSp>
-          <p:nvCxnSpPr>
-            <p:cNvPr id="161" name="Straight Connector 160">
-              <a:extLst>
-                <a:ext uri="{FF2B5EF4-FFF2-40B4-BE49-F238E27FC236}">
-                  <a16:creationId xmlns:a16="http://schemas.microsoft.com/office/drawing/2014/main" id="{0B1D54A6-1F5E-4A42-86F9-07D09B1CECA8}"/>
-                </a:ext>
-              </a:extLst>
-            </p:cNvPr>
-            <p:cNvCxnSpPr/>
-            <p:nvPr/>
-          </p:nvCxnSpPr>
-          <p:spPr>
-            <a:xfrm>
-              <a:off x="345357" y="4776702"/>
-              <a:ext cx="548405" cy="0"/>
-            </a:xfrm>
-            <a:prstGeom prst="line">
-              <a:avLst/>
-            </a:prstGeom>
-            <a:ln>
-              <a:solidFill>
-                <a:schemeClr val="tx1"/>
-              </a:solidFill>
-            </a:ln>
-          </p:spPr>
-          <p:style>
-            <a:lnRef idx="1">
-              <a:schemeClr val="accent1"/>
-            </a:lnRef>
-            <a:fillRef idx="0">
-              <a:schemeClr val="accent1"/>
-            </a:fillRef>
-            <a:effectRef idx="0">
-              <a:schemeClr val="accent1"/>
-            </a:effectRef>
-            <a:fontRef idx="minor">
-              <a:schemeClr val="tx1"/>
-            </a:fontRef>
-          </p:style>
-        </p:cxnSp>
-        <p:cxnSp>
-          <p:nvCxnSpPr>
-            <p:cNvPr id="162" name="Straight Connector 161">
-              <a:extLst>
-                <a:ext uri="{FF2B5EF4-FFF2-40B4-BE49-F238E27FC236}">
-                  <a16:creationId xmlns:a16="http://schemas.microsoft.com/office/drawing/2014/main" id="{D02B9D6E-684E-8C4B-B8E7-AAE77F27A6FC}"/>
-                </a:ext>
-              </a:extLst>
-            </p:cNvPr>
-            <p:cNvCxnSpPr>
-              <a:cxnSpLocks/>
-            </p:cNvCxnSpPr>
-            <p:nvPr/>
-          </p:nvCxnSpPr>
-          <p:spPr>
-            <a:xfrm flipV="1">
-              <a:off x="893762" y="4670553"/>
-              <a:ext cx="80142" cy="106149"/>
-            </a:xfrm>
-            <a:prstGeom prst="line">
-              <a:avLst/>
-            </a:prstGeom>
-            <a:ln>
-              <a:solidFill>
-                <a:schemeClr val="tx1"/>
-              </a:solidFill>
-            </a:ln>
-          </p:spPr>
-          <p:style>
-            <a:lnRef idx="1">
-              <a:schemeClr val="accent1"/>
-            </a:lnRef>
-            <a:fillRef idx="0">
-              <a:schemeClr val="accent1"/>
-            </a:fillRef>
-            <a:effectRef idx="0">
-              <a:schemeClr val="accent1"/>
-            </a:effectRef>
-            <a:fontRef idx="minor">
-              <a:schemeClr val="tx1"/>
-            </a:fontRef>
-          </p:style>
-        </p:cxnSp>
-        <p:cxnSp>
-          <p:nvCxnSpPr>
-            <p:cNvPr id="163" name="Straight Connector 162">
-              <a:extLst>
-                <a:ext uri="{FF2B5EF4-FFF2-40B4-BE49-F238E27FC236}">
-                  <a16:creationId xmlns:a16="http://schemas.microsoft.com/office/drawing/2014/main" id="{09CC735F-740A-DF48-ABA7-48432B4E810F}"/>
-                </a:ext>
-              </a:extLst>
-            </p:cNvPr>
-            <p:cNvCxnSpPr>
-              <a:cxnSpLocks/>
-            </p:cNvCxnSpPr>
-            <p:nvPr/>
-          </p:nvCxnSpPr>
-          <p:spPr>
-            <a:xfrm flipV="1">
-              <a:off x="969962" y="4383603"/>
-              <a:ext cx="0" cy="286950"/>
-            </a:xfrm>
-            <a:prstGeom prst="line">
-              <a:avLst/>
-            </a:prstGeom>
-            <a:ln>
-              <a:solidFill>
-                <a:schemeClr val="tx1"/>
-              </a:solidFill>
-            </a:ln>
-          </p:spPr>
-          <p:style>
-            <a:lnRef idx="1">
-              <a:schemeClr val="accent1"/>
-            </a:lnRef>
-            <a:fillRef idx="0">
-              <a:schemeClr val="accent1"/>
-            </a:fillRef>
-            <a:effectRef idx="0">
-              <a:schemeClr val="accent1"/>
-            </a:effectRef>
-            <a:fontRef idx="minor">
-              <a:schemeClr val="tx1"/>
-            </a:fontRef>
-          </p:style>
-        </p:cxnSp>
-      </p:grpSp>
       <p:sp>
         <p:nvSpPr>
           <p:cNvPr id="164" name="TextBox 163">
@@ -12420,7 +11548,7 @@
             </a:r>
             <a:r>
               <a:rPr lang="en-US" sz="1200" dirty="0" err="1"/>
-              <a:t>optionalName.isPresent</a:t>
+              <a:t>optionalNameSet.isPresent</a:t>
             </a:r>
             <a:r>
               <a:rPr lang="en-US" sz="1200" dirty="0"/>
@@ -12742,7 +11870,7 @@
         </p:nvCxnSpPr>
         <p:spPr>
           <a:xfrm>
-            <a:off x="987662" y="7115252"/>
+            <a:off x="987662" y="6475218"/>
             <a:ext cx="1494285" cy="0"/>
           </a:xfrm>
           <a:prstGeom prst="straightConnector1">
@@ -12786,7 +11914,7 @@
         </p:nvGrpSpPr>
         <p:grpSpPr>
           <a:xfrm>
-            <a:off x="1082605" y="9361706"/>
+            <a:off x="1082605" y="9205842"/>
             <a:ext cx="7677009" cy="154024"/>
             <a:chOff x="1082601" y="12161357"/>
             <a:chExt cx="7677009" cy="154024"/>
@@ -12945,7 +12073,7 @@
         </p:nvSpPr>
         <p:spPr>
           <a:xfrm>
-            <a:off x="2524057" y="4598770"/>
+            <a:off x="2524057" y="3991722"/>
             <a:ext cx="2531580" cy="169277"/>
           </a:xfrm>
           <a:prstGeom prst="rect">
@@ -12998,7 +12126,7 @@
         </p:nvCxnSpPr>
         <p:spPr>
           <a:xfrm>
-            <a:off x="2464953" y="4888708"/>
+            <a:off x="2464953" y="4175782"/>
             <a:ext cx="2577065" cy="0"/>
           </a:xfrm>
           <a:prstGeom prst="straightConnector1">
@@ -13040,8 +12168,8 @@
         </p:nvSpPr>
         <p:spPr>
           <a:xfrm>
-            <a:off x="5017224" y="4836058"/>
-            <a:ext cx="158416" cy="468090"/>
+            <a:off x="5017224" y="4138207"/>
+            <a:ext cx="158416" cy="895777"/>
           </a:xfrm>
           <a:prstGeom prst="rect">
             <a:avLst/>
@@ -13093,7 +12221,7 @@
         </p:nvSpPr>
         <p:spPr>
           <a:xfrm>
-            <a:off x="6762534" y="4936194"/>
+            <a:off x="6762534" y="4666030"/>
             <a:ext cx="162294" cy="291757"/>
           </a:xfrm>
           <a:prstGeom prst="rect">
@@ -13146,7 +12274,7 @@
         </p:nvSpPr>
         <p:spPr>
           <a:xfrm>
-            <a:off x="5062463" y="4703467"/>
+            <a:off x="5062463" y="4490453"/>
             <a:ext cx="1821074" cy="153888"/>
           </a:xfrm>
           <a:prstGeom prst="rect">
@@ -13195,7 +12323,7 @@
         </p:nvCxnSpPr>
         <p:spPr>
           <a:xfrm>
-            <a:off x="5150736" y="4939253"/>
+            <a:off x="5150736" y="4669089"/>
             <a:ext cx="1632058" cy="1"/>
           </a:xfrm>
           <a:prstGeom prst="straightConnector1">
@@ -13239,7 +12367,7 @@
         </p:nvCxnSpPr>
         <p:spPr>
           <a:xfrm>
-            <a:off x="2501815" y="3827618"/>
+            <a:off x="2501815" y="3571140"/>
             <a:ext cx="6270492" cy="0"/>
           </a:xfrm>
           <a:prstGeom prst="straightConnector1">
@@ -13283,7 +12411,7 @@
         </p:nvSpPr>
         <p:spPr>
           <a:xfrm>
-            <a:off x="8739211" y="4886147"/>
+            <a:off x="8739211" y="4615983"/>
             <a:ext cx="169197" cy="295848"/>
           </a:xfrm>
           <a:prstGeom prst="rect">
@@ -13338,7 +12466,7 @@
         </p:nvCxnSpPr>
         <p:spPr>
           <a:xfrm>
-            <a:off x="6903801" y="4987045"/>
+            <a:off x="6903801" y="4716881"/>
             <a:ext cx="1022399" cy="0"/>
           </a:xfrm>
           <a:prstGeom prst="straightConnector1">
@@ -13382,7 +12510,7 @@
         </p:nvCxnSpPr>
         <p:spPr>
           <a:xfrm>
-            <a:off x="6928350" y="5181995"/>
+            <a:off x="6928350" y="4911831"/>
             <a:ext cx="1810466" cy="0"/>
           </a:xfrm>
           <a:prstGeom prst="straightConnector1">
@@ -13428,7 +12556,7 @@
         </p:nvCxnSpPr>
         <p:spPr>
           <a:xfrm>
-            <a:off x="5170574" y="5221234"/>
+            <a:off x="5170574" y="4951070"/>
             <a:ext cx="1698168" cy="0"/>
           </a:xfrm>
           <a:prstGeom prst="straightConnector1">
@@ -13474,7 +12602,7 @@
         </p:nvCxnSpPr>
         <p:spPr>
           <a:xfrm>
-            <a:off x="2478484" y="5297053"/>
+            <a:off x="2478484" y="5026889"/>
             <a:ext cx="2690808" cy="0"/>
           </a:xfrm>
           <a:prstGeom prst="straightConnector1">
@@ -13518,8 +12646,8 @@
         </p:nvSpPr>
         <p:spPr>
           <a:xfrm>
-            <a:off x="2319974" y="4792575"/>
-            <a:ext cx="175125" cy="2330358"/>
+            <a:off x="2319974" y="4119966"/>
+            <a:ext cx="175125" cy="2357673"/>
           </a:xfrm>
           <a:prstGeom prst="rect">
             <a:avLst/>
@@ -13559,10 +12687,105 @@
       </p:sp>
       <p:sp>
         <p:nvSpPr>
-          <p:cNvPr id="226" name="Rectangle 225">
+          <p:cNvPr id="228" name="TextBox 227">
             <a:extLst>
               <a:ext uri="{FF2B5EF4-FFF2-40B4-BE49-F238E27FC236}">
-                <a16:creationId xmlns:a16="http://schemas.microsoft.com/office/drawing/2014/main" id="{DC2689C9-7155-724A-94AB-B682A14C8839}"/>
+                <a16:creationId xmlns:a16="http://schemas.microsoft.com/office/drawing/2014/main" id="{AEDAFCB4-D94D-2F4A-8B1B-C8E81D0FFBF6}"/>
+              </a:ext>
+            </a:extLst>
+          </p:cNvPr>
+          <p:cNvSpPr txBox="1"/>
+          <p:nvPr/>
+        </p:nvSpPr>
+        <p:spPr>
+          <a:xfrm>
+            <a:off x="2524057" y="6884729"/>
+            <a:ext cx="2531580" cy="169277"/>
+          </a:xfrm>
+          <a:prstGeom prst="rect">
+            <a:avLst/>
+          </a:prstGeom>
+          <a:noFill/>
+        </p:spPr>
+        <p:txBody>
+          <a:bodyPr wrap="square" lIns="0" tIns="0" rIns="0" bIns="0" rtlCol="0">
+            <a:spAutoFit/>
+          </a:bodyPr>
+          <a:lstStyle>
+            <a:defPPr>
+              <a:defRPr lang="en-US"/>
+            </a:defPPr>
+            <a:lvl1pPr algn="r">
+              <a:defRPr sz="1400">
+                <a:solidFill>
+                  <a:srgbClr val="0070C0"/>
+                </a:solidFill>
+              </a:defRPr>
+            </a:lvl1pPr>
+          </a:lstStyle>
+          <a:p>
+            <a:pPr algn="ctr"/>
+            <a:r>
+              <a:rPr lang="en-US" sz="1100" dirty="0" err="1"/>
+              <a:t>parseCommand</a:t>
+            </a:r>
+            <a:r>
+              <a:rPr lang="en-US" sz="1100" dirty="0"/>
+              <a:t>(“list n/d*)</a:t>
+            </a:r>
+          </a:p>
+        </p:txBody>
+      </p:sp>
+      <p:cxnSp>
+        <p:nvCxnSpPr>
+          <p:cNvPr id="230" name="Straight Arrow Connector 229">
+            <a:extLst>
+              <a:ext uri="{FF2B5EF4-FFF2-40B4-BE49-F238E27FC236}">
+                <a16:creationId xmlns:a16="http://schemas.microsoft.com/office/drawing/2014/main" id="{DCC676FA-6CAB-5F42-907F-B4EBD4C68095}"/>
+              </a:ext>
+            </a:extLst>
+          </p:cNvPr>
+          <p:cNvCxnSpPr>
+            <a:cxnSpLocks/>
+          </p:cNvCxnSpPr>
+          <p:nvPr/>
+        </p:nvCxnSpPr>
+        <p:spPr>
+          <a:xfrm>
+            <a:off x="2475586" y="7085020"/>
+            <a:ext cx="2582979" cy="0"/>
+          </a:xfrm>
+          <a:prstGeom prst="straightConnector1">
+            <a:avLst/>
+          </a:prstGeom>
+          <a:ln w="19050">
+            <a:solidFill>
+              <a:srgbClr val="0070C0"/>
+            </a:solidFill>
+            <a:tailEnd type="arrow"/>
+          </a:ln>
+        </p:spPr>
+        <p:style>
+          <a:lnRef idx="1">
+            <a:schemeClr val="accent1"/>
+          </a:lnRef>
+          <a:fillRef idx="0">
+            <a:schemeClr val="accent1"/>
+          </a:fillRef>
+          <a:effectRef idx="0">
+            <a:schemeClr val="accent1"/>
+          </a:effectRef>
+          <a:fontRef idx="minor">
+            <a:schemeClr val="tx1"/>
+          </a:fontRef>
+        </p:style>
+      </p:cxnSp>
+      <p:sp>
+        <p:nvSpPr>
+          <p:cNvPr id="231" name="Rectangle 230">
+            <a:extLst>
+              <a:ext uri="{FF2B5EF4-FFF2-40B4-BE49-F238E27FC236}">
+                <a16:creationId xmlns:a16="http://schemas.microsoft.com/office/drawing/2014/main" id="{B81BED4B-E7A2-3543-AE4E-EC3D74B1DC8E}"/>
               </a:ext>
             </a:extLst>
           </p:cNvPr>
@@ -13571,8 +12794,8 @@
         </p:nvSpPr>
         <p:spPr>
           <a:xfrm>
-            <a:off x="2330538" y="7617512"/>
-            <a:ext cx="190127" cy="1904021"/>
+            <a:off x="5044472" y="7073611"/>
+            <a:ext cx="166433" cy="842738"/>
           </a:xfrm>
           <a:prstGeom prst="rect">
             <a:avLst/>
@@ -13610,207 +12833,6 @@
           </a:p>
         </p:txBody>
       </p:sp>
-      <p:sp>
-        <p:nvSpPr>
-          <p:cNvPr id="227" name="Rectangle 226">
-            <a:extLst>
-              <a:ext uri="{FF2B5EF4-FFF2-40B4-BE49-F238E27FC236}">
-                <a16:creationId xmlns:a16="http://schemas.microsoft.com/office/drawing/2014/main" id="{A40D24B1-BDB2-0C4E-8301-7BB54F239B7F}"/>
-              </a:ext>
-            </a:extLst>
-          </p:cNvPr>
-          <p:cNvSpPr/>
-          <p:nvPr/>
-        </p:nvSpPr>
-        <p:spPr>
-          <a:xfrm>
-            <a:off x="2330538" y="9907312"/>
-            <a:ext cx="172557" cy="1848197"/>
-          </a:xfrm>
-          <a:prstGeom prst="rect">
-            <a:avLst/>
-          </a:prstGeom>
-          <a:solidFill>
-            <a:srgbClr val="0070C0"/>
-          </a:solidFill>
-          <a:ln>
-            <a:solidFill>
-              <a:srgbClr val="0070C0"/>
-            </a:solidFill>
-          </a:ln>
-          <a:effectLst/>
-        </p:spPr>
-        <p:style>
-          <a:lnRef idx="1">
-            <a:schemeClr val="accent3"/>
-          </a:lnRef>
-          <a:fillRef idx="2">
-            <a:schemeClr val="accent3"/>
-          </a:fillRef>
-          <a:effectRef idx="1">
-            <a:schemeClr val="accent3"/>
-          </a:effectRef>
-          <a:fontRef idx="minor">
-            <a:schemeClr val="dk1"/>
-          </a:fontRef>
-        </p:style>
-        <p:txBody>
-          <a:bodyPr rtlCol="0" anchor="ctr"/>
-          <a:lstStyle/>
-          <a:p>
-            <a:pPr algn="ctr"/>
-            <a:endParaRPr lang="en-SG" sz="1400" dirty="0"/>
-          </a:p>
-        </p:txBody>
-      </p:sp>
-      <p:sp>
-        <p:nvSpPr>
-          <p:cNvPr id="228" name="TextBox 227">
-            <a:extLst>
-              <a:ext uri="{FF2B5EF4-FFF2-40B4-BE49-F238E27FC236}">
-                <a16:creationId xmlns:a16="http://schemas.microsoft.com/office/drawing/2014/main" id="{AEDAFCB4-D94D-2F4A-8B1B-C8E81D0FFBF6}"/>
-              </a:ext>
-            </a:extLst>
-          </p:cNvPr>
-          <p:cNvSpPr txBox="1"/>
-          <p:nvPr/>
-        </p:nvSpPr>
-        <p:spPr>
-          <a:xfrm>
-            <a:off x="2524057" y="7372287"/>
-            <a:ext cx="2531580" cy="169277"/>
-          </a:xfrm>
-          <a:prstGeom prst="rect">
-            <a:avLst/>
-          </a:prstGeom>
-          <a:noFill/>
-        </p:spPr>
-        <p:txBody>
-          <a:bodyPr wrap="square" lIns="0" tIns="0" rIns="0" bIns="0" rtlCol="0">
-            <a:spAutoFit/>
-          </a:bodyPr>
-          <a:lstStyle>
-            <a:defPPr>
-              <a:defRPr lang="en-US"/>
-            </a:defPPr>
-            <a:lvl1pPr algn="r">
-              <a:defRPr sz="1400">
-                <a:solidFill>
-                  <a:srgbClr val="0070C0"/>
-                </a:solidFill>
-              </a:defRPr>
-            </a:lvl1pPr>
-          </a:lstStyle>
-          <a:p>
-            <a:pPr algn="ctr"/>
-            <a:r>
-              <a:rPr lang="en-US" sz="1100" dirty="0" err="1"/>
-              <a:t>parseCommand</a:t>
-            </a:r>
-            <a:r>
-              <a:rPr lang="en-US" sz="1100" dirty="0"/>
-              <a:t>(“list n/d*)</a:t>
-            </a:r>
-          </a:p>
-        </p:txBody>
-      </p:sp>
-      <p:cxnSp>
-        <p:nvCxnSpPr>
-          <p:cNvPr id="230" name="Straight Arrow Connector 229">
-            <a:extLst>
-              <a:ext uri="{FF2B5EF4-FFF2-40B4-BE49-F238E27FC236}">
-                <a16:creationId xmlns:a16="http://schemas.microsoft.com/office/drawing/2014/main" id="{DCC676FA-6CAB-5F42-907F-B4EBD4C68095}"/>
-              </a:ext>
-            </a:extLst>
-          </p:cNvPr>
-          <p:cNvCxnSpPr>
-            <a:cxnSpLocks/>
-          </p:cNvCxnSpPr>
-          <p:nvPr/>
-        </p:nvCxnSpPr>
-        <p:spPr>
-          <a:xfrm>
-            <a:off x="2475586" y="7662225"/>
-            <a:ext cx="2582979" cy="0"/>
-          </a:xfrm>
-          <a:prstGeom prst="straightConnector1">
-            <a:avLst/>
-          </a:prstGeom>
-          <a:ln w="19050">
-            <a:solidFill>
-              <a:srgbClr val="0070C0"/>
-            </a:solidFill>
-            <a:tailEnd type="arrow"/>
-          </a:ln>
-        </p:spPr>
-        <p:style>
-          <a:lnRef idx="1">
-            <a:schemeClr val="accent1"/>
-          </a:lnRef>
-          <a:fillRef idx="0">
-            <a:schemeClr val="accent1"/>
-          </a:fillRef>
-          <a:effectRef idx="0">
-            <a:schemeClr val="accent1"/>
-          </a:effectRef>
-          <a:fontRef idx="minor">
-            <a:schemeClr val="tx1"/>
-          </a:fontRef>
-        </p:style>
-      </p:cxnSp>
-      <p:sp>
-        <p:nvSpPr>
-          <p:cNvPr id="231" name="Rectangle 230">
-            <a:extLst>
-              <a:ext uri="{FF2B5EF4-FFF2-40B4-BE49-F238E27FC236}">
-                <a16:creationId xmlns:a16="http://schemas.microsoft.com/office/drawing/2014/main" id="{B81BED4B-E7A2-3543-AE4E-EC3D74B1DC8E}"/>
-              </a:ext>
-            </a:extLst>
-          </p:cNvPr>
-          <p:cNvSpPr/>
-          <p:nvPr/>
-        </p:nvSpPr>
-        <p:spPr>
-          <a:xfrm>
-            <a:off x="5044472" y="7624467"/>
-            <a:ext cx="166433" cy="447746"/>
-          </a:xfrm>
-          <a:prstGeom prst="rect">
-            <a:avLst/>
-          </a:prstGeom>
-          <a:solidFill>
-            <a:srgbClr val="0070C0"/>
-          </a:solidFill>
-          <a:ln>
-            <a:solidFill>
-              <a:srgbClr val="0070C0"/>
-            </a:solidFill>
-          </a:ln>
-          <a:effectLst/>
-        </p:spPr>
-        <p:style>
-          <a:lnRef idx="1">
-            <a:schemeClr val="accent3"/>
-          </a:lnRef>
-          <a:fillRef idx="2">
-            <a:schemeClr val="accent3"/>
-          </a:fillRef>
-          <a:effectRef idx="1">
-            <a:schemeClr val="accent3"/>
-          </a:effectRef>
-          <a:fontRef idx="minor">
-            <a:schemeClr val="dk1"/>
-          </a:fontRef>
-        </p:style>
-        <p:txBody>
-          <a:bodyPr rtlCol="0" anchor="ctr"/>
-          <a:lstStyle/>
-          <a:p>
-            <a:pPr algn="ctr"/>
-            <a:endParaRPr lang="en-SG" sz="1400" dirty="0"/>
-          </a:p>
-        </p:txBody>
-      </p:sp>
       <p:cxnSp>
         <p:nvCxnSpPr>
           <p:cNvPr id="233" name="Straight Arrow Connector 232">
@@ -13827,7 +12849,7 @@
         </p:nvCxnSpPr>
         <p:spPr>
           <a:xfrm>
-            <a:off x="2505730" y="8061349"/>
+            <a:off x="2505730" y="7905485"/>
             <a:ext cx="2628332" cy="0"/>
           </a:xfrm>
           <a:prstGeom prst="straightConnector1">
@@ -13871,7 +12893,7 @@
         </p:nvSpPr>
         <p:spPr>
           <a:xfrm>
-            <a:off x="6789876" y="7636563"/>
+            <a:off x="6789876" y="7480699"/>
             <a:ext cx="145586" cy="393704"/>
           </a:xfrm>
           <a:prstGeom prst="rect">
@@ -13924,7 +12946,7 @@
         </p:nvSpPr>
         <p:spPr>
           <a:xfrm>
-            <a:off x="5143626" y="7407258"/>
+            <a:off x="5089035" y="7356785"/>
             <a:ext cx="1655521" cy="169277"/>
           </a:xfrm>
           <a:prstGeom prst="rect">
@@ -13973,7 +12995,7 @@
         </p:nvCxnSpPr>
         <p:spPr>
           <a:xfrm>
-            <a:off x="5142451" y="7673179"/>
+            <a:off x="5142451" y="7517315"/>
             <a:ext cx="1656826" cy="0"/>
           </a:xfrm>
           <a:prstGeom prst="straightConnector1">
@@ -14017,7 +13039,7 @@
         </p:nvCxnSpPr>
         <p:spPr>
           <a:xfrm>
-            <a:off x="5197033" y="8023483"/>
+            <a:off x="5197033" y="7867619"/>
             <a:ext cx="1723160" cy="0"/>
           </a:xfrm>
           <a:prstGeom prst="straightConnector1">
@@ -14061,7 +13083,7 @@
         </p:nvSpPr>
         <p:spPr>
           <a:xfrm>
-            <a:off x="8748219" y="7768489"/>
+            <a:off x="8748219" y="7612625"/>
             <a:ext cx="169197" cy="188336"/>
           </a:xfrm>
           <a:prstGeom prst="rect">
@@ -14116,7 +13138,7 @@
         </p:nvCxnSpPr>
         <p:spPr>
           <a:xfrm flipV="1">
-            <a:off x="6905807" y="7696392"/>
+            <a:off x="6905807" y="7540528"/>
             <a:ext cx="1080123" cy="1"/>
           </a:xfrm>
           <a:prstGeom prst="straightConnector1">
@@ -14160,7 +13182,7 @@
         </p:nvCxnSpPr>
         <p:spPr>
           <a:xfrm>
-            <a:off x="6927452" y="7949294"/>
+            <a:off x="6927452" y="7793430"/>
             <a:ext cx="1947641" cy="0"/>
           </a:xfrm>
           <a:prstGeom prst="straightConnector1">
@@ -14207,8 +13229,8 @@
         </p:nvCxnSpPr>
         <p:spPr>
           <a:xfrm>
-            <a:off x="8823806" y="5181995"/>
-            <a:ext cx="0" cy="1945212"/>
+            <a:off x="8823810" y="4911831"/>
+            <a:ext cx="0" cy="1580546"/>
           </a:xfrm>
           <a:prstGeom prst="line">
             <a:avLst/>
@@ -14250,8 +13272,8 @@
         </p:nvSpPr>
         <p:spPr>
           <a:xfrm>
-            <a:off x="8731171" y="5423184"/>
-            <a:ext cx="196521" cy="1597744"/>
+            <a:off x="8731171" y="5153020"/>
+            <a:ext cx="196521" cy="1233849"/>
           </a:xfrm>
           <a:prstGeom prst="rect">
             <a:avLst/>
@@ -14305,7 +13327,7 @@
         </p:nvCxnSpPr>
         <p:spPr>
           <a:xfrm>
-            <a:off x="8830872" y="7753648"/>
+            <a:off x="8830872" y="7597784"/>
             <a:ext cx="0" cy="1712998"/>
           </a:xfrm>
           <a:prstGeom prst="line">
@@ -14348,7 +13370,7 @@
         </p:nvSpPr>
         <p:spPr>
           <a:xfrm>
-            <a:off x="8749841" y="8216768"/>
+            <a:off x="8749841" y="8060904"/>
             <a:ext cx="172940" cy="1149856"/>
           </a:xfrm>
           <a:prstGeom prst="rect">
@@ -14456,7 +13478,7 @@
         </p:nvCxnSpPr>
         <p:spPr>
           <a:xfrm>
-            <a:off x="2478488" y="7023838"/>
+            <a:off x="2478488" y="6383804"/>
             <a:ext cx="6335051" cy="0"/>
           </a:xfrm>
           <a:prstGeom prst="straightConnector1">
@@ -14500,7 +13522,7 @@
         </p:nvSpPr>
         <p:spPr>
           <a:xfrm>
-            <a:off x="5271793" y="5254867"/>
+            <a:off x="5271793" y="4984703"/>
             <a:ext cx="950133" cy="169277"/>
           </a:xfrm>
           <a:prstGeom prst="rect">
@@ -14548,7 +13570,7 @@
         </p:nvCxnSpPr>
         <p:spPr>
           <a:xfrm>
-            <a:off x="2464953" y="5441208"/>
+            <a:off x="2464953" y="5171044"/>
             <a:ext cx="6284027" cy="0"/>
           </a:xfrm>
           <a:prstGeom prst="straightConnector1">
@@ -14590,7 +13612,7 @@
         </p:nvSpPr>
         <p:spPr>
           <a:xfrm>
-            <a:off x="3225979" y="7842631"/>
+            <a:off x="3225979" y="7686767"/>
             <a:ext cx="950133" cy="169277"/>
           </a:xfrm>
           <a:prstGeom prst="rect">
@@ -14639,7 +13661,7 @@
         </p:nvCxnSpPr>
         <p:spPr>
           <a:xfrm>
-            <a:off x="2460400" y="8218313"/>
+            <a:off x="2460400" y="8062449"/>
             <a:ext cx="6301219" cy="0"/>
           </a:xfrm>
           <a:prstGeom prst="straightConnector1">
@@ -14728,7 +13750,7 @@
             </a:r>
             <a:r>
               <a:rPr lang="en-US" sz="1200" dirty="0" err="1"/>
-              <a:t>optionalName.isPresent</a:t>
+              <a:t>optionalNameSet.isPresent</a:t>
             </a:r>
             <a:r>
               <a:rPr lang="en-US" sz="1200" dirty="0"/>
@@ -14751,7 +13773,7 @@
         </p:nvSpPr>
         <p:spPr>
           <a:xfrm>
-            <a:off x="2537680" y="9738034"/>
+            <a:off x="2537680" y="9539045"/>
             <a:ext cx="2531580" cy="169277"/>
           </a:xfrm>
           <a:prstGeom prst="rect">
@@ -14788,50 +13810,6 @@
           </a:p>
         </p:txBody>
       </p:sp>
-      <p:cxnSp>
-        <p:nvCxnSpPr>
-          <p:cNvPr id="268" name="Straight Arrow Connector 267">
-            <a:extLst>
-              <a:ext uri="{FF2B5EF4-FFF2-40B4-BE49-F238E27FC236}">
-                <a16:creationId xmlns:a16="http://schemas.microsoft.com/office/drawing/2014/main" id="{B5375C1B-E164-A147-ACF2-9E9140AC9048}"/>
-              </a:ext>
-            </a:extLst>
-          </p:cNvPr>
-          <p:cNvCxnSpPr>
-            <a:cxnSpLocks/>
-          </p:cNvCxnSpPr>
-          <p:nvPr/>
-        </p:nvCxnSpPr>
-        <p:spPr>
-          <a:xfrm>
-            <a:off x="2416590" y="10027973"/>
-            <a:ext cx="2636677" cy="0"/>
-          </a:xfrm>
-          <a:prstGeom prst="straightConnector1">
-            <a:avLst/>
-          </a:prstGeom>
-          <a:ln w="19050">
-            <a:solidFill>
-              <a:srgbClr val="0070C0"/>
-            </a:solidFill>
-            <a:tailEnd type="arrow"/>
-          </a:ln>
-        </p:spPr>
-        <p:style>
-          <a:lnRef idx="1">
-            <a:schemeClr val="accent1"/>
-          </a:lnRef>
-          <a:fillRef idx="0">
-            <a:schemeClr val="accent1"/>
-          </a:fillRef>
-          <a:effectRef idx="0">
-            <a:schemeClr val="accent1"/>
-          </a:effectRef>
-          <a:fontRef idx="minor">
-            <a:schemeClr val="tx1"/>
-          </a:fontRef>
-        </p:style>
-      </p:cxnSp>
       <p:sp>
         <p:nvSpPr>
           <p:cNvPr id="269" name="Rectangle 268">
@@ -14846,8 +13824,8 @@
         </p:nvSpPr>
         <p:spPr>
           <a:xfrm>
-            <a:off x="5044472" y="9990215"/>
-            <a:ext cx="166433" cy="465052"/>
+            <a:off x="5044472" y="9725025"/>
+            <a:ext cx="166433" cy="730242"/>
           </a:xfrm>
           <a:prstGeom prst="rect">
             <a:avLst/>
@@ -14998,7 +13976,7 @@
         </p:nvSpPr>
         <p:spPr>
           <a:xfrm>
-            <a:off x="5143626" y="9773006"/>
+            <a:off x="5216362" y="10936788"/>
             <a:ext cx="1655521" cy="169277"/>
           </a:xfrm>
           <a:prstGeom prst="rect">
@@ -15355,154 +14333,6 @@
           </a:fontRef>
         </p:style>
       </p:cxnSp>
-      <p:grpSp>
-        <p:nvGrpSpPr>
-          <p:cNvPr id="288" name="Group 287">
-            <a:extLst>
-              <a:ext uri="{FF2B5EF4-FFF2-40B4-BE49-F238E27FC236}">
-                <a16:creationId xmlns:a16="http://schemas.microsoft.com/office/drawing/2014/main" id="{0F7268A2-E461-504A-9EB0-8AB11AE6D8A4}"/>
-              </a:ext>
-            </a:extLst>
-          </p:cNvPr>
-          <p:cNvGrpSpPr/>
-          <p:nvPr/>
-        </p:nvGrpSpPr>
-        <p:grpSpPr>
-          <a:xfrm>
-            <a:off x="307507" y="960286"/>
-            <a:ext cx="697824" cy="436426"/>
-            <a:chOff x="345357" y="4383603"/>
-            <a:chExt cx="628547" cy="393099"/>
-          </a:xfrm>
-        </p:grpSpPr>
-        <p:cxnSp>
-          <p:nvCxnSpPr>
-            <p:cNvPr id="289" name="Straight Connector 288">
-              <a:extLst>
-                <a:ext uri="{FF2B5EF4-FFF2-40B4-BE49-F238E27FC236}">
-                  <a16:creationId xmlns:a16="http://schemas.microsoft.com/office/drawing/2014/main" id="{A625515F-EE4A-474B-991A-166265F323D9}"/>
-                </a:ext>
-              </a:extLst>
-            </p:cNvPr>
-            <p:cNvCxnSpPr/>
-            <p:nvPr/>
-          </p:nvCxnSpPr>
-          <p:spPr>
-            <a:xfrm>
-              <a:off x="345357" y="4776702"/>
-              <a:ext cx="548405" cy="0"/>
-            </a:xfrm>
-            <a:prstGeom prst="line">
-              <a:avLst/>
-            </a:prstGeom>
-            <a:ln>
-              <a:solidFill>
-                <a:schemeClr val="tx1"/>
-              </a:solidFill>
-            </a:ln>
-          </p:spPr>
-          <p:style>
-            <a:lnRef idx="1">
-              <a:schemeClr val="accent1"/>
-            </a:lnRef>
-            <a:fillRef idx="0">
-              <a:schemeClr val="accent1"/>
-            </a:fillRef>
-            <a:effectRef idx="0">
-              <a:schemeClr val="accent1"/>
-            </a:effectRef>
-            <a:fontRef idx="minor">
-              <a:schemeClr val="tx1"/>
-            </a:fontRef>
-          </p:style>
-        </p:cxnSp>
-        <p:cxnSp>
-          <p:nvCxnSpPr>
-            <p:cNvPr id="290" name="Straight Connector 289">
-              <a:extLst>
-                <a:ext uri="{FF2B5EF4-FFF2-40B4-BE49-F238E27FC236}">
-                  <a16:creationId xmlns:a16="http://schemas.microsoft.com/office/drawing/2014/main" id="{4298182A-56FE-A547-9ED6-13EFFDEF8217}"/>
-                </a:ext>
-              </a:extLst>
-            </p:cNvPr>
-            <p:cNvCxnSpPr>
-              <a:cxnSpLocks/>
-            </p:cNvCxnSpPr>
-            <p:nvPr/>
-          </p:nvCxnSpPr>
-          <p:spPr>
-            <a:xfrm flipV="1">
-              <a:off x="893762" y="4670553"/>
-              <a:ext cx="80142" cy="106149"/>
-            </a:xfrm>
-            <a:prstGeom prst="line">
-              <a:avLst/>
-            </a:prstGeom>
-            <a:ln>
-              <a:solidFill>
-                <a:schemeClr val="tx1"/>
-              </a:solidFill>
-            </a:ln>
-          </p:spPr>
-          <p:style>
-            <a:lnRef idx="1">
-              <a:schemeClr val="accent1"/>
-            </a:lnRef>
-            <a:fillRef idx="0">
-              <a:schemeClr val="accent1"/>
-            </a:fillRef>
-            <a:effectRef idx="0">
-              <a:schemeClr val="accent1"/>
-            </a:effectRef>
-            <a:fontRef idx="minor">
-              <a:schemeClr val="tx1"/>
-            </a:fontRef>
-          </p:style>
-        </p:cxnSp>
-        <p:cxnSp>
-          <p:nvCxnSpPr>
-            <p:cNvPr id="291" name="Straight Connector 290">
-              <a:extLst>
-                <a:ext uri="{FF2B5EF4-FFF2-40B4-BE49-F238E27FC236}">
-                  <a16:creationId xmlns:a16="http://schemas.microsoft.com/office/drawing/2014/main" id="{F003ABC9-1592-874B-B902-B2E6979A997F}"/>
-                </a:ext>
-              </a:extLst>
-            </p:cNvPr>
-            <p:cNvCxnSpPr>
-              <a:cxnSpLocks/>
-            </p:cNvCxnSpPr>
-            <p:nvPr/>
-          </p:nvCxnSpPr>
-          <p:spPr>
-            <a:xfrm flipV="1">
-              <a:off x="969962" y="4383603"/>
-              <a:ext cx="0" cy="286950"/>
-            </a:xfrm>
-            <a:prstGeom prst="line">
-              <a:avLst/>
-            </a:prstGeom>
-            <a:ln>
-              <a:solidFill>
-                <a:schemeClr val="tx1"/>
-              </a:solidFill>
-            </a:ln>
-          </p:spPr>
-          <p:style>
-            <a:lnRef idx="1">
-              <a:schemeClr val="accent1"/>
-            </a:lnRef>
-            <a:fillRef idx="0">
-              <a:schemeClr val="accent1"/>
-            </a:fillRef>
-            <a:effectRef idx="0">
-              <a:schemeClr val="accent1"/>
-            </a:effectRef>
-            <a:fontRef idx="minor">
-              <a:schemeClr val="tx1"/>
-            </a:fontRef>
-          </p:style>
-        </p:cxnSp>
-      </p:grpSp>
       <p:cxnSp>
         <p:nvCxnSpPr>
           <p:cNvPr id="292" name="Straight Arrow Connector 291">
@@ -15518,9 +14348,9 @@
           <p:nvPr/>
         </p:nvCxnSpPr>
         <p:spPr>
-          <a:xfrm flipV="1">
-            <a:off x="987662" y="4793367"/>
-            <a:ext cx="1327877" cy="11458"/>
+          <a:xfrm>
+            <a:off x="1064419" y="4123152"/>
+            <a:ext cx="1258263" cy="0"/>
           </a:xfrm>
           <a:prstGeom prst="straightConnector1">
             <a:avLst/>
@@ -15561,7 +14391,7 @@
         </p:nvSpPr>
         <p:spPr>
           <a:xfrm>
-            <a:off x="1094506" y="4553549"/>
+            <a:off x="1065931" y="3961215"/>
             <a:ext cx="1228188" cy="153888"/>
           </a:xfrm>
           <a:prstGeom prst="rect">
@@ -15603,7 +14433,7 @@
         </p:nvCxnSpPr>
         <p:spPr>
           <a:xfrm>
-            <a:off x="1082605" y="7619041"/>
+            <a:off x="1089862" y="6998944"/>
             <a:ext cx="1240705" cy="0"/>
           </a:xfrm>
           <a:prstGeom prst="straightConnector1">
@@ -15645,7 +14475,7 @@
         </p:nvSpPr>
         <p:spPr>
           <a:xfrm>
-            <a:off x="284339" y="7390675"/>
+            <a:off x="284339" y="6770578"/>
             <a:ext cx="2024970" cy="169277"/>
           </a:xfrm>
           <a:prstGeom prst="rect">
@@ -15687,8 +14517,8 @@
         </p:nvCxnSpPr>
         <p:spPr>
           <a:xfrm>
-            <a:off x="1180306" y="9907307"/>
-            <a:ext cx="1145862" cy="0"/>
+            <a:off x="1170831" y="9684629"/>
+            <a:ext cx="1179130" cy="0"/>
           </a:xfrm>
           <a:prstGeom prst="straightConnector1">
             <a:avLst/>
@@ -15729,7 +14559,7 @@
         </p:nvSpPr>
         <p:spPr>
           <a:xfrm>
-            <a:off x="1058091" y="9712235"/>
+            <a:off x="920694" y="9522722"/>
             <a:ext cx="1285956" cy="169277"/>
           </a:xfrm>
           <a:prstGeom prst="rect">
@@ -15771,7 +14601,7 @@
         </p:nvCxnSpPr>
         <p:spPr>
           <a:xfrm>
-            <a:off x="11816140" y="8306175"/>
+            <a:off x="11816140" y="8150311"/>
             <a:ext cx="121348" cy="100627"/>
           </a:xfrm>
           <a:prstGeom prst="curvedConnector3">
@@ -15909,7 +14739,7 @@
         </p:nvSpPr>
         <p:spPr>
           <a:xfrm>
-            <a:off x="11648556" y="2686747"/>
+            <a:off x="11648556" y="2430269"/>
             <a:ext cx="172940" cy="579141"/>
           </a:xfrm>
           <a:prstGeom prst="rect">
@@ -15962,7 +14792,7 @@
         </p:nvSpPr>
         <p:spPr>
           <a:xfrm>
-            <a:off x="8708926" y="3964495"/>
+            <a:off x="8708926" y="3708017"/>
             <a:ext cx="258402" cy="261482"/>
           </a:xfrm>
           <a:prstGeom prst="rect">
@@ -16001,7 +14831,7 @@
         </p:nvSpPr>
         <p:spPr>
           <a:xfrm>
-            <a:off x="8698294" y="7063768"/>
+            <a:off x="8698294" y="6423734"/>
             <a:ext cx="258402" cy="261482"/>
           </a:xfrm>
           <a:prstGeom prst="rect">
@@ -16040,7 +14870,7 @@
         </p:nvGrpSpPr>
         <p:grpSpPr>
           <a:xfrm>
-            <a:off x="8925949" y="6566185"/>
+            <a:off x="8925949" y="5926151"/>
             <a:ext cx="2300263" cy="533635"/>
             <a:chOff x="8901136" y="4535799"/>
             <a:chExt cx="2300263" cy="533635"/>
@@ -16315,7 +15145,7 @@
         </p:nvSpPr>
         <p:spPr>
           <a:xfrm>
-            <a:off x="7944495" y="4833159"/>
+            <a:off x="7944495" y="4562995"/>
             <a:ext cx="1787271" cy="265507"/>
           </a:xfrm>
           <a:prstGeom prst="rect">
@@ -16388,7 +15218,7 @@
         </p:nvSpPr>
         <p:spPr>
           <a:xfrm>
-            <a:off x="7948978" y="7549665"/>
+            <a:off x="7948978" y="7393801"/>
             <a:ext cx="1787271" cy="265507"/>
           </a:xfrm>
           <a:prstGeom prst="rect">
@@ -16461,7 +15291,7 @@
         </p:nvGrpSpPr>
         <p:grpSpPr>
           <a:xfrm>
-            <a:off x="8907527" y="8881944"/>
+            <a:off x="8907527" y="8726080"/>
             <a:ext cx="2300263" cy="533635"/>
             <a:chOff x="8901136" y="4535799"/>
             <a:chExt cx="2300263" cy="533635"/>
@@ -16736,7 +15566,7 @@
         </p:nvSpPr>
         <p:spPr>
           <a:xfrm>
-            <a:off x="8701669" y="9423525"/>
+            <a:off x="8701669" y="9267661"/>
             <a:ext cx="258402" cy="261482"/>
           </a:xfrm>
           <a:prstGeom prst="rect">
@@ -16893,7 +15723,7 @@
         </p:nvSpPr>
         <p:spPr>
           <a:xfrm>
-            <a:off x="3225979" y="5107560"/>
+            <a:off x="3225979" y="4837396"/>
             <a:ext cx="950133" cy="169277"/>
           </a:xfrm>
           <a:prstGeom prst="rect">
@@ -16940,7 +15770,7 @@
         </p:nvSpPr>
         <p:spPr>
           <a:xfrm>
-            <a:off x="3225979" y="2205032"/>
+            <a:off x="3225979" y="1948554"/>
             <a:ext cx="950133" cy="169277"/>
           </a:xfrm>
           <a:prstGeom prst="rect">
@@ -16987,7 +15817,7 @@
         </p:nvSpPr>
         <p:spPr>
           <a:xfrm>
-            <a:off x="5447510" y="5024433"/>
+            <a:off x="5447510" y="4754269"/>
             <a:ext cx="950133" cy="169277"/>
           </a:xfrm>
           <a:prstGeom prst="rect">
@@ -17034,7 +15864,7 @@
         </p:nvSpPr>
         <p:spPr>
           <a:xfrm>
-            <a:off x="6971510" y="4983859"/>
+            <a:off x="6971510" y="4713695"/>
             <a:ext cx="950133" cy="169277"/>
           </a:xfrm>
           <a:prstGeom prst="rect">
@@ -17081,7 +15911,7 @@
         </p:nvSpPr>
         <p:spPr>
           <a:xfrm>
-            <a:off x="6967552" y="7759503"/>
+            <a:off x="6967552" y="7603639"/>
             <a:ext cx="950133" cy="169277"/>
           </a:xfrm>
           <a:prstGeom prst="rect">
@@ -17128,7 +15958,7 @@
         </p:nvSpPr>
         <p:spPr>
           <a:xfrm>
-            <a:off x="5433656" y="2231752"/>
+            <a:off x="5433656" y="1975274"/>
             <a:ext cx="950133" cy="169277"/>
           </a:xfrm>
           <a:prstGeom prst="rect">
@@ -17175,7 +16005,7 @@
         </p:nvSpPr>
         <p:spPr>
           <a:xfrm>
-            <a:off x="6957656" y="2191178"/>
+            <a:off x="6957656" y="1934700"/>
             <a:ext cx="950133" cy="169277"/>
           </a:xfrm>
           <a:prstGeom prst="rect">
@@ -17497,7 +16327,7 @@
         </p:nvSpPr>
         <p:spPr>
           <a:xfrm>
-            <a:off x="5447510" y="7843833"/>
+            <a:off x="5447510" y="7687969"/>
             <a:ext cx="950133" cy="169277"/>
           </a:xfrm>
           <a:prstGeom prst="rect">
@@ -17724,8 +16554,8 @@
         </p:nvSpPr>
         <p:spPr>
           <a:xfrm>
-            <a:off x="1287004" y="566670"/>
-            <a:ext cx="2376693" cy="263084"/>
+            <a:off x="1287004" y="563622"/>
+            <a:ext cx="2376693" cy="234000"/>
           </a:xfrm>
           <a:prstGeom prst="rect">
             <a:avLst/>
@@ -17772,6 +16602,1341 @@
                 <a:schemeClr val="bg1"/>
               </a:solidFill>
             </a:endParaRPr>
+          </a:p>
+        </p:txBody>
+      </p:sp>
+      <p:grpSp>
+        <p:nvGrpSpPr>
+          <p:cNvPr id="7" name="Group 6">
+            <a:extLst>
+              <a:ext uri="{FF2B5EF4-FFF2-40B4-BE49-F238E27FC236}">
+                <a16:creationId xmlns:a16="http://schemas.microsoft.com/office/drawing/2014/main" id="{3638C914-D7AC-854B-A121-7130197D87D1}"/>
+              </a:ext>
+            </a:extLst>
+          </p:cNvPr>
+          <p:cNvGrpSpPr/>
+          <p:nvPr/>
+        </p:nvGrpSpPr>
+        <p:grpSpPr>
+          <a:xfrm>
+            <a:off x="5125020" y="1324658"/>
+            <a:ext cx="2891220" cy="386912"/>
+            <a:chOff x="5125020" y="1324658"/>
+            <a:chExt cx="2891220" cy="386912"/>
+          </a:xfrm>
+        </p:grpSpPr>
+        <p:sp>
+          <p:nvSpPr>
+            <p:cNvPr id="21" name="Rectangle 20"/>
+            <p:cNvSpPr/>
+            <p:nvPr/>
+          </p:nvSpPr>
+          <p:spPr>
+            <a:xfrm>
+              <a:off x="6759202" y="1597398"/>
+              <a:ext cx="169197" cy="114172"/>
+            </a:xfrm>
+            <a:prstGeom prst="rect">
+              <a:avLst/>
+            </a:prstGeom>
+            <a:solidFill>
+              <a:srgbClr val="0070C0"/>
+            </a:solidFill>
+            <a:ln>
+              <a:solidFill>
+                <a:srgbClr val="0070C0"/>
+              </a:solidFill>
+            </a:ln>
+            <a:effectLst/>
+          </p:spPr>
+          <p:style>
+            <a:lnRef idx="1">
+              <a:schemeClr val="accent3"/>
+            </a:lnRef>
+            <a:fillRef idx="2">
+              <a:schemeClr val="accent3"/>
+            </a:fillRef>
+            <a:effectRef idx="1">
+              <a:schemeClr val="accent3"/>
+            </a:effectRef>
+            <a:fontRef idx="minor">
+              <a:schemeClr val="dk1"/>
+            </a:fontRef>
+          </p:style>
+          <p:txBody>
+            <a:bodyPr rtlCol="0" anchor="ctr"/>
+            <a:lstStyle/>
+            <a:p>
+              <a:pPr algn="ctr"/>
+              <a:endParaRPr lang="en-SG" sz="1400" dirty="0"/>
+            </a:p>
+          </p:txBody>
+        </p:sp>
+        <p:cxnSp>
+          <p:nvCxnSpPr>
+            <p:cNvPr id="28" name="Straight Arrow Connector 27"/>
+            <p:cNvCxnSpPr>
+              <a:cxnSpLocks/>
+            </p:cNvCxnSpPr>
+            <p:nvPr/>
+          </p:nvCxnSpPr>
+          <p:spPr>
+            <a:xfrm>
+              <a:off x="5125020" y="1457317"/>
+              <a:ext cx="833688" cy="1"/>
+            </a:xfrm>
+            <a:prstGeom prst="straightConnector1">
+              <a:avLst/>
+            </a:prstGeom>
+            <a:ln w="19050">
+              <a:solidFill>
+                <a:srgbClr val="0070C0"/>
+              </a:solidFill>
+              <a:tailEnd type="arrow"/>
+            </a:ln>
+          </p:spPr>
+          <p:style>
+            <a:lnRef idx="1">
+              <a:schemeClr val="accent1"/>
+            </a:lnRef>
+            <a:fillRef idx="0">
+              <a:schemeClr val="accent1"/>
+            </a:fillRef>
+            <a:effectRef idx="0">
+              <a:schemeClr val="accent1"/>
+            </a:effectRef>
+            <a:fontRef idx="minor">
+              <a:schemeClr val="tx1"/>
+            </a:fontRef>
+          </p:style>
+        </p:cxnSp>
+        <p:cxnSp>
+          <p:nvCxnSpPr>
+            <p:cNvPr id="34" name="Straight Arrow Connector 33"/>
+            <p:cNvCxnSpPr>
+              <a:cxnSpLocks/>
+            </p:cNvCxnSpPr>
+            <p:nvPr/>
+          </p:nvCxnSpPr>
+          <p:spPr>
+            <a:xfrm>
+              <a:off x="5175326" y="1707494"/>
+              <a:ext cx="1736649" cy="0"/>
+            </a:xfrm>
+            <a:prstGeom prst="straightConnector1">
+              <a:avLst/>
+            </a:prstGeom>
+            <a:ln w="19050">
+              <a:solidFill>
+                <a:srgbClr val="0070C0"/>
+              </a:solidFill>
+              <a:prstDash val="sysDash"/>
+              <a:headEnd type="arrow" w="med" len="med"/>
+              <a:tailEnd type="none" w="med" len="med"/>
+            </a:ln>
+          </p:spPr>
+          <p:style>
+            <a:lnRef idx="1">
+              <a:schemeClr val="accent1"/>
+            </a:lnRef>
+            <a:fillRef idx="0">
+              <a:schemeClr val="accent1"/>
+            </a:fillRef>
+            <a:effectRef idx="0">
+              <a:schemeClr val="accent1"/>
+            </a:effectRef>
+            <a:fontRef idx="minor">
+              <a:schemeClr val="tx1"/>
+            </a:fontRef>
+          </p:style>
+        </p:cxnSp>
+        <p:sp>
+          <p:nvSpPr>
+            <p:cNvPr id="213" name="Rectangle 62">
+              <a:extLst>
+                <a:ext uri="{FF2B5EF4-FFF2-40B4-BE49-F238E27FC236}">
+                  <a16:creationId xmlns:a16="http://schemas.microsoft.com/office/drawing/2014/main" id="{C6EC51BE-E011-2645-8CA9-4C85D5948DA6}"/>
+                </a:ext>
+              </a:extLst>
+            </p:cNvPr>
+            <p:cNvSpPr/>
+            <p:nvPr/>
+          </p:nvSpPr>
+          <p:spPr>
+            <a:xfrm>
+              <a:off x="5957645" y="1324658"/>
+              <a:ext cx="2058595" cy="265507"/>
+            </a:xfrm>
+            <a:prstGeom prst="rect">
+              <a:avLst/>
+            </a:prstGeom>
+            <a:solidFill>
+              <a:srgbClr val="0070C0"/>
+            </a:solidFill>
+            <a:ln w="19050">
+              <a:solidFill>
+                <a:srgbClr val="0070C0"/>
+              </a:solidFill>
+            </a:ln>
+            <a:effectLst/>
+          </p:spPr>
+          <p:style>
+            <a:lnRef idx="1">
+              <a:schemeClr val="accent2"/>
+            </a:lnRef>
+            <a:fillRef idx="2">
+              <a:schemeClr val="accent2"/>
+            </a:fillRef>
+            <a:effectRef idx="1">
+              <a:schemeClr val="accent2"/>
+            </a:effectRef>
+            <a:fontRef idx="minor">
+              <a:schemeClr val="dk1"/>
+            </a:fontRef>
+          </p:style>
+          <p:txBody>
+            <a:bodyPr rtlCol="0" anchor="ctr"/>
+            <a:lstStyle/>
+            <a:p>
+              <a:pPr algn="ctr"/>
+              <a:r>
+                <a:rPr lang="en-US" sz="1600" dirty="0">
+                  <a:solidFill>
+                    <a:schemeClr val="bg1"/>
+                  </a:solidFill>
+                </a:rPr>
+                <a:t>c:</a:t>
+              </a:r>
+              <a:r>
+                <a:rPr lang="en-US" sz="1600" dirty="0" err="1">
+                  <a:solidFill>
+                    <a:schemeClr val="bg1"/>
+                  </a:solidFill>
+                </a:rPr>
+                <a:t>ListCommandParser</a:t>
+              </a:r>
+              <a:endParaRPr lang="en-SG" sz="1600" dirty="0">
+                <a:solidFill>
+                  <a:schemeClr val="bg1"/>
+                </a:solidFill>
+              </a:endParaRPr>
+            </a:p>
+          </p:txBody>
+        </p:sp>
+      </p:grpSp>
+      <p:grpSp>
+        <p:nvGrpSpPr>
+          <p:cNvPr id="295" name="Group 294">
+            <a:extLst>
+              <a:ext uri="{FF2B5EF4-FFF2-40B4-BE49-F238E27FC236}">
+                <a16:creationId xmlns:a16="http://schemas.microsoft.com/office/drawing/2014/main" id="{6CEBCE7D-455D-884D-B763-7A2E5B77E727}"/>
+              </a:ext>
+            </a:extLst>
+          </p:cNvPr>
+          <p:cNvGrpSpPr/>
+          <p:nvPr/>
+        </p:nvGrpSpPr>
+        <p:grpSpPr>
+          <a:xfrm>
+            <a:off x="5125020" y="4039105"/>
+            <a:ext cx="2891220" cy="386912"/>
+            <a:chOff x="5125020" y="1324658"/>
+            <a:chExt cx="2891220" cy="386912"/>
+          </a:xfrm>
+        </p:grpSpPr>
+        <p:sp>
+          <p:nvSpPr>
+            <p:cNvPr id="306" name="Rectangle 305">
+              <a:extLst>
+                <a:ext uri="{FF2B5EF4-FFF2-40B4-BE49-F238E27FC236}">
+                  <a16:creationId xmlns:a16="http://schemas.microsoft.com/office/drawing/2014/main" id="{987C836D-05D4-5845-A9A9-CA4D599BC925}"/>
+                </a:ext>
+              </a:extLst>
+            </p:cNvPr>
+            <p:cNvSpPr/>
+            <p:nvPr/>
+          </p:nvSpPr>
+          <p:spPr>
+            <a:xfrm>
+              <a:off x="6759202" y="1597398"/>
+              <a:ext cx="169197" cy="114172"/>
+            </a:xfrm>
+            <a:prstGeom prst="rect">
+              <a:avLst/>
+            </a:prstGeom>
+            <a:solidFill>
+              <a:srgbClr val="0070C0"/>
+            </a:solidFill>
+            <a:ln>
+              <a:solidFill>
+                <a:srgbClr val="0070C0"/>
+              </a:solidFill>
+            </a:ln>
+            <a:effectLst/>
+          </p:spPr>
+          <p:style>
+            <a:lnRef idx="1">
+              <a:schemeClr val="accent3"/>
+            </a:lnRef>
+            <a:fillRef idx="2">
+              <a:schemeClr val="accent3"/>
+            </a:fillRef>
+            <a:effectRef idx="1">
+              <a:schemeClr val="accent3"/>
+            </a:effectRef>
+            <a:fontRef idx="minor">
+              <a:schemeClr val="dk1"/>
+            </a:fontRef>
+          </p:style>
+          <p:txBody>
+            <a:bodyPr rtlCol="0" anchor="ctr"/>
+            <a:lstStyle/>
+            <a:p>
+              <a:pPr algn="ctr"/>
+              <a:endParaRPr lang="en-SG" sz="1400" dirty="0"/>
+            </a:p>
+          </p:txBody>
+        </p:sp>
+        <p:cxnSp>
+          <p:nvCxnSpPr>
+            <p:cNvPr id="307" name="Straight Arrow Connector 306">
+              <a:extLst>
+                <a:ext uri="{FF2B5EF4-FFF2-40B4-BE49-F238E27FC236}">
+                  <a16:creationId xmlns:a16="http://schemas.microsoft.com/office/drawing/2014/main" id="{3BBCD099-68FD-B54D-9549-26688EBBC870}"/>
+                </a:ext>
+              </a:extLst>
+            </p:cNvPr>
+            <p:cNvCxnSpPr>
+              <a:cxnSpLocks/>
+            </p:cNvCxnSpPr>
+            <p:nvPr/>
+          </p:nvCxnSpPr>
+          <p:spPr>
+            <a:xfrm>
+              <a:off x="5125020" y="1457317"/>
+              <a:ext cx="833688" cy="1"/>
+            </a:xfrm>
+            <a:prstGeom prst="straightConnector1">
+              <a:avLst/>
+            </a:prstGeom>
+            <a:ln w="19050">
+              <a:solidFill>
+                <a:srgbClr val="0070C0"/>
+              </a:solidFill>
+              <a:tailEnd type="arrow"/>
+            </a:ln>
+          </p:spPr>
+          <p:style>
+            <a:lnRef idx="1">
+              <a:schemeClr val="accent1"/>
+            </a:lnRef>
+            <a:fillRef idx="0">
+              <a:schemeClr val="accent1"/>
+            </a:fillRef>
+            <a:effectRef idx="0">
+              <a:schemeClr val="accent1"/>
+            </a:effectRef>
+            <a:fontRef idx="minor">
+              <a:schemeClr val="tx1"/>
+            </a:fontRef>
+          </p:style>
+        </p:cxnSp>
+        <p:cxnSp>
+          <p:nvCxnSpPr>
+            <p:cNvPr id="308" name="Straight Arrow Connector 307">
+              <a:extLst>
+                <a:ext uri="{FF2B5EF4-FFF2-40B4-BE49-F238E27FC236}">
+                  <a16:creationId xmlns:a16="http://schemas.microsoft.com/office/drawing/2014/main" id="{F1621499-9AFC-014F-B3FF-B433C73D0F6D}"/>
+                </a:ext>
+              </a:extLst>
+            </p:cNvPr>
+            <p:cNvCxnSpPr>
+              <a:cxnSpLocks/>
+            </p:cNvCxnSpPr>
+            <p:nvPr/>
+          </p:nvCxnSpPr>
+          <p:spPr>
+            <a:xfrm>
+              <a:off x="5175326" y="1707494"/>
+              <a:ext cx="1736649" cy="0"/>
+            </a:xfrm>
+            <a:prstGeom prst="straightConnector1">
+              <a:avLst/>
+            </a:prstGeom>
+            <a:ln w="19050">
+              <a:solidFill>
+                <a:srgbClr val="0070C0"/>
+              </a:solidFill>
+              <a:prstDash val="sysDash"/>
+              <a:headEnd type="arrow" w="med" len="med"/>
+              <a:tailEnd type="none" w="med" len="med"/>
+            </a:ln>
+          </p:spPr>
+          <p:style>
+            <a:lnRef idx="1">
+              <a:schemeClr val="accent1"/>
+            </a:lnRef>
+            <a:fillRef idx="0">
+              <a:schemeClr val="accent1"/>
+            </a:fillRef>
+            <a:effectRef idx="0">
+              <a:schemeClr val="accent1"/>
+            </a:effectRef>
+            <a:fontRef idx="minor">
+              <a:schemeClr val="tx1"/>
+            </a:fontRef>
+          </p:style>
+        </p:cxnSp>
+        <p:sp>
+          <p:nvSpPr>
+            <p:cNvPr id="313" name="Rectangle 62">
+              <a:extLst>
+                <a:ext uri="{FF2B5EF4-FFF2-40B4-BE49-F238E27FC236}">
+                  <a16:creationId xmlns:a16="http://schemas.microsoft.com/office/drawing/2014/main" id="{3BCAD285-321E-8042-B166-93C20538AACA}"/>
+                </a:ext>
+              </a:extLst>
+            </p:cNvPr>
+            <p:cNvSpPr/>
+            <p:nvPr/>
+          </p:nvSpPr>
+          <p:spPr>
+            <a:xfrm>
+              <a:off x="5957645" y="1324658"/>
+              <a:ext cx="2058595" cy="265507"/>
+            </a:xfrm>
+            <a:prstGeom prst="rect">
+              <a:avLst/>
+            </a:prstGeom>
+            <a:solidFill>
+              <a:srgbClr val="0070C0"/>
+            </a:solidFill>
+            <a:ln w="19050">
+              <a:solidFill>
+                <a:srgbClr val="0070C0"/>
+              </a:solidFill>
+            </a:ln>
+            <a:effectLst/>
+          </p:spPr>
+          <p:style>
+            <a:lnRef idx="1">
+              <a:schemeClr val="accent2"/>
+            </a:lnRef>
+            <a:fillRef idx="2">
+              <a:schemeClr val="accent2"/>
+            </a:fillRef>
+            <a:effectRef idx="1">
+              <a:schemeClr val="accent2"/>
+            </a:effectRef>
+            <a:fontRef idx="minor">
+              <a:schemeClr val="dk1"/>
+            </a:fontRef>
+          </p:style>
+          <p:txBody>
+            <a:bodyPr rtlCol="0" anchor="ctr"/>
+            <a:lstStyle/>
+            <a:p>
+              <a:pPr algn="ctr"/>
+              <a:r>
+                <a:rPr lang="en-US" sz="1600" dirty="0">
+                  <a:solidFill>
+                    <a:schemeClr val="bg1"/>
+                  </a:solidFill>
+                </a:rPr>
+                <a:t>c:</a:t>
+              </a:r>
+              <a:r>
+                <a:rPr lang="en-US" sz="1600" dirty="0" err="1">
+                  <a:solidFill>
+                    <a:schemeClr val="bg1"/>
+                  </a:solidFill>
+                </a:rPr>
+                <a:t>ListCommandParser</a:t>
+              </a:r>
+              <a:endParaRPr lang="en-SG" sz="1600" dirty="0">
+                <a:solidFill>
+                  <a:schemeClr val="bg1"/>
+                </a:solidFill>
+              </a:endParaRPr>
+            </a:p>
+          </p:txBody>
+        </p:sp>
+      </p:grpSp>
+      <p:grpSp>
+        <p:nvGrpSpPr>
+          <p:cNvPr id="215" name="Group 214">
+            <a:extLst>
+              <a:ext uri="{FF2B5EF4-FFF2-40B4-BE49-F238E27FC236}">
+                <a16:creationId xmlns:a16="http://schemas.microsoft.com/office/drawing/2014/main" id="{B6C4F291-2ECB-9341-90AA-4F01BB4302F7}"/>
+              </a:ext>
+            </a:extLst>
+          </p:cNvPr>
+          <p:cNvGrpSpPr/>
+          <p:nvPr/>
+        </p:nvGrpSpPr>
+        <p:grpSpPr>
+          <a:xfrm>
+            <a:off x="5125020" y="6982330"/>
+            <a:ext cx="2891220" cy="386912"/>
+            <a:chOff x="5125020" y="1324658"/>
+            <a:chExt cx="2891220" cy="386912"/>
+          </a:xfrm>
+        </p:grpSpPr>
+        <p:sp>
+          <p:nvSpPr>
+            <p:cNvPr id="223" name="Rectangle 222">
+              <a:extLst>
+                <a:ext uri="{FF2B5EF4-FFF2-40B4-BE49-F238E27FC236}">
+                  <a16:creationId xmlns:a16="http://schemas.microsoft.com/office/drawing/2014/main" id="{45BE22F6-4086-FB46-AD99-FC8F82219C54}"/>
+                </a:ext>
+              </a:extLst>
+            </p:cNvPr>
+            <p:cNvSpPr/>
+            <p:nvPr/>
+          </p:nvSpPr>
+          <p:spPr>
+            <a:xfrm>
+              <a:off x="6759202" y="1597398"/>
+              <a:ext cx="169197" cy="114172"/>
+            </a:xfrm>
+            <a:prstGeom prst="rect">
+              <a:avLst/>
+            </a:prstGeom>
+            <a:solidFill>
+              <a:srgbClr val="0070C0"/>
+            </a:solidFill>
+            <a:ln>
+              <a:solidFill>
+                <a:srgbClr val="0070C0"/>
+              </a:solidFill>
+            </a:ln>
+            <a:effectLst/>
+          </p:spPr>
+          <p:style>
+            <a:lnRef idx="1">
+              <a:schemeClr val="accent3"/>
+            </a:lnRef>
+            <a:fillRef idx="2">
+              <a:schemeClr val="accent3"/>
+            </a:fillRef>
+            <a:effectRef idx="1">
+              <a:schemeClr val="accent3"/>
+            </a:effectRef>
+            <a:fontRef idx="minor">
+              <a:schemeClr val="dk1"/>
+            </a:fontRef>
+          </p:style>
+          <p:txBody>
+            <a:bodyPr rtlCol="0" anchor="ctr"/>
+            <a:lstStyle/>
+            <a:p>
+              <a:pPr algn="ctr"/>
+              <a:endParaRPr lang="en-SG" sz="1400" dirty="0"/>
+            </a:p>
+          </p:txBody>
+        </p:sp>
+        <p:cxnSp>
+          <p:nvCxnSpPr>
+            <p:cNvPr id="229" name="Straight Arrow Connector 228">
+              <a:extLst>
+                <a:ext uri="{FF2B5EF4-FFF2-40B4-BE49-F238E27FC236}">
+                  <a16:creationId xmlns:a16="http://schemas.microsoft.com/office/drawing/2014/main" id="{456241C5-DFB0-9842-A360-6CF2784640E4}"/>
+                </a:ext>
+              </a:extLst>
+            </p:cNvPr>
+            <p:cNvCxnSpPr>
+              <a:cxnSpLocks/>
+            </p:cNvCxnSpPr>
+            <p:nvPr/>
+          </p:nvCxnSpPr>
+          <p:spPr>
+            <a:xfrm>
+              <a:off x="5125020" y="1457317"/>
+              <a:ext cx="833688" cy="1"/>
+            </a:xfrm>
+            <a:prstGeom prst="straightConnector1">
+              <a:avLst/>
+            </a:prstGeom>
+            <a:ln w="19050">
+              <a:solidFill>
+                <a:srgbClr val="0070C0"/>
+              </a:solidFill>
+              <a:tailEnd type="arrow"/>
+            </a:ln>
+          </p:spPr>
+          <p:style>
+            <a:lnRef idx="1">
+              <a:schemeClr val="accent1"/>
+            </a:lnRef>
+            <a:fillRef idx="0">
+              <a:schemeClr val="accent1"/>
+            </a:fillRef>
+            <a:effectRef idx="0">
+              <a:schemeClr val="accent1"/>
+            </a:effectRef>
+            <a:fontRef idx="minor">
+              <a:schemeClr val="tx1"/>
+            </a:fontRef>
+          </p:style>
+        </p:cxnSp>
+        <p:cxnSp>
+          <p:nvCxnSpPr>
+            <p:cNvPr id="232" name="Straight Arrow Connector 231">
+              <a:extLst>
+                <a:ext uri="{FF2B5EF4-FFF2-40B4-BE49-F238E27FC236}">
+                  <a16:creationId xmlns:a16="http://schemas.microsoft.com/office/drawing/2014/main" id="{D63702A0-02A1-F747-9138-0F8017728381}"/>
+                </a:ext>
+              </a:extLst>
+            </p:cNvPr>
+            <p:cNvCxnSpPr>
+              <a:cxnSpLocks/>
+            </p:cNvCxnSpPr>
+            <p:nvPr/>
+          </p:nvCxnSpPr>
+          <p:spPr>
+            <a:xfrm>
+              <a:off x="5175326" y="1707494"/>
+              <a:ext cx="1736649" cy="0"/>
+            </a:xfrm>
+            <a:prstGeom prst="straightConnector1">
+              <a:avLst/>
+            </a:prstGeom>
+            <a:ln w="19050">
+              <a:solidFill>
+                <a:srgbClr val="0070C0"/>
+              </a:solidFill>
+              <a:prstDash val="sysDash"/>
+              <a:headEnd type="arrow" w="med" len="med"/>
+              <a:tailEnd type="none" w="med" len="med"/>
+            </a:ln>
+          </p:spPr>
+          <p:style>
+            <a:lnRef idx="1">
+              <a:schemeClr val="accent1"/>
+            </a:lnRef>
+            <a:fillRef idx="0">
+              <a:schemeClr val="accent1"/>
+            </a:fillRef>
+            <a:effectRef idx="0">
+              <a:schemeClr val="accent1"/>
+            </a:effectRef>
+            <a:fontRef idx="minor">
+              <a:schemeClr val="tx1"/>
+            </a:fontRef>
+          </p:style>
+        </p:cxnSp>
+        <p:sp>
+          <p:nvSpPr>
+            <p:cNvPr id="276" name="Rectangle 62">
+              <a:extLst>
+                <a:ext uri="{FF2B5EF4-FFF2-40B4-BE49-F238E27FC236}">
+                  <a16:creationId xmlns:a16="http://schemas.microsoft.com/office/drawing/2014/main" id="{76D7481C-8009-9246-87C5-15699B76C8C7}"/>
+                </a:ext>
+              </a:extLst>
+            </p:cNvPr>
+            <p:cNvSpPr/>
+            <p:nvPr/>
+          </p:nvSpPr>
+          <p:spPr>
+            <a:xfrm>
+              <a:off x="5957645" y="1324658"/>
+              <a:ext cx="2058595" cy="265507"/>
+            </a:xfrm>
+            <a:prstGeom prst="rect">
+              <a:avLst/>
+            </a:prstGeom>
+            <a:solidFill>
+              <a:srgbClr val="0070C0"/>
+            </a:solidFill>
+            <a:ln w="19050">
+              <a:solidFill>
+                <a:srgbClr val="0070C0"/>
+              </a:solidFill>
+            </a:ln>
+            <a:effectLst/>
+          </p:spPr>
+          <p:style>
+            <a:lnRef idx="1">
+              <a:schemeClr val="accent2"/>
+            </a:lnRef>
+            <a:fillRef idx="2">
+              <a:schemeClr val="accent2"/>
+            </a:fillRef>
+            <a:effectRef idx="1">
+              <a:schemeClr val="accent2"/>
+            </a:effectRef>
+            <a:fontRef idx="minor">
+              <a:schemeClr val="dk1"/>
+            </a:fontRef>
+          </p:style>
+          <p:txBody>
+            <a:bodyPr rtlCol="0" anchor="ctr"/>
+            <a:lstStyle/>
+            <a:p>
+              <a:pPr algn="ctr"/>
+              <a:r>
+                <a:rPr lang="en-US" sz="1600" dirty="0">
+                  <a:solidFill>
+                    <a:schemeClr val="bg1"/>
+                  </a:solidFill>
+                </a:rPr>
+                <a:t>c:</a:t>
+              </a:r>
+              <a:r>
+                <a:rPr lang="en-US" sz="1600" dirty="0" err="1">
+                  <a:solidFill>
+                    <a:schemeClr val="bg1"/>
+                  </a:solidFill>
+                </a:rPr>
+                <a:t>ListCommandParser</a:t>
+              </a:r>
+              <a:endParaRPr lang="en-SG" sz="1600" dirty="0">
+                <a:solidFill>
+                  <a:schemeClr val="bg1"/>
+                </a:solidFill>
+              </a:endParaRPr>
+            </a:p>
+          </p:txBody>
+        </p:sp>
+      </p:grpSp>
+      <p:grpSp>
+        <p:nvGrpSpPr>
+          <p:cNvPr id="283" name="Group 282">
+            <a:extLst>
+              <a:ext uri="{FF2B5EF4-FFF2-40B4-BE49-F238E27FC236}">
+                <a16:creationId xmlns:a16="http://schemas.microsoft.com/office/drawing/2014/main" id="{6926D0F0-2CF5-1148-B73B-68A311F8A35C}"/>
+              </a:ext>
+            </a:extLst>
+          </p:cNvPr>
+          <p:cNvGrpSpPr/>
+          <p:nvPr/>
+        </p:nvGrpSpPr>
+        <p:grpSpPr>
+          <a:xfrm>
+            <a:off x="5125020" y="9538494"/>
+            <a:ext cx="2891220" cy="352808"/>
+            <a:chOff x="5125020" y="1324658"/>
+            <a:chExt cx="2891220" cy="352808"/>
+          </a:xfrm>
+        </p:grpSpPr>
+        <p:sp>
+          <p:nvSpPr>
+            <p:cNvPr id="284" name="Rectangle 283">
+              <a:extLst>
+                <a:ext uri="{FF2B5EF4-FFF2-40B4-BE49-F238E27FC236}">
+                  <a16:creationId xmlns:a16="http://schemas.microsoft.com/office/drawing/2014/main" id="{CED16067-DF73-F542-8754-7A0776C52F72}"/>
+                </a:ext>
+              </a:extLst>
+            </p:cNvPr>
+            <p:cNvSpPr/>
+            <p:nvPr/>
+          </p:nvSpPr>
+          <p:spPr>
+            <a:xfrm>
+              <a:off x="6759202" y="1597398"/>
+              <a:ext cx="169197" cy="80068"/>
+            </a:xfrm>
+            <a:prstGeom prst="rect">
+              <a:avLst/>
+            </a:prstGeom>
+            <a:solidFill>
+              <a:srgbClr val="0070C0"/>
+            </a:solidFill>
+            <a:ln>
+              <a:solidFill>
+                <a:srgbClr val="0070C0"/>
+              </a:solidFill>
+            </a:ln>
+            <a:effectLst/>
+          </p:spPr>
+          <p:style>
+            <a:lnRef idx="1">
+              <a:schemeClr val="accent3"/>
+            </a:lnRef>
+            <a:fillRef idx="2">
+              <a:schemeClr val="accent3"/>
+            </a:fillRef>
+            <a:effectRef idx="1">
+              <a:schemeClr val="accent3"/>
+            </a:effectRef>
+            <a:fontRef idx="minor">
+              <a:schemeClr val="dk1"/>
+            </a:fontRef>
+          </p:style>
+          <p:txBody>
+            <a:bodyPr rtlCol="0" anchor="ctr"/>
+            <a:lstStyle/>
+            <a:p>
+              <a:pPr algn="ctr"/>
+              <a:endParaRPr lang="en-SG" sz="1400" dirty="0"/>
+            </a:p>
+          </p:txBody>
+        </p:sp>
+        <p:cxnSp>
+          <p:nvCxnSpPr>
+            <p:cNvPr id="285" name="Straight Arrow Connector 284">
+              <a:extLst>
+                <a:ext uri="{FF2B5EF4-FFF2-40B4-BE49-F238E27FC236}">
+                  <a16:creationId xmlns:a16="http://schemas.microsoft.com/office/drawing/2014/main" id="{096FAD0D-CD9F-3643-A0B2-5680577DA37A}"/>
+                </a:ext>
+              </a:extLst>
+            </p:cNvPr>
+            <p:cNvCxnSpPr>
+              <a:cxnSpLocks/>
+            </p:cNvCxnSpPr>
+            <p:nvPr/>
+          </p:nvCxnSpPr>
+          <p:spPr>
+            <a:xfrm>
+              <a:off x="5125020" y="1556811"/>
+              <a:ext cx="833688" cy="1"/>
+            </a:xfrm>
+            <a:prstGeom prst="straightConnector1">
+              <a:avLst/>
+            </a:prstGeom>
+            <a:ln w="19050">
+              <a:solidFill>
+                <a:srgbClr val="0070C0"/>
+              </a:solidFill>
+              <a:tailEnd type="arrow"/>
+            </a:ln>
+          </p:spPr>
+          <p:style>
+            <a:lnRef idx="1">
+              <a:schemeClr val="accent1"/>
+            </a:lnRef>
+            <a:fillRef idx="0">
+              <a:schemeClr val="accent1"/>
+            </a:fillRef>
+            <a:effectRef idx="0">
+              <a:schemeClr val="accent1"/>
+            </a:effectRef>
+            <a:fontRef idx="minor">
+              <a:schemeClr val="tx1"/>
+            </a:fontRef>
+          </p:style>
+        </p:cxnSp>
+        <p:cxnSp>
+          <p:nvCxnSpPr>
+            <p:cNvPr id="287" name="Straight Arrow Connector 286">
+              <a:extLst>
+                <a:ext uri="{FF2B5EF4-FFF2-40B4-BE49-F238E27FC236}">
+                  <a16:creationId xmlns:a16="http://schemas.microsoft.com/office/drawing/2014/main" id="{40D18734-801E-854E-9243-4EECFE737A61}"/>
+                </a:ext>
+              </a:extLst>
+            </p:cNvPr>
+            <p:cNvCxnSpPr>
+              <a:cxnSpLocks/>
+            </p:cNvCxnSpPr>
+            <p:nvPr/>
+          </p:nvCxnSpPr>
+          <p:spPr>
+            <a:xfrm>
+              <a:off x="5175326" y="1675003"/>
+              <a:ext cx="1736649" cy="0"/>
+            </a:xfrm>
+            <a:prstGeom prst="straightConnector1">
+              <a:avLst/>
+            </a:prstGeom>
+            <a:ln w="19050">
+              <a:solidFill>
+                <a:srgbClr val="0070C0"/>
+              </a:solidFill>
+              <a:prstDash val="sysDash"/>
+              <a:headEnd type="arrow" w="med" len="med"/>
+              <a:tailEnd type="none" w="med" len="med"/>
+            </a:ln>
+          </p:spPr>
+          <p:style>
+            <a:lnRef idx="1">
+              <a:schemeClr val="accent1"/>
+            </a:lnRef>
+            <a:fillRef idx="0">
+              <a:schemeClr val="accent1"/>
+            </a:fillRef>
+            <a:effectRef idx="0">
+              <a:schemeClr val="accent1"/>
+            </a:effectRef>
+            <a:fontRef idx="minor">
+              <a:schemeClr val="tx1"/>
+            </a:fontRef>
+          </p:style>
+        </p:cxnSp>
+        <p:sp>
+          <p:nvSpPr>
+            <p:cNvPr id="294" name="Rectangle 62">
+              <a:extLst>
+                <a:ext uri="{FF2B5EF4-FFF2-40B4-BE49-F238E27FC236}">
+                  <a16:creationId xmlns:a16="http://schemas.microsoft.com/office/drawing/2014/main" id="{3C5C9DBB-B67A-D548-8968-0AF63DD96209}"/>
+                </a:ext>
+              </a:extLst>
+            </p:cNvPr>
+            <p:cNvSpPr/>
+            <p:nvPr/>
+          </p:nvSpPr>
+          <p:spPr>
+            <a:xfrm>
+              <a:off x="5957645" y="1324658"/>
+              <a:ext cx="2058595" cy="265507"/>
+            </a:xfrm>
+            <a:prstGeom prst="rect">
+              <a:avLst/>
+            </a:prstGeom>
+            <a:solidFill>
+              <a:srgbClr val="0070C0"/>
+            </a:solidFill>
+            <a:ln w="19050">
+              <a:solidFill>
+                <a:srgbClr val="0070C0"/>
+              </a:solidFill>
+            </a:ln>
+            <a:effectLst/>
+          </p:spPr>
+          <p:style>
+            <a:lnRef idx="1">
+              <a:schemeClr val="accent2"/>
+            </a:lnRef>
+            <a:fillRef idx="2">
+              <a:schemeClr val="accent2"/>
+            </a:fillRef>
+            <a:effectRef idx="1">
+              <a:schemeClr val="accent2"/>
+            </a:effectRef>
+            <a:fontRef idx="minor">
+              <a:schemeClr val="dk1"/>
+            </a:fontRef>
+          </p:style>
+          <p:txBody>
+            <a:bodyPr rtlCol="0" anchor="ctr"/>
+            <a:lstStyle/>
+            <a:p>
+              <a:pPr algn="ctr"/>
+              <a:r>
+                <a:rPr lang="en-US" sz="1600" dirty="0">
+                  <a:solidFill>
+                    <a:schemeClr val="bg1"/>
+                  </a:solidFill>
+                </a:rPr>
+                <a:t>c:</a:t>
+              </a:r>
+              <a:r>
+                <a:rPr lang="en-US" sz="1600" dirty="0" err="1">
+                  <a:solidFill>
+                    <a:schemeClr val="bg1"/>
+                  </a:solidFill>
+                </a:rPr>
+                <a:t>ListCommandParser</a:t>
+              </a:r>
+              <a:endParaRPr lang="en-SG" sz="1600" dirty="0">
+                <a:solidFill>
+                  <a:schemeClr val="bg1"/>
+                </a:solidFill>
+              </a:endParaRPr>
+            </a:p>
+          </p:txBody>
+        </p:sp>
+      </p:grpSp>
+      <p:cxnSp>
+        <p:nvCxnSpPr>
+          <p:cNvPr id="268" name="Straight Arrow Connector 267">
+            <a:extLst>
+              <a:ext uri="{FF2B5EF4-FFF2-40B4-BE49-F238E27FC236}">
+                <a16:creationId xmlns:a16="http://schemas.microsoft.com/office/drawing/2014/main" id="{B5375C1B-E164-A147-ACF2-9E9140AC9048}"/>
+              </a:ext>
+            </a:extLst>
+          </p:cNvPr>
+          <p:cNvCxnSpPr>
+            <a:cxnSpLocks/>
+          </p:cNvCxnSpPr>
+          <p:nvPr/>
+        </p:nvCxnSpPr>
+        <p:spPr>
+          <a:xfrm>
+            <a:off x="2416590" y="9729490"/>
+            <a:ext cx="2636677" cy="0"/>
+          </a:xfrm>
+          <a:prstGeom prst="straightConnector1">
+            <a:avLst/>
+          </a:prstGeom>
+          <a:ln w="19050">
+            <a:solidFill>
+              <a:srgbClr val="0070C0"/>
+            </a:solidFill>
+            <a:tailEnd type="arrow"/>
+          </a:ln>
+        </p:spPr>
+        <p:style>
+          <a:lnRef idx="1">
+            <a:schemeClr val="accent1"/>
+          </a:lnRef>
+          <a:fillRef idx="0">
+            <a:schemeClr val="accent1"/>
+          </a:fillRef>
+          <a:effectRef idx="0">
+            <a:schemeClr val="accent1"/>
+          </a:effectRef>
+          <a:fontRef idx="minor">
+            <a:schemeClr val="tx1"/>
+          </a:fontRef>
+        </p:style>
+      </p:cxnSp>
+      <p:sp>
+        <p:nvSpPr>
+          <p:cNvPr id="227" name="Rectangle 226">
+            <a:extLst>
+              <a:ext uri="{FF2B5EF4-FFF2-40B4-BE49-F238E27FC236}">
+                <a16:creationId xmlns:a16="http://schemas.microsoft.com/office/drawing/2014/main" id="{A40D24B1-BDB2-0C4E-8301-7BB54F239B7F}"/>
+              </a:ext>
+            </a:extLst>
+          </p:cNvPr>
+          <p:cNvSpPr/>
+          <p:nvPr/>
+        </p:nvSpPr>
+        <p:spPr>
+          <a:xfrm>
+            <a:off x="2330538" y="9679374"/>
+            <a:ext cx="172557" cy="2076136"/>
+          </a:xfrm>
+          <a:prstGeom prst="rect">
+            <a:avLst/>
+          </a:prstGeom>
+          <a:solidFill>
+            <a:srgbClr val="0070C0"/>
+          </a:solidFill>
+          <a:ln>
+            <a:solidFill>
+              <a:srgbClr val="0070C0"/>
+            </a:solidFill>
+          </a:ln>
+          <a:effectLst/>
+        </p:spPr>
+        <p:style>
+          <a:lnRef idx="1">
+            <a:schemeClr val="accent3"/>
+          </a:lnRef>
+          <a:fillRef idx="2">
+            <a:schemeClr val="accent3"/>
+          </a:fillRef>
+          <a:effectRef idx="1">
+            <a:schemeClr val="accent3"/>
+          </a:effectRef>
+          <a:fontRef idx="minor">
+            <a:schemeClr val="dk1"/>
+          </a:fontRef>
+        </p:style>
+        <p:txBody>
+          <a:bodyPr rtlCol="0" anchor="ctr"/>
+          <a:lstStyle/>
+          <a:p>
+            <a:pPr algn="ctr"/>
+            <a:endParaRPr lang="en-SG" sz="1400" dirty="0"/>
+          </a:p>
+        </p:txBody>
+      </p:sp>
+      <p:sp>
+        <p:nvSpPr>
+          <p:cNvPr id="310" name="TextBox 309">
+            <a:extLst>
+              <a:ext uri="{FF2B5EF4-FFF2-40B4-BE49-F238E27FC236}">
+                <a16:creationId xmlns:a16="http://schemas.microsoft.com/office/drawing/2014/main" id="{49CE7E2B-18A0-8347-ACAD-5567B4DE3B13}"/>
+              </a:ext>
+            </a:extLst>
+          </p:cNvPr>
+          <p:cNvSpPr txBox="1"/>
+          <p:nvPr/>
+        </p:nvSpPr>
+        <p:spPr>
+          <a:xfrm>
+            <a:off x="4989975" y="9886625"/>
+            <a:ext cx="1655521" cy="169277"/>
+          </a:xfrm>
+          <a:prstGeom prst="rect">
+            <a:avLst/>
+          </a:prstGeom>
+          <a:noFill/>
+        </p:spPr>
+        <p:txBody>
+          <a:bodyPr wrap="square" lIns="0" tIns="0" rIns="0" bIns="0" rtlCol="0">
+            <a:spAutoFit/>
+          </a:bodyPr>
+          <a:lstStyle>
+            <a:defPPr>
+              <a:defRPr lang="en-US"/>
+            </a:defPPr>
+            <a:lvl1pPr algn="r">
+              <a:defRPr sz="1400">
+                <a:solidFill>
+                  <a:srgbClr val="0070C0"/>
+                </a:solidFill>
+              </a:defRPr>
+            </a:lvl1pPr>
+          </a:lstStyle>
+          <a:p>
+            <a:pPr algn="ctr"/>
+            <a:r>
+              <a:rPr lang="en-US" sz="1100" dirty="0"/>
+              <a:t>parse(“list n/d*)</a:t>
+            </a:r>
+          </a:p>
+        </p:txBody>
+      </p:sp>
+      <p:sp>
+        <p:nvSpPr>
+          <p:cNvPr id="226" name="Rectangle 225">
+            <a:extLst>
+              <a:ext uri="{FF2B5EF4-FFF2-40B4-BE49-F238E27FC236}">
+                <a16:creationId xmlns:a16="http://schemas.microsoft.com/office/drawing/2014/main" id="{DC2689C9-7155-724A-94AB-B682A14C8839}"/>
+              </a:ext>
+            </a:extLst>
+          </p:cNvPr>
+          <p:cNvSpPr/>
+          <p:nvPr/>
+        </p:nvSpPr>
+        <p:spPr>
+          <a:xfrm>
+            <a:off x="2330538" y="6990524"/>
+            <a:ext cx="190127" cy="2375145"/>
+          </a:xfrm>
+          <a:prstGeom prst="rect">
+            <a:avLst/>
+          </a:prstGeom>
+          <a:solidFill>
+            <a:srgbClr val="0070C0"/>
+          </a:solidFill>
+          <a:ln>
+            <a:solidFill>
+              <a:srgbClr val="0070C0"/>
+            </a:solidFill>
+          </a:ln>
+          <a:effectLst/>
+        </p:spPr>
+        <p:style>
+          <a:lnRef idx="1">
+            <a:schemeClr val="accent3"/>
+          </a:lnRef>
+          <a:fillRef idx="2">
+            <a:schemeClr val="accent3"/>
+          </a:fillRef>
+          <a:effectRef idx="1">
+            <a:schemeClr val="accent3"/>
+          </a:effectRef>
+          <a:fontRef idx="minor">
+            <a:schemeClr val="dk1"/>
+          </a:fontRef>
+        </p:style>
+        <p:txBody>
+          <a:bodyPr rtlCol="0" anchor="ctr"/>
+          <a:lstStyle/>
+          <a:p>
+            <a:pPr algn="ctr"/>
+            <a:endParaRPr lang="en-SG" sz="1400" dirty="0"/>
+          </a:p>
+        </p:txBody>
+      </p:sp>
+      <p:sp>
+        <p:nvSpPr>
+          <p:cNvPr id="14" name="Rectangle 13">
+            <a:extLst>
+              <a:ext uri="{FF2B5EF4-FFF2-40B4-BE49-F238E27FC236}">
+                <a16:creationId xmlns:a16="http://schemas.microsoft.com/office/drawing/2014/main" id="{9E376449-D3CE-2F4B-BD52-79362E1AD502}"/>
+              </a:ext>
+            </a:extLst>
+          </p:cNvPr>
+          <p:cNvSpPr/>
+          <p:nvPr/>
+        </p:nvSpPr>
+        <p:spPr>
+          <a:xfrm>
+            <a:off x="302991" y="969584"/>
+            <a:ext cx="563671" cy="350729"/>
+          </a:xfrm>
+          <a:prstGeom prst="rect">
+            <a:avLst/>
+          </a:prstGeom>
+          <a:noFill/>
+          <a:ln w="12700">
+            <a:solidFill>
+              <a:schemeClr val="tx1"/>
+            </a:solidFill>
+          </a:ln>
+        </p:spPr>
+        <p:style>
+          <a:lnRef idx="2">
+            <a:schemeClr val="accent1">
+              <a:shade val="50000"/>
+            </a:schemeClr>
+          </a:lnRef>
+          <a:fillRef idx="1">
+            <a:schemeClr val="accent1"/>
+          </a:fillRef>
+          <a:effectRef idx="0">
+            <a:schemeClr val="accent1"/>
+          </a:effectRef>
+          <a:fontRef idx="minor">
+            <a:schemeClr val="lt1"/>
+          </a:fontRef>
+        </p:style>
+        <p:txBody>
+          <a:bodyPr rtlCol="0" anchor="ctr"/>
+          <a:lstStyle/>
+          <a:p>
+            <a:pPr algn="ctr"/>
+            <a:endParaRPr lang="is-IS"/>
+          </a:p>
+        </p:txBody>
+      </p:sp>
+      <p:sp>
+        <p:nvSpPr>
+          <p:cNvPr id="319" name="Rectangle 318">
+            <a:extLst>
+              <a:ext uri="{FF2B5EF4-FFF2-40B4-BE49-F238E27FC236}">
+                <a16:creationId xmlns:a16="http://schemas.microsoft.com/office/drawing/2014/main" id="{4AFE85CC-8690-F244-A833-C5C8C9F7F861}"/>
+              </a:ext>
+            </a:extLst>
+          </p:cNvPr>
+          <p:cNvSpPr/>
+          <p:nvPr/>
+        </p:nvSpPr>
+        <p:spPr>
+          <a:xfrm>
+            <a:off x="313151" y="3960010"/>
+            <a:ext cx="563671" cy="350729"/>
+          </a:xfrm>
+          <a:prstGeom prst="rect">
+            <a:avLst/>
+          </a:prstGeom>
+          <a:noFill/>
+          <a:ln w="12700">
+            <a:solidFill>
+              <a:schemeClr val="tx1"/>
+            </a:solidFill>
+          </a:ln>
+        </p:spPr>
+        <p:style>
+          <a:lnRef idx="2">
+            <a:schemeClr val="accent1">
+              <a:shade val="50000"/>
+            </a:schemeClr>
+          </a:lnRef>
+          <a:fillRef idx="1">
+            <a:schemeClr val="accent1"/>
+          </a:fillRef>
+          <a:effectRef idx="0">
+            <a:schemeClr val="accent1"/>
+          </a:effectRef>
+          <a:fontRef idx="minor">
+            <a:schemeClr val="lt1"/>
+          </a:fontRef>
+        </p:style>
+        <p:txBody>
+          <a:bodyPr rtlCol="0" anchor="ctr"/>
+          <a:lstStyle/>
+          <a:p>
+            <a:pPr algn="ctr"/>
+            <a:endParaRPr lang="is-IS"/>
+          </a:p>
+        </p:txBody>
+      </p:sp>
+      <p:sp>
+        <p:nvSpPr>
+          <p:cNvPr id="320" name="Rectangle 319">
+            <a:extLst>
+              <a:ext uri="{FF2B5EF4-FFF2-40B4-BE49-F238E27FC236}">
+                <a16:creationId xmlns:a16="http://schemas.microsoft.com/office/drawing/2014/main" id="{D1C9DDC2-4A39-214D-B350-6C9F4E05FD14}"/>
+              </a:ext>
+            </a:extLst>
+          </p:cNvPr>
+          <p:cNvSpPr/>
+          <p:nvPr/>
+        </p:nvSpPr>
+        <p:spPr>
+          <a:xfrm>
+            <a:off x="306378" y="6676117"/>
+            <a:ext cx="563671" cy="350729"/>
+          </a:xfrm>
+          <a:prstGeom prst="rect">
+            <a:avLst/>
+          </a:prstGeom>
+          <a:noFill/>
+          <a:ln w="12700">
+            <a:solidFill>
+              <a:schemeClr val="tx1"/>
+            </a:solidFill>
+          </a:ln>
+        </p:spPr>
+        <p:style>
+          <a:lnRef idx="2">
+            <a:schemeClr val="accent1">
+              <a:shade val="50000"/>
+            </a:schemeClr>
+          </a:lnRef>
+          <a:fillRef idx="1">
+            <a:schemeClr val="accent1"/>
+          </a:fillRef>
+          <a:effectRef idx="0">
+            <a:schemeClr val="accent1"/>
+          </a:effectRef>
+          <a:fontRef idx="minor">
+            <a:schemeClr val="lt1"/>
+          </a:fontRef>
+        </p:style>
+        <p:txBody>
+          <a:bodyPr rtlCol="0" anchor="ctr"/>
+          <a:lstStyle/>
+          <a:p>
+            <a:pPr algn="ctr"/>
+            <a:endParaRPr lang="is-IS"/>
+          </a:p>
+        </p:txBody>
+      </p:sp>
+      <p:sp>
+        <p:nvSpPr>
+          <p:cNvPr id="321" name="Rectangle 320">
+            <a:extLst>
+              <a:ext uri="{FF2B5EF4-FFF2-40B4-BE49-F238E27FC236}">
+                <a16:creationId xmlns:a16="http://schemas.microsoft.com/office/drawing/2014/main" id="{942E2A85-22FC-C749-94FA-F1F9EF72A3BE}"/>
+              </a:ext>
+            </a:extLst>
+          </p:cNvPr>
+          <p:cNvSpPr/>
+          <p:nvPr/>
+        </p:nvSpPr>
+        <p:spPr>
+          <a:xfrm>
+            <a:off x="302992" y="9497210"/>
+            <a:ext cx="563671" cy="350729"/>
+          </a:xfrm>
+          <a:prstGeom prst="rect">
+            <a:avLst/>
+          </a:prstGeom>
+          <a:noFill/>
+          <a:ln w="12700">
+            <a:solidFill>
+              <a:schemeClr val="tx1"/>
+            </a:solidFill>
+          </a:ln>
+        </p:spPr>
+        <p:style>
+          <a:lnRef idx="2">
+            <a:schemeClr val="accent1">
+              <a:shade val="50000"/>
+            </a:schemeClr>
+          </a:lnRef>
+          <a:fillRef idx="1">
+            <a:schemeClr val="accent1"/>
+          </a:fillRef>
+          <a:effectRef idx="0">
+            <a:schemeClr val="accent1"/>
+          </a:effectRef>
+          <a:fontRef idx="minor">
+            <a:schemeClr val="lt1"/>
+          </a:fontRef>
+        </p:style>
+        <p:txBody>
+          <a:bodyPr rtlCol="0" anchor="ctr"/>
+          <a:lstStyle/>
+          <a:p>
+            <a:pPr algn="ctr"/>
+            <a:endParaRPr lang="is-IS"/>
           </a:p>
         </p:txBody>
       </p:sp>

</xml_diff>

<commit_message>
Update all arrows in sequence diagrams to point well
</commit_message>
<xml_diff>
--- a/docs/diagrams/ListShipSequenceDiagram.pptx
+++ b/docs/diagrams/ListShipSequenceDiagram.pptx
@@ -8774,7 +8774,7 @@
           </p:nvCxnSpPr>
           <p:spPr>
             <a:xfrm>
-              <a:off x="8898506" y="3002075"/>
+              <a:off x="8898506" y="3005747"/>
               <a:ext cx="2873914" cy="0"/>
             </a:xfrm>
             <a:prstGeom prst="straightConnector1">
@@ -9773,8 +9773,8 @@
           </p:nvCxnSpPr>
           <p:spPr>
             <a:xfrm>
-              <a:off x="11743969" y="2411737"/>
-              <a:ext cx="0" cy="9506570"/>
+              <a:off x="11743969" y="2082188"/>
+              <a:ext cx="0" cy="9836119"/>
             </a:xfrm>
             <a:prstGeom prst="line">
               <a:avLst/>
@@ -10228,7 +10228,7 @@
           </p:nvCxnSpPr>
           <p:spPr>
             <a:xfrm>
-              <a:off x="6903687" y="2126766"/>
+              <a:off x="6903687" y="2130438"/>
               <a:ext cx="1929131" cy="2209"/>
             </a:xfrm>
             <a:prstGeom prst="straightConnector1">
@@ -10274,8 +10274,8 @@
           </p:nvCxnSpPr>
           <p:spPr>
             <a:xfrm>
-              <a:off x="5185398" y="2176429"/>
-              <a:ext cx="1552617" cy="0"/>
+              <a:off x="5185398" y="2169085"/>
+              <a:ext cx="1575286" cy="0"/>
             </a:xfrm>
             <a:prstGeom prst="straightConnector1">
               <a:avLst/>
@@ -10949,7 +10949,7 @@
             </p:nvCxnSpPr>
             <p:spPr>
               <a:xfrm>
-                <a:off x="8904251" y="4909552"/>
+                <a:off x="8904251" y="4902208"/>
                 <a:ext cx="1382749" cy="0"/>
               </a:xfrm>
               <a:prstGeom prst="straightConnector1">
@@ -11208,7 +11208,7 @@
           </p:nvCxnSpPr>
           <p:spPr>
             <a:xfrm>
-              <a:off x="8930061" y="5779467"/>
+              <a:off x="8930061" y="5783139"/>
               <a:ext cx="2777671" cy="0"/>
             </a:xfrm>
             <a:prstGeom prst="straightConnector1">
@@ -11254,7 +11254,7 @@
           </p:nvCxnSpPr>
           <p:spPr>
             <a:xfrm>
-              <a:off x="8912642" y="5248875"/>
+              <a:off x="8912642" y="5230515"/>
               <a:ext cx="2725280" cy="0"/>
             </a:xfrm>
             <a:prstGeom prst="straightConnector1">
@@ -11296,8 +11296,8 @@
           </p:nvSpPr>
           <p:spPr>
             <a:xfrm>
-              <a:off x="11648556" y="8085032"/>
-              <a:ext cx="172940" cy="521958"/>
+              <a:off x="11648556" y="8119430"/>
+              <a:ext cx="172940" cy="487559"/>
             </a:xfrm>
             <a:prstGeom prst="rect">
               <a:avLst/>
@@ -11384,7 +11384,7 @@
                     <a:schemeClr val="accent6"/>
                   </a:solidFill>
                 </a:rPr>
-                <a:t>getByName</a:t>
+                <a:t>getByNames</a:t>
               </a:r>
               <a:r>
                 <a:rPr lang="en-US" sz="1200" dirty="0">
@@ -11392,7 +11392,7 @@
                     <a:schemeClr val="accent6"/>
                   </a:solidFill>
                 </a:rPr>
-                <a:t>()</a:t>
+                <a:t>(nameSet)</a:t>
               </a:r>
             </a:p>
           </p:txBody>
@@ -11722,7 +11722,7 @@
           </p:nvCxnSpPr>
           <p:spPr>
             <a:xfrm>
-              <a:off x="11828959" y="10678478"/>
+              <a:off x="11825287" y="10678478"/>
               <a:ext cx="80976" cy="122037"/>
             </a:xfrm>
             <a:prstGeom prst="curvedConnector3">
@@ -11809,7 +11809,7 @@
                     <a:schemeClr val="accent6"/>
                   </a:solidFill>
                 </a:rPr>
-                <a:t>()</a:t>
+                <a:t>(tagSet)</a:t>
               </a:r>
             </a:p>
           </p:txBody>
@@ -11876,7 +11876,7 @@
           </p:nvCxnSpPr>
           <p:spPr>
             <a:xfrm>
-              <a:off x="8830871" y="10675579"/>
+              <a:off x="8830871" y="10638856"/>
               <a:ext cx="2817684" cy="0"/>
             </a:xfrm>
             <a:prstGeom prst="straightConnector1">
@@ -12222,7 +12222,7 @@
           </p:nvCxnSpPr>
           <p:spPr>
             <a:xfrm>
-              <a:off x="2464953" y="4175782"/>
+              <a:off x="2464953" y="4142734"/>
               <a:ext cx="2577065" cy="0"/>
             </a:xfrm>
             <a:prstGeom prst="straightConnector1">
@@ -12420,7 +12420,7 @@
           <p:spPr>
             <a:xfrm>
               <a:off x="5150736" y="4669089"/>
-              <a:ext cx="1632058" cy="1"/>
+              <a:ext cx="1622023" cy="0"/>
             </a:xfrm>
             <a:prstGeom prst="straightConnector1">
               <a:avLst/>
@@ -12563,7 +12563,7 @@
           <p:spPr>
             <a:xfrm>
               <a:off x="6903801" y="4716881"/>
-              <a:ext cx="1022399" cy="0"/>
+              <a:ext cx="1036497" cy="0"/>
             </a:xfrm>
             <a:prstGeom prst="straightConnector1">
               <a:avLst/>
@@ -12606,7 +12606,7 @@
           </p:nvCxnSpPr>
           <p:spPr>
             <a:xfrm>
-              <a:off x="6928350" y="4911831"/>
+              <a:off x="6928350" y="4908159"/>
               <a:ext cx="1810466" cy="0"/>
             </a:xfrm>
             <a:prstGeom prst="straightConnector1">
@@ -12652,7 +12652,7 @@
           </p:nvCxnSpPr>
           <p:spPr>
             <a:xfrm>
-              <a:off x="5170574" y="4951070"/>
+              <a:off x="5170574" y="4954742"/>
               <a:ext cx="1698168" cy="0"/>
             </a:xfrm>
             <a:prstGeom prst="straightConnector1">
@@ -12698,7 +12698,7 @@
           </p:nvCxnSpPr>
           <p:spPr>
             <a:xfrm>
-              <a:off x="2478484" y="5026889"/>
+              <a:off x="2478484" y="5030561"/>
               <a:ext cx="2690808" cy="0"/>
             </a:xfrm>
             <a:prstGeom prst="straightConnector1">
@@ -13135,7 +13135,7 @@
           </p:nvCxnSpPr>
           <p:spPr>
             <a:xfrm>
-              <a:off x="5197033" y="7867619"/>
+              <a:off x="5197033" y="7871291"/>
               <a:ext cx="1723160" cy="0"/>
             </a:xfrm>
             <a:prstGeom prst="straightConnector1">
@@ -13234,8 +13234,8 @@
           </p:nvCxnSpPr>
           <p:spPr>
             <a:xfrm flipV="1">
-              <a:off x="6905807" y="7540528"/>
-              <a:ext cx="1080123" cy="1"/>
+              <a:off x="6905807" y="7540529"/>
+              <a:ext cx="1039657" cy="1"/>
             </a:xfrm>
             <a:prstGeom prst="straightConnector1">
               <a:avLst/>
@@ -13278,7 +13278,7 @@
           </p:nvCxnSpPr>
           <p:spPr>
             <a:xfrm>
-              <a:off x="6927452" y="7793430"/>
+              <a:off x="6927452" y="7797102"/>
               <a:ext cx="1947641" cy="0"/>
             </a:xfrm>
             <a:prstGeom prst="straightConnector1">
@@ -13326,7 +13326,7 @@
           <p:spPr>
             <a:xfrm>
               <a:off x="8823810" y="4911831"/>
-              <a:ext cx="0" cy="1580546"/>
+              <a:ext cx="0" cy="1569759"/>
             </a:xfrm>
             <a:prstGeom prst="line">
               <a:avLst/>
@@ -13368,8 +13368,8 @@
           </p:nvSpPr>
           <p:spPr>
             <a:xfrm>
-              <a:off x="8731171" y="5153020"/>
-              <a:ext cx="196521" cy="1233849"/>
+              <a:off x="8731171" y="5166102"/>
+              <a:ext cx="196521" cy="1220767"/>
             </a:xfrm>
             <a:prstGeom prst="rect">
               <a:avLst/>
@@ -13574,7 +13574,7 @@
           </p:nvCxnSpPr>
           <p:spPr>
             <a:xfrm>
-              <a:off x="2478488" y="6383804"/>
+              <a:off x="2482160" y="6383804"/>
               <a:ext cx="6335051" cy="0"/>
             </a:xfrm>
             <a:prstGeom prst="straightConnector1">
@@ -13667,7 +13667,7 @@
           <p:spPr>
             <a:xfrm>
               <a:off x="2464953" y="5171044"/>
-              <a:ext cx="6284027" cy="0"/>
+              <a:ext cx="6281257" cy="0"/>
             </a:xfrm>
             <a:prstGeom prst="straightConnector1">
               <a:avLst/>
@@ -13757,7 +13757,7 @@
           </p:nvCxnSpPr>
           <p:spPr>
             <a:xfrm>
-              <a:off x="2460400" y="8062449"/>
+              <a:off x="2460400" y="8066121"/>
               <a:ext cx="6301219" cy="0"/>
             </a:xfrm>
             <a:prstGeom prst="straightConnector1">
@@ -14019,8 +14019,8 @@
           </p:nvSpPr>
           <p:spPr>
             <a:xfrm>
-              <a:off x="6789876" y="10027615"/>
-              <a:ext cx="145586" cy="322881"/>
+              <a:off x="6789876" y="10037736"/>
+              <a:ext cx="145586" cy="312760"/>
             </a:xfrm>
             <a:prstGeom prst="rect">
               <a:avLst/>
@@ -14122,7 +14122,7 @@
           <p:spPr>
             <a:xfrm>
               <a:off x="5212080" y="10038931"/>
-              <a:ext cx="1593554" cy="1"/>
+              <a:ext cx="1581344" cy="0"/>
             </a:xfrm>
             <a:prstGeom prst="straightConnector1">
               <a:avLst/>
@@ -14165,7 +14165,7 @@
           </p:nvCxnSpPr>
           <p:spPr>
             <a:xfrm>
-              <a:off x="5204880" y="10346460"/>
+              <a:off x="5204880" y="10350132"/>
               <a:ext cx="1698168" cy="0"/>
             </a:xfrm>
             <a:prstGeom prst="straightConnector1">
@@ -14265,7 +14265,7 @@
           <p:spPr>
             <a:xfrm>
               <a:off x="6899279" y="10069472"/>
-              <a:ext cx="1064689" cy="1"/>
+              <a:ext cx="1046185" cy="0"/>
             </a:xfrm>
             <a:prstGeom prst="straightConnector1">
               <a:avLst/>
@@ -14308,7 +14308,7 @@
           </p:nvCxnSpPr>
           <p:spPr>
             <a:xfrm>
-              <a:off x="6934825" y="10252114"/>
+              <a:off x="6934825" y="10244770"/>
               <a:ext cx="1897993" cy="10548"/>
             </a:xfrm>
             <a:prstGeom prst="straightConnector1">
@@ -14402,7 +14402,7 @@
           <p:spPr>
             <a:xfrm>
               <a:off x="2505706" y="10610789"/>
-              <a:ext cx="6253907" cy="0"/>
+              <a:ext cx="6240504" cy="0"/>
             </a:xfrm>
             <a:prstGeom prst="straightConnector1">
               <a:avLst/>
@@ -15196,7 +15196,7 @@
             </p:nvCxnSpPr>
             <p:spPr>
               <a:xfrm>
-                <a:off x="8904251" y="4909552"/>
+                <a:off x="8904251" y="4898536"/>
                 <a:ext cx="1382749" cy="0"/>
               </a:xfrm>
               <a:prstGeom prst="straightConnector1">
@@ -15574,7 +15574,7 @@
             <p:spPr>
               <a:xfrm>
                 <a:off x="8901136" y="4631811"/>
-                <a:ext cx="559814" cy="0"/>
+                <a:ext cx="574324" cy="0"/>
               </a:xfrm>
               <a:prstGeom prst="straightConnector1">
                 <a:avLst/>
@@ -15617,7 +15617,7 @@
             </p:nvCxnSpPr>
             <p:spPr>
               <a:xfrm>
-                <a:off x="8904251" y="4909552"/>
+                <a:off x="8904251" y="4898536"/>
                 <a:ext cx="1382749" cy="0"/>
               </a:xfrm>
               <a:prstGeom prst="straightConnector1">
@@ -15704,7 +15704,7 @@
           <p:spPr>
             <a:xfrm>
               <a:off x="8828289" y="10114395"/>
-              <a:ext cx="0" cy="1709960"/>
+              <a:ext cx="0" cy="1688342"/>
             </a:xfrm>
             <a:prstGeom prst="line">
               <a:avLst/>
@@ -16335,7 +16335,7 @@
             <p:spPr>
               <a:xfrm>
                 <a:off x="8901136" y="4631811"/>
-                <a:ext cx="559814" cy="0"/>
+                <a:ext cx="574324" cy="0"/>
               </a:xfrm>
               <a:prstGeom prst="straightConnector1">
                 <a:avLst/>
@@ -16378,7 +16378,7 @@
             </p:nvCxnSpPr>
             <p:spPr>
               <a:xfrm>
-                <a:off x="8904251" y="4909552"/>
+                <a:off x="8904251" y="4898536"/>
                 <a:ext cx="1382749" cy="0"/>
               </a:xfrm>
               <a:prstGeom prst="straightConnector1">
@@ -16611,7 +16611,7 @@
           </p:nvSpPr>
           <p:spPr>
             <a:xfrm>
-              <a:off x="8703344" y="11761442"/>
+              <a:off x="8707016" y="11757770"/>
               <a:ext cx="258402" cy="261482"/>
             </a:xfrm>
             <a:prstGeom prst="rect">
@@ -17527,7 +17527,7 @@
             </p:nvCxnSpPr>
             <p:spPr>
               <a:xfrm>
-                <a:off x="5175326" y="1675003"/>
+                <a:off x="5175326" y="1671331"/>
                 <a:ext cx="1736649" cy="0"/>
               </a:xfrm>
               <a:prstGeom prst="straightConnector1">

</xml_diff>